<commit_message>
Conclusion slides, insert your slides above the last 2 slides
</commit_message>
<xml_diff>
--- a/CSC201Sec3Proj3Team4.pptx
+++ b/CSC201Sec3Proj3Team4.pptx
@@ -16,6 +16,10 @@
     <p:sldId id="261" r:id="rId10"/>
     <p:sldId id="262" r:id="rId11"/>
     <p:sldId id="263" r:id="rId12"/>
+    <p:sldId id="266" r:id="rId13"/>
+    <p:sldId id="267" r:id="rId14"/>
+    <p:sldId id="264" r:id="rId15"/>
+    <p:sldId id="265" r:id="rId16"/>
   </p:sldIdLst>
   <p:sldSz cx="12192000" cy="6858000"/>
   <p:notesSz cx="7772400" cy="10058400"/>
@@ -114,6 +118,11 @@
       </a:defRPr>
     </a:lvl9pPr>
   </p:defaultTextStyle>
+  <p:extLst>
+    <p:ext uri="{EFAFB233-063F-42B5-8137-9DF3F51BA10A}">
+      <p15:sldGuideLst xmlns:p15="http://schemas.microsoft.com/office/powerpoint/2012/main"/>
+    </p:ext>
+  </p:extLst>
 </p:presentation>
 </file>
 
@@ -13130,6 +13139,466 @@
 </p:sld>
 </file>
 
+<file path=ppt/slides/slide10.xml><?xml version="1.0" encoding="utf-8"?>
+<p:sld xmlns:a="http://schemas.openxmlformats.org/drawingml/2006/main" xmlns:r="http://schemas.openxmlformats.org/officeDocument/2006/relationships" xmlns:p="http://schemas.openxmlformats.org/presentationml/2006/main">
+  <p:cSld>
+    <p:spTree>
+      <p:nvGrpSpPr>
+        <p:cNvPr id="1" name=""/>
+        <p:cNvGrpSpPr/>
+        <p:nvPr/>
+      </p:nvGrpSpPr>
+      <p:grpSpPr>
+        <a:xfrm>
+          <a:off x="0" y="0"/>
+          <a:ext cx="0" cy="0"/>
+          <a:chOff x="0" y="0"/>
+          <a:chExt cx="0" cy="0"/>
+        </a:xfrm>
+      </p:grpSpPr>
+      <p:sp>
+        <p:nvSpPr>
+          <p:cNvPr id="2" name="Title 1">
+            <a:extLst>
+              <a:ext uri="{FF2B5EF4-FFF2-40B4-BE49-F238E27FC236}">
+                <a16:creationId xmlns:a16="http://schemas.microsoft.com/office/drawing/2014/main" id="{BA09BDD9-7D1E-4259-96E0-B2A8216D87DB}"/>
+              </a:ext>
+            </a:extLst>
+          </p:cNvPr>
+          <p:cNvSpPr>
+            <a:spLocks noGrp="1"/>
+          </p:cNvSpPr>
+          <p:nvPr>
+            <p:ph type="title"/>
+          </p:nvPr>
+        </p:nvSpPr>
+        <p:spPr/>
+        <p:txBody>
+          <a:bodyPr/>
+          <a:lstStyle/>
+          <a:p>
+            <a:endParaRPr lang="en-US"/>
+          </a:p>
+        </p:txBody>
+      </p:sp>
+      <p:sp>
+        <p:nvSpPr>
+          <p:cNvPr id="3" name="Text Placeholder 2">
+            <a:extLst>
+              <a:ext uri="{FF2B5EF4-FFF2-40B4-BE49-F238E27FC236}">
+                <a16:creationId xmlns:a16="http://schemas.microsoft.com/office/drawing/2014/main" id="{EC45169A-7263-4AAA-BC66-240E56794933}"/>
+              </a:ext>
+            </a:extLst>
+          </p:cNvPr>
+          <p:cNvSpPr>
+            <a:spLocks noGrp="1"/>
+          </p:cNvSpPr>
+          <p:nvPr>
+            <p:ph type="body"/>
+          </p:nvPr>
+        </p:nvSpPr>
+        <p:spPr/>
+        <p:txBody>
+          <a:bodyPr/>
+          <a:lstStyle/>
+          <a:p>
+            <a:endParaRPr lang="en-US"/>
+          </a:p>
+        </p:txBody>
+      </p:sp>
+    </p:spTree>
+    <p:extLst>
+      <p:ext uri="{BB962C8B-B14F-4D97-AF65-F5344CB8AC3E}">
+        <p14:creationId xmlns:p14="http://schemas.microsoft.com/office/powerpoint/2010/main" val="696345624"/>
+      </p:ext>
+    </p:extLst>
+  </p:cSld>
+  <p:clrMapOvr>
+    <a:masterClrMapping/>
+  </p:clrMapOvr>
+</p:sld>
+</file>
+
+<file path=ppt/slides/slide11.xml><?xml version="1.0" encoding="utf-8"?>
+<p:sld xmlns:a="http://schemas.openxmlformats.org/drawingml/2006/main" xmlns:r="http://schemas.openxmlformats.org/officeDocument/2006/relationships" xmlns:p="http://schemas.openxmlformats.org/presentationml/2006/main">
+  <p:cSld>
+    <p:spTree>
+      <p:nvGrpSpPr>
+        <p:cNvPr id="1" name=""/>
+        <p:cNvGrpSpPr/>
+        <p:nvPr/>
+      </p:nvGrpSpPr>
+      <p:grpSpPr>
+        <a:xfrm>
+          <a:off x="0" y="0"/>
+          <a:ext cx="0" cy="0"/>
+          <a:chOff x="0" y="0"/>
+          <a:chExt cx="0" cy="0"/>
+        </a:xfrm>
+      </p:grpSpPr>
+      <p:sp>
+        <p:nvSpPr>
+          <p:cNvPr id="254" name="TextShape 1"/>
+          <p:cNvSpPr txBox="1"/>
+          <p:nvPr/>
+        </p:nvSpPr>
+        <p:spPr>
+          <a:xfrm>
+            <a:off x="2703869" y="205560"/>
+            <a:ext cx="5548465" cy="1234800"/>
+          </a:xfrm>
+          <a:prstGeom prst="rect">
+            <a:avLst/>
+          </a:prstGeom>
+          <a:noFill/>
+          <a:ln>
+            <a:noFill/>
+          </a:ln>
+        </p:spPr>
+        <p:txBody>
+          <a:bodyPr lIns="0" tIns="0" rIns="0" bIns="0" anchor="ctr">
+            <a:noAutofit/>
+          </a:bodyPr>
+          <a:lstStyle/>
+          <a:p>
+            <a:pPr algn="r">
+              <a:lnSpc>
+                <a:spcPct val="100000"/>
+              </a:lnSpc>
+            </a:pPr>
+            <a:r>
+              <a:rPr lang="en-US" sz="5400" spc="-1" dirty="0">
+                <a:solidFill>
+                  <a:srgbClr val="4F81BD"/>
+                </a:solidFill>
+                <a:latin typeface="Trebuchet MS"/>
+              </a:rPr>
+              <a:t>Projects and Use</a:t>
+            </a:r>
+            <a:endParaRPr lang="en-US" sz="5400" b="0" strike="noStrike" spc="-1" dirty="0">
+              <a:solidFill>
+                <a:srgbClr val="000000"/>
+              </a:solidFill>
+              <a:latin typeface="Arial"/>
+            </a:endParaRPr>
+          </a:p>
+        </p:txBody>
+      </p:sp>
+      <p:pic>
+        <p:nvPicPr>
+          <p:cNvPr id="3" name="Picture 2">
+            <a:extLst>
+              <a:ext uri="{FF2B5EF4-FFF2-40B4-BE49-F238E27FC236}">
+                <a16:creationId xmlns:a16="http://schemas.microsoft.com/office/drawing/2014/main" id="{B1A87303-3A93-4E1A-8215-1805345B4A03}"/>
+              </a:ext>
+            </a:extLst>
+          </p:cNvPr>
+          <p:cNvPicPr>
+            <a:picLocks noChangeAspect="1"/>
+          </p:cNvPicPr>
+          <p:nvPr/>
+        </p:nvPicPr>
+        <p:blipFill>
+          <a:blip r:embed="rId2"/>
+          <a:stretch>
+            <a:fillRect/>
+          </a:stretch>
+        </p:blipFill>
+        <p:spPr>
+          <a:xfrm>
+            <a:off x="839910" y="1555359"/>
+            <a:ext cx="4954603" cy="4212738"/>
+          </a:xfrm>
+          <a:prstGeom prst="rect">
+            <a:avLst/>
+          </a:prstGeom>
+        </p:spPr>
+      </p:pic>
+      <p:pic>
+        <p:nvPicPr>
+          <p:cNvPr id="5" name="Picture 4">
+            <a:extLst>
+              <a:ext uri="{FF2B5EF4-FFF2-40B4-BE49-F238E27FC236}">
+                <a16:creationId xmlns:a16="http://schemas.microsoft.com/office/drawing/2014/main" id="{C6FCF48D-0C50-46C5-A636-8863F1A59132}"/>
+              </a:ext>
+            </a:extLst>
+          </p:cNvPr>
+          <p:cNvPicPr>
+            <a:picLocks noChangeAspect="1"/>
+          </p:cNvPicPr>
+          <p:nvPr/>
+        </p:nvPicPr>
+        <p:blipFill>
+          <a:blip r:embed="rId3"/>
+          <a:stretch>
+            <a:fillRect/>
+          </a:stretch>
+        </p:blipFill>
+        <p:spPr>
+          <a:xfrm>
+            <a:off x="6556514" y="1513247"/>
+            <a:ext cx="2637181" cy="4336304"/>
+          </a:xfrm>
+          <a:prstGeom prst="rect">
+            <a:avLst/>
+          </a:prstGeom>
+        </p:spPr>
+      </p:pic>
+    </p:spTree>
+    <p:extLst>
+      <p:ext uri="{BB962C8B-B14F-4D97-AF65-F5344CB8AC3E}">
+        <p14:creationId xmlns:p14="http://schemas.microsoft.com/office/powerpoint/2010/main" val="3595425988"/>
+      </p:ext>
+    </p:extLst>
+  </p:cSld>
+  <p:clrMapOvr>
+    <a:masterClrMapping/>
+  </p:clrMapOvr>
+</p:sld>
+</file>
+
+<file path=ppt/slides/slide12.xml><?xml version="1.0" encoding="utf-8"?>
+<p:sld xmlns:a="http://schemas.openxmlformats.org/drawingml/2006/main" xmlns:r="http://schemas.openxmlformats.org/officeDocument/2006/relationships" xmlns:p="http://schemas.openxmlformats.org/presentationml/2006/main">
+  <p:cSld>
+    <p:spTree>
+      <p:nvGrpSpPr>
+        <p:cNvPr id="1" name=""/>
+        <p:cNvGrpSpPr/>
+        <p:nvPr/>
+      </p:nvGrpSpPr>
+      <p:grpSpPr>
+        <a:xfrm>
+          <a:off x="0" y="0"/>
+          <a:ext cx="0" cy="0"/>
+          <a:chOff x="0" y="0"/>
+          <a:chExt cx="0" cy="0"/>
+        </a:xfrm>
+      </p:grpSpPr>
+      <p:sp>
+        <p:nvSpPr>
+          <p:cNvPr id="254" name="TextShape 1"/>
+          <p:cNvSpPr txBox="1"/>
+          <p:nvPr/>
+        </p:nvSpPr>
+        <p:spPr>
+          <a:xfrm>
+            <a:off x="2703869" y="205560"/>
+            <a:ext cx="6360618" cy="1234800"/>
+          </a:xfrm>
+          <a:prstGeom prst="rect">
+            <a:avLst/>
+          </a:prstGeom>
+          <a:noFill/>
+          <a:ln>
+            <a:noFill/>
+          </a:ln>
+        </p:spPr>
+        <p:txBody>
+          <a:bodyPr lIns="0" tIns="0" rIns="0" bIns="0" anchor="ctr">
+            <a:noAutofit/>
+          </a:bodyPr>
+          <a:lstStyle/>
+          <a:p>
+            <a:pPr algn="r">
+              <a:lnSpc>
+                <a:spcPct val="100000"/>
+              </a:lnSpc>
+            </a:pPr>
+            <a:r>
+              <a:rPr lang="en-US" sz="5400" spc="-1" dirty="0">
+                <a:solidFill>
+                  <a:srgbClr val="4F81BD"/>
+                </a:solidFill>
+                <a:latin typeface="Trebuchet MS"/>
+              </a:rPr>
+              <a:t>Pros about the Pro’s</a:t>
+            </a:r>
+            <a:endParaRPr lang="en-US" sz="5400" b="0" strike="noStrike" spc="-1" dirty="0">
+              <a:solidFill>
+                <a:srgbClr val="000000"/>
+              </a:solidFill>
+              <a:latin typeface="Arial"/>
+            </a:endParaRPr>
+          </a:p>
+        </p:txBody>
+      </p:sp>
+      <p:sp>
+        <p:nvSpPr>
+          <p:cNvPr id="4" name="TextShape 2">
+            <a:extLst>
+              <a:ext uri="{FF2B5EF4-FFF2-40B4-BE49-F238E27FC236}">
+                <a16:creationId xmlns:a16="http://schemas.microsoft.com/office/drawing/2014/main" id="{C779385A-84AB-45C9-B08B-80657589FAFD}"/>
+              </a:ext>
+            </a:extLst>
+          </p:cNvPr>
+          <p:cNvSpPr txBox="1"/>
+          <p:nvPr/>
+        </p:nvSpPr>
+        <p:spPr>
+          <a:xfrm>
+            <a:off x="457560" y="2057760"/>
+            <a:ext cx="10972440" cy="3977280"/>
+          </a:xfrm>
+          <a:prstGeom prst="rect">
+            <a:avLst/>
+          </a:prstGeom>
+          <a:noFill/>
+          <a:ln>
+            <a:noFill/>
+          </a:ln>
+        </p:spPr>
+        <p:txBody>
+          <a:bodyPr lIns="0" tIns="0" rIns="0" bIns="0">
+            <a:normAutofit/>
+          </a:bodyPr>
+          <a:lstStyle/>
+          <a:p>
+            <a:pPr marL="432000" indent="-324000">
+              <a:spcBef>
+                <a:spcPts val="1417"/>
+              </a:spcBef>
+              <a:buClr>
+                <a:srgbClr val="000000"/>
+              </a:buClr>
+              <a:buSzPct val="45000"/>
+              <a:buFont typeface="Wingdings" charset="2"/>
+              <a:buChar char=""/>
+            </a:pPr>
+            <a:r>
+              <a:rPr lang="en-US" sz="2800" b="0" strike="noStrike" spc="-1" dirty="0">
+                <a:solidFill>
+                  <a:srgbClr val="000000"/>
+                </a:solidFill>
+                <a:latin typeface="Arial"/>
+              </a:rPr>
+              <a:t>Open source</a:t>
+            </a:r>
+          </a:p>
+          <a:p>
+            <a:pPr marL="432000" indent="-324000">
+              <a:spcBef>
+                <a:spcPts val="1417"/>
+              </a:spcBef>
+              <a:buClr>
+                <a:srgbClr val="000000"/>
+              </a:buClr>
+              <a:buSzPct val="45000"/>
+              <a:buFont typeface="Wingdings" charset="2"/>
+              <a:buChar char=""/>
+            </a:pPr>
+            <a:r>
+              <a:rPr lang="en-US" sz="2800" b="0" strike="noStrike" spc="-1" dirty="0">
+                <a:solidFill>
+                  <a:srgbClr val="000000"/>
+                </a:solidFill>
+                <a:latin typeface="Arial"/>
+              </a:rPr>
+              <a:t>Concise and full-featured</a:t>
+            </a:r>
+          </a:p>
+          <a:p>
+            <a:pPr marL="432000" indent="-324000">
+              <a:spcBef>
+                <a:spcPts val="1417"/>
+              </a:spcBef>
+              <a:buClr>
+                <a:srgbClr val="000000"/>
+              </a:buClr>
+              <a:buSzPct val="45000"/>
+              <a:buFont typeface="Wingdings" charset="2"/>
+              <a:buChar char=""/>
+            </a:pPr>
+            <a:r>
+              <a:rPr lang="en-US" sz="2800" b="0" strike="noStrike" spc="-1" dirty="0">
+                <a:solidFill>
+                  <a:srgbClr val="000000"/>
+                </a:solidFill>
+                <a:latin typeface="Arial"/>
+              </a:rPr>
+              <a:t>Libraries and Documentation</a:t>
+            </a:r>
+          </a:p>
+          <a:p>
+            <a:pPr marL="432000" indent="-324000">
+              <a:spcBef>
+                <a:spcPts val="1417"/>
+              </a:spcBef>
+              <a:buClr>
+                <a:srgbClr val="000000"/>
+              </a:buClr>
+              <a:buSzPct val="45000"/>
+              <a:buFont typeface="Wingdings" charset="2"/>
+              <a:buChar char=""/>
+            </a:pPr>
+            <a:r>
+              <a:rPr lang="en-US" sz="2800" spc="-1" dirty="0">
+                <a:solidFill>
+                  <a:srgbClr val="000000"/>
+                </a:solidFill>
+                <a:latin typeface="Arial"/>
+              </a:rPr>
+              <a:t>Interactive IDE</a:t>
+            </a:r>
+          </a:p>
+          <a:p>
+            <a:pPr marL="432000" indent="-324000">
+              <a:spcBef>
+                <a:spcPts val="1417"/>
+              </a:spcBef>
+              <a:buClr>
+                <a:srgbClr val="000000"/>
+              </a:buClr>
+              <a:buSzPct val="45000"/>
+              <a:buFont typeface="Wingdings" charset="2"/>
+              <a:buChar char=""/>
+            </a:pPr>
+            <a:r>
+              <a:rPr lang="en-US" sz="2800" b="0" strike="noStrike" spc="-1" dirty="0">
+                <a:solidFill>
+                  <a:srgbClr val="000000"/>
+                </a:solidFill>
+                <a:latin typeface="Arial"/>
+              </a:rPr>
+              <a:t>Use of Macros</a:t>
+            </a:r>
+          </a:p>
+          <a:p>
+            <a:pPr marL="432000" indent="-324000">
+              <a:spcBef>
+                <a:spcPts val="1417"/>
+              </a:spcBef>
+              <a:buClr>
+                <a:srgbClr val="000000"/>
+              </a:buClr>
+              <a:buSzPct val="45000"/>
+              <a:buFont typeface="Wingdings" charset="2"/>
+              <a:buChar char=""/>
+            </a:pPr>
+            <a:r>
+              <a:rPr lang="en-US" sz="2800" spc="-1" dirty="0">
+                <a:solidFill>
+                  <a:srgbClr val="000000"/>
+                </a:solidFill>
+                <a:latin typeface="Arial"/>
+              </a:rPr>
+              <a:t>Semantically and Syntactically flexible (Create new languages)</a:t>
+            </a:r>
+          </a:p>
+        </p:txBody>
+      </p:sp>
+    </p:spTree>
+    <p:extLst>
+      <p:ext uri="{BB962C8B-B14F-4D97-AF65-F5344CB8AC3E}">
+        <p14:creationId xmlns:p14="http://schemas.microsoft.com/office/powerpoint/2010/main" val="217188212"/>
+      </p:ext>
+    </p:extLst>
+  </p:cSld>
+  <p:clrMapOvr>
+    <a:masterClrMapping/>
+  </p:clrMapOvr>
+</p:sld>
+</file>
+
 <file path=ppt/slides/slide2.xml><?xml version="1.0" encoding="utf-8"?>
 <p:sld xmlns:a="http://schemas.openxmlformats.org/drawingml/2006/main" xmlns:r="http://schemas.openxmlformats.org/officeDocument/2006/relationships" xmlns:p="http://schemas.openxmlformats.org/presentationml/2006/main">
   <p:cSld>
@@ -13547,7 +14016,7 @@
         </p:style>
         <p:txBody>
           <a:bodyPr lIns="90000" tIns="45000" rIns="90000" bIns="45000">
-            <a:normAutofit/>
+            <a:normAutofit lnSpcReduction="10000"/>
           </a:bodyPr>
           <a:lstStyle/>
           <a:p>
@@ -14428,13 +14897,22 @@
               <a:buChar char=""/>
             </a:pPr>
             <a:r>
-              <a:rPr lang="en-US" sz="2800" b="0" strike="noStrike" spc="-1">
+              <a:rPr lang="en-US" sz="2800" b="0" strike="noStrike" spc="-1" dirty="0" err="1">
                 <a:solidFill>
                   <a:srgbClr val="000000"/>
                 </a:solidFill>
                 <a:latin typeface="Arial"/>
               </a:rPr>
-              <a:t>Fractalide is another open-source programming language written in Racket</a:t>
+              <a:t>Fractalide</a:t>
+            </a:r>
+            <a:r>
+              <a:rPr lang="en-US" sz="2800" b="0" strike="noStrike" spc="-1" dirty="0">
+                <a:solidFill>
+                  <a:srgbClr val="000000"/>
+                </a:solidFill>
+                <a:latin typeface="Arial"/>
+              </a:rPr>
+              <a:t> is another open-source programming language written in Racket</a:t>
             </a:r>
           </a:p>
           <a:p>
@@ -14450,7 +14928,7 @@
               <a:buChar char=""/>
             </a:pPr>
             <a:r>
-              <a:rPr lang="en-US" sz="2800" b="0" strike="noStrike" spc="-1">
+              <a:rPr lang="en-US" sz="2800" b="0" strike="noStrike" spc="-1" dirty="0">
                 <a:solidFill>
                   <a:srgbClr val="000000"/>
                 </a:solidFill>
@@ -14472,7 +14950,7 @@
               <a:buChar char=""/>
             </a:pPr>
             <a:r>
-              <a:rPr lang="en-US" sz="2800" b="0" strike="noStrike" spc="-1">
+              <a:rPr lang="en-US" sz="2800" b="0" strike="noStrike" spc="-1" dirty="0">
                 <a:solidFill>
                   <a:srgbClr val="000000"/>
                 </a:solidFill>
@@ -14481,7 +14959,7 @@
               <a:t> </a:t>
             </a:r>
             <a:r>
-              <a:rPr lang="en-US" sz="2800" b="0" strike="noStrike" spc="-1">
+              <a:rPr lang="en-US" sz="2800" b="0" strike="noStrike" spc="-1" dirty="0">
                 <a:solidFill>
                   <a:srgbClr val="000000"/>
                 </a:solidFill>
@@ -14491,7 +14969,7 @@
               <a:t>https://github.com/fractalide/fractalide</a:t>
             </a:r>
             <a:r>
-              <a:rPr lang="en-US" sz="2800" b="0" strike="noStrike" spc="-1">
+              <a:rPr lang="en-US" sz="2800" b="0" strike="noStrike" spc="-1" dirty="0">
                 <a:solidFill>
                   <a:srgbClr val="000000"/>
                 </a:solidFill>
@@ -14597,7 +15075,7 @@
         </p:spPr>
         <p:txBody>
           <a:bodyPr lIns="0" tIns="0" rIns="0" bIns="0">
-            <a:normAutofit/>
+            <a:normAutofit lnSpcReduction="10000"/>
           </a:bodyPr>
           <a:lstStyle/>
           <a:p>
@@ -14613,7 +15091,7 @@
               <a:buChar char=""/>
             </a:pPr>
             <a:r>
-              <a:rPr lang="en-US" sz="2800" b="0" strike="noStrike" spc="-1">
+              <a:rPr lang="en-US" sz="2800" b="0" strike="noStrike" spc="-1" dirty="0">
                 <a:solidFill>
                   <a:srgbClr val="000000"/>
                 </a:solidFill>
@@ -14635,16 +15113,34 @@
               <a:buChar char=""/>
             </a:pPr>
             <a:r>
-              <a:rPr lang="en-US" sz="2800" b="0" strike="noStrike" spc="-1">
+              <a:rPr lang="en-US" sz="2800" b="0" strike="noStrike" spc="-1" dirty="0">
                 <a:solidFill>
                   <a:srgbClr val="000000"/>
                 </a:solidFill>
                 <a:latin typeface="Arial"/>
               </a:rPr>
-              <a:t>In fact, Racket’s IDE (DrRacket) was written in Racket </a:t>
+              <a:t>In fact, Racket’s IDE (</a:t>
             </a:r>
             <a:r>
-              <a:rPr lang="en-US" sz="2800" b="0" strike="noStrike" spc="-1">
+              <a:rPr lang="en-US" sz="2800" b="0" strike="noStrike" spc="-1" dirty="0" err="1">
+                <a:solidFill>
+                  <a:srgbClr val="000000"/>
+                </a:solidFill>
+                <a:latin typeface="Arial"/>
+              </a:rPr>
+              <a:t>DrRacket</a:t>
+            </a:r>
+            <a:r>
+              <a:rPr lang="en-US" sz="2800" b="0" strike="noStrike" spc="-1" dirty="0">
+                <a:solidFill>
+                  <a:srgbClr val="000000"/>
+                </a:solidFill>
+                <a:latin typeface="Arial"/>
+              </a:rPr>
+              <a:t>) was written in Racket </a:t>
+            </a:r>
+            <a:r>
+              <a:rPr lang="en-US" sz="2800" b="0" strike="noStrike" spc="-1" dirty="0">
                 <a:solidFill>
                   <a:srgbClr val="000000"/>
                 </a:solidFill>
@@ -14655,7 +15151,7 @@
               <a:t>https://github.com/racket/drracket</a:t>
             </a:r>
             <a:r>
-              <a:rPr lang="en-US" sz="2800" b="0" strike="noStrike" spc="-1">
+              <a:rPr lang="en-US" sz="2800" b="0" strike="noStrike" spc="-1" dirty="0">
                 <a:solidFill>
                   <a:srgbClr val="000000"/>
                 </a:solidFill>
@@ -14664,7 +15160,7 @@
               </a:rPr>
               <a:t> </a:t>
             </a:r>
-            <a:endParaRPr lang="en-US" sz="2800" b="0" strike="noStrike" spc="-1">
+            <a:endParaRPr lang="en-US" sz="2800" b="0" strike="noStrike" spc="-1" dirty="0">
               <a:solidFill>
                 <a:srgbClr val="000000"/>
               </a:solidFill>
@@ -14684,13 +15180,22 @@
               <a:buChar char=""/>
             </a:pPr>
             <a:r>
-              <a:rPr lang="en-US" sz="2800" b="0" strike="noStrike" spc="-1">
+              <a:rPr lang="en-US" sz="2800" b="0" strike="noStrike" spc="-1" dirty="0" err="1">
                 <a:solidFill>
                   <a:srgbClr val="000000"/>
                 </a:solidFill>
                 <a:latin typeface="Arial"/>
               </a:rPr>
-              <a:t>DrRacket includes all typical features of an IDE</a:t>
+              <a:t>DrRacket</a:t>
+            </a:r>
+            <a:r>
+              <a:rPr lang="en-US" sz="2800" b="0" strike="noStrike" spc="-1" dirty="0">
+                <a:solidFill>
+                  <a:srgbClr val="000000"/>
+                </a:solidFill>
+                <a:latin typeface="Arial"/>
+              </a:rPr>
+              <a:t> includes all typical features of an IDE</a:t>
             </a:r>
           </a:p>
           <a:p>
@@ -14706,7 +15211,7 @@
               <a:buChar char=""/>
             </a:pPr>
             <a:r>
-              <a:rPr lang="en-US" sz="2000" b="0" strike="noStrike" spc="-1">
+              <a:rPr lang="en-US" sz="2000" b="0" strike="noStrike" spc="-1" dirty="0">
                 <a:solidFill>
                   <a:srgbClr val="000000"/>
                 </a:solidFill>
@@ -14728,7 +15233,7 @@
               <a:buChar char=""/>
             </a:pPr>
             <a:r>
-              <a:rPr lang="en-US" sz="2000" b="0" strike="noStrike" spc="-1">
+              <a:rPr lang="en-US" sz="2000" b="0" strike="noStrike" spc="-1" dirty="0">
                 <a:solidFill>
                   <a:srgbClr val="000000"/>
                 </a:solidFill>
@@ -14750,7 +15255,7 @@
               <a:buChar char=""/>
             </a:pPr>
             <a:r>
-              <a:rPr lang="en-US" sz="2000" b="0" strike="noStrike" spc="-1">
+              <a:rPr lang="en-US" sz="2000" b="0" strike="noStrike" spc="-1" dirty="0">
                 <a:solidFill>
                   <a:srgbClr val="000000"/>
                 </a:solidFill>
@@ -14772,7 +15277,7 @@
               <a:buChar char=""/>
             </a:pPr>
             <a:r>
-              <a:rPr lang="en-US" sz="2000" b="0" strike="noStrike" spc="-1">
+              <a:rPr lang="en-US" sz="2000" b="0" strike="noStrike" spc="-1" dirty="0">
                 <a:solidFill>
                   <a:srgbClr val="000000"/>
                 </a:solidFill>
@@ -14784,6 +15289,86 @@
         </p:txBody>
       </p:sp>
     </p:spTree>
+  </p:cSld>
+  <p:clrMapOvr>
+    <a:masterClrMapping/>
+  </p:clrMapOvr>
+</p:sld>
+</file>
+
+<file path=ppt/slides/slide9.xml><?xml version="1.0" encoding="utf-8"?>
+<p:sld xmlns:a="http://schemas.openxmlformats.org/drawingml/2006/main" xmlns:r="http://schemas.openxmlformats.org/officeDocument/2006/relationships" xmlns:p="http://schemas.openxmlformats.org/presentationml/2006/main">
+  <p:cSld>
+    <p:spTree>
+      <p:nvGrpSpPr>
+        <p:cNvPr id="1" name=""/>
+        <p:cNvGrpSpPr/>
+        <p:nvPr/>
+      </p:nvGrpSpPr>
+      <p:grpSpPr>
+        <a:xfrm>
+          <a:off x="0" y="0"/>
+          <a:ext cx="0" cy="0"/>
+          <a:chOff x="0" y="0"/>
+          <a:chExt cx="0" cy="0"/>
+        </a:xfrm>
+      </p:grpSpPr>
+      <p:sp>
+        <p:nvSpPr>
+          <p:cNvPr id="2" name="Title 1">
+            <a:extLst>
+              <a:ext uri="{FF2B5EF4-FFF2-40B4-BE49-F238E27FC236}">
+                <a16:creationId xmlns:a16="http://schemas.microsoft.com/office/drawing/2014/main" id="{4AA88340-D0DF-4FBC-8BD2-18236183DF47}"/>
+              </a:ext>
+            </a:extLst>
+          </p:cNvPr>
+          <p:cNvSpPr>
+            <a:spLocks noGrp="1"/>
+          </p:cNvSpPr>
+          <p:nvPr>
+            <p:ph type="title"/>
+          </p:nvPr>
+        </p:nvSpPr>
+        <p:spPr/>
+        <p:txBody>
+          <a:bodyPr/>
+          <a:lstStyle/>
+          <a:p>
+            <a:endParaRPr lang="en-US"/>
+          </a:p>
+        </p:txBody>
+      </p:sp>
+      <p:sp>
+        <p:nvSpPr>
+          <p:cNvPr id="3" name="Text Placeholder 2">
+            <a:extLst>
+              <a:ext uri="{FF2B5EF4-FFF2-40B4-BE49-F238E27FC236}">
+                <a16:creationId xmlns:a16="http://schemas.microsoft.com/office/drawing/2014/main" id="{5C3A6CAD-B008-483D-AA12-895DE4AADDAD}"/>
+              </a:ext>
+            </a:extLst>
+          </p:cNvPr>
+          <p:cNvSpPr>
+            <a:spLocks noGrp="1"/>
+          </p:cNvSpPr>
+          <p:nvPr>
+            <p:ph type="body"/>
+          </p:nvPr>
+        </p:nvSpPr>
+        <p:spPr/>
+        <p:txBody>
+          <a:bodyPr/>
+          <a:lstStyle/>
+          <a:p>
+            <a:endParaRPr lang="en-US"/>
+          </a:p>
+        </p:txBody>
+      </p:sp>
+    </p:spTree>
+    <p:extLst>
+      <p:ext uri="{BB962C8B-B14F-4D97-AF65-F5344CB8AC3E}">
+        <p14:creationId xmlns:p14="http://schemas.microsoft.com/office/powerpoint/2010/main" val="3127419961"/>
+      </p:ext>
+    </p:extLst>
   </p:cSld>
   <p:clrMapOvr>
     <a:masterClrMapping/>

</xml_diff>

<commit_message>
First pass at history of racket
</commit_message>
<xml_diff>
--- a/CSC201Sec3Proj3Team4.pptx
+++ b/CSC201Sec3Proj3Team4.pptx
@@ -9,17 +9,21 @@
   </p:sldMasterIdLst>
   <p:sldIdLst>
     <p:sldId id="256" r:id="rId5"/>
-    <p:sldId id="257" r:id="rId6"/>
-    <p:sldId id="258" r:id="rId7"/>
-    <p:sldId id="259" r:id="rId8"/>
-    <p:sldId id="260" r:id="rId9"/>
-    <p:sldId id="261" r:id="rId10"/>
-    <p:sldId id="262" r:id="rId11"/>
-    <p:sldId id="263" r:id="rId12"/>
-    <p:sldId id="266" r:id="rId13"/>
-    <p:sldId id="267" r:id="rId14"/>
-    <p:sldId id="264" r:id="rId15"/>
-    <p:sldId id="265" r:id="rId16"/>
+    <p:sldId id="268" r:id="rId6"/>
+    <p:sldId id="269" r:id="rId7"/>
+    <p:sldId id="270" r:id="rId8"/>
+    <p:sldId id="257" r:id="rId9"/>
+    <p:sldId id="258" r:id="rId10"/>
+    <p:sldId id="259" r:id="rId11"/>
+    <p:sldId id="260" r:id="rId12"/>
+    <p:sldId id="261" r:id="rId13"/>
+    <p:sldId id="262" r:id="rId14"/>
+    <p:sldId id="263" r:id="rId15"/>
+    <p:sldId id="266" r:id="rId16"/>
+    <p:sldId id="267" r:id="rId17"/>
+    <p:sldId id="264" r:id="rId18"/>
+    <p:sldId id="265" r:id="rId19"/>
+    <p:sldId id="271" r:id="rId20"/>
   </p:sldIdLst>
   <p:sldSz cx="12192000" cy="6858000"/>
   <p:notesSz cx="7772400" cy="10058400"/>
@@ -124,6 +128,18 @@
     </p:ext>
   </p:extLst>
 </p:presentation>
+</file>
+
+<file path=ppt/commentAuthors.xml><?xml version="1.0" encoding="utf-8"?>
+<p:cmAuthorLst xmlns:a="http://schemas.openxmlformats.org/drawingml/2006/main" xmlns:r="http://schemas.openxmlformats.org/officeDocument/2006/relationships" xmlns:p="http://schemas.openxmlformats.org/presentationml/2006/main">
+  <p:cmAuthor id="1" name="steven" initials="s" lastIdx="1" clrIdx="0">
+    <p:extLst>
+      <p:ext uri="{19B8F6BF-5375-455C-9EA6-DF929625EA0E}">
+        <p15:presenceInfo xmlns:p15="http://schemas.microsoft.com/office/powerpoint/2012/main" userId="steven" providerId="None"/>
+      </p:ext>
+    </p:extLst>
+  </p:cmAuthor>
+</p:cmAuthorLst>
 </file>
 
 <file path=ppt/slideLayouts/slideLayout1.xml><?xml version="1.0" encoding="utf-8"?>
@@ -13158,60 +13174,174 @@
       </p:grpSpPr>
       <p:sp>
         <p:nvSpPr>
-          <p:cNvPr id="2" name="Title 1">
-            <a:extLst>
-              <a:ext uri="{FF2B5EF4-FFF2-40B4-BE49-F238E27FC236}">
-                <a16:creationId xmlns:a16="http://schemas.microsoft.com/office/drawing/2014/main" id="{BA09BDD9-7D1E-4259-96E0-B2A8216D87DB}"/>
-              </a:ext>
-            </a:extLst>
-          </p:cNvPr>
-          <p:cNvSpPr>
-            <a:spLocks noGrp="1"/>
-          </p:cNvSpPr>
-          <p:nvPr>
-            <p:ph type="title"/>
-          </p:nvPr>
-        </p:nvSpPr>
-        <p:spPr/>
-        <p:txBody>
-          <a:bodyPr/>
-          <a:lstStyle/>
-          <a:p>
-            <a:endParaRPr lang="en-US"/>
-          </a:p>
-        </p:txBody>
-      </p:sp>
-      <p:sp>
-        <p:nvSpPr>
-          <p:cNvPr id="3" name="Text Placeholder 2">
-            <a:extLst>
-              <a:ext uri="{FF2B5EF4-FFF2-40B4-BE49-F238E27FC236}">
-                <a16:creationId xmlns:a16="http://schemas.microsoft.com/office/drawing/2014/main" id="{EC45169A-7263-4AAA-BC66-240E56794933}"/>
-              </a:ext>
-            </a:extLst>
-          </p:cNvPr>
-          <p:cNvSpPr>
-            <a:spLocks noGrp="1"/>
-          </p:cNvSpPr>
-          <p:nvPr>
-            <p:ph type="body"/>
-          </p:nvPr>
-        </p:nvSpPr>
-        <p:spPr/>
-        <p:txBody>
-          <a:bodyPr/>
-          <a:lstStyle/>
-          <a:p>
-            <a:endParaRPr lang="en-US"/>
+          <p:cNvPr id="252" name="TextShape 1"/>
+          <p:cNvSpPr txBox="1"/>
+          <p:nvPr/>
+        </p:nvSpPr>
+        <p:spPr>
+          <a:xfrm>
+            <a:off x="2011680" y="274680"/>
+            <a:ext cx="7766280" cy="1645560"/>
+          </a:xfrm>
+          <a:prstGeom prst="rect">
+            <a:avLst/>
+          </a:prstGeom>
+          <a:noFill/>
+          <a:ln>
+            <a:noFill/>
+          </a:ln>
+        </p:spPr>
+        <p:txBody>
+          <a:bodyPr lIns="0" tIns="0" rIns="0" bIns="0" anchor="ctr">
+            <a:noAutofit/>
+          </a:bodyPr>
+          <a:lstStyle/>
+          <a:p>
+            <a:pPr algn="r">
+              <a:lnSpc>
+                <a:spcPct val="100000"/>
+              </a:lnSpc>
+            </a:pPr>
+            <a:r>
+              <a:rPr lang="en-US" sz="5400" b="0" strike="noStrike" spc="-1">
+                <a:solidFill>
+                  <a:srgbClr val="4F81BD"/>
+                </a:solidFill>
+                <a:latin typeface="Trebuchet MS"/>
+                <a:ea typeface="DejaVu Sans"/>
+              </a:rPr>
+              <a:t>Racket Applications: Fractalide</a:t>
+            </a:r>
+            <a:endParaRPr lang="en-US" sz="5400" b="0" strike="noStrike" spc="-1">
+              <a:solidFill>
+                <a:srgbClr val="000000"/>
+              </a:solidFill>
+              <a:latin typeface="Arial"/>
+            </a:endParaRPr>
+          </a:p>
+        </p:txBody>
+      </p:sp>
+      <p:sp>
+        <p:nvSpPr>
+          <p:cNvPr id="253" name="TextShape 2"/>
+          <p:cNvSpPr txBox="1"/>
+          <p:nvPr/>
+        </p:nvSpPr>
+        <p:spPr>
+          <a:xfrm>
+            <a:off x="457560" y="2057760"/>
+            <a:ext cx="10972440" cy="3977280"/>
+          </a:xfrm>
+          <a:prstGeom prst="rect">
+            <a:avLst/>
+          </a:prstGeom>
+          <a:noFill/>
+          <a:ln>
+            <a:noFill/>
+          </a:ln>
+        </p:spPr>
+        <p:txBody>
+          <a:bodyPr lIns="0" tIns="0" rIns="0" bIns="0">
+            <a:normAutofit/>
+          </a:bodyPr>
+          <a:lstStyle/>
+          <a:p>
+            <a:pPr marL="432000" indent="-324000">
+              <a:spcBef>
+                <a:spcPts val="1417"/>
+              </a:spcBef>
+              <a:buClr>
+                <a:srgbClr val="000000"/>
+              </a:buClr>
+              <a:buSzPct val="45000"/>
+              <a:buFont typeface="Wingdings" charset="2"/>
+              <a:buChar char=""/>
+            </a:pPr>
+            <a:r>
+              <a:rPr lang="en-US" sz="2800" b="0" strike="noStrike" spc="-1" dirty="0" err="1">
+                <a:solidFill>
+                  <a:srgbClr val="000000"/>
+                </a:solidFill>
+                <a:latin typeface="Arial"/>
+              </a:rPr>
+              <a:t>Fractalide</a:t>
+            </a:r>
+            <a:r>
+              <a:rPr lang="en-US" sz="2800" b="0" strike="noStrike" spc="-1" dirty="0">
+                <a:solidFill>
+                  <a:srgbClr val="000000"/>
+                </a:solidFill>
+                <a:latin typeface="Arial"/>
+              </a:rPr>
+              <a:t> is another open-source programming language written in Racket</a:t>
+            </a:r>
+          </a:p>
+          <a:p>
+            <a:pPr marL="432000" indent="-324000">
+              <a:spcBef>
+                <a:spcPts val="1417"/>
+              </a:spcBef>
+              <a:buClr>
+                <a:srgbClr val="000000"/>
+              </a:buClr>
+              <a:buSzPct val="45000"/>
+              <a:buFont typeface="Wingdings" charset="2"/>
+              <a:buChar char=""/>
+            </a:pPr>
+            <a:r>
+              <a:rPr lang="en-US" sz="2800" b="0" strike="noStrike" spc="-1" dirty="0">
+                <a:solidFill>
+                  <a:srgbClr val="000000"/>
+                </a:solidFill>
+                <a:latin typeface="Arial"/>
+              </a:rPr>
+              <a:t>An interesting approach to designing a programming language which utilizes graphs as the basic language concepts</a:t>
+            </a:r>
+          </a:p>
+          <a:p>
+            <a:pPr marL="432000" indent="-324000">
+              <a:spcBef>
+                <a:spcPts val="1417"/>
+              </a:spcBef>
+              <a:buClr>
+                <a:srgbClr val="000000"/>
+              </a:buClr>
+              <a:buSzPct val="45000"/>
+              <a:buFont typeface="Wingdings" charset="2"/>
+              <a:buChar char=""/>
+            </a:pPr>
+            <a:r>
+              <a:rPr lang="en-US" sz="2800" b="0" strike="noStrike" spc="-1" dirty="0">
+                <a:solidFill>
+                  <a:srgbClr val="000000"/>
+                </a:solidFill>
+                <a:latin typeface="Arial"/>
+              </a:rPr>
+              <a:t> </a:t>
+            </a:r>
+            <a:r>
+              <a:rPr lang="en-US" sz="2800" b="0" strike="noStrike" spc="-1" dirty="0">
+                <a:solidFill>
+                  <a:srgbClr val="000000"/>
+                </a:solidFill>
+                <a:latin typeface="Arial"/>
+                <a:hlinkClick r:id="rId2"/>
+              </a:rPr>
+              <a:t>https://github.com/fractalide/fractalide</a:t>
+            </a:r>
+            <a:r>
+              <a:rPr lang="en-US" sz="2800" b="0" strike="noStrike" spc="-1" dirty="0">
+                <a:solidFill>
+                  <a:srgbClr val="000000"/>
+                </a:solidFill>
+                <a:latin typeface="Arial"/>
+              </a:rPr>
+              <a:t> </a:t>
+            </a:r>
           </a:p>
         </p:txBody>
       </p:sp>
     </p:spTree>
-    <p:extLst>
-      <p:ext uri="{BB962C8B-B14F-4D97-AF65-F5344CB8AC3E}">
-        <p14:creationId xmlns:p14="http://schemas.microsoft.com/office/powerpoint/2010/main" val="696345624"/>
-      </p:ext>
-    </p:extLst>
   </p:cSld>
   <p:clrMapOvr>
     <a:masterClrMapping/>
@@ -13244,8 +13374,8 @@
         </p:nvSpPr>
         <p:spPr>
           <a:xfrm>
-            <a:off x="2703869" y="205560"/>
-            <a:ext cx="5548465" cy="1234800"/>
+            <a:off x="2011680" y="274680"/>
+            <a:ext cx="7766280" cy="1645560"/>
           </a:xfrm>
           <a:prstGeom prst="rect">
             <a:avLst/>
@@ -13267,15 +13397,16 @@
               </a:lnSpc>
             </a:pPr>
             <a:r>
-              <a:rPr lang="en-US" sz="5400" spc="-1" dirty="0">
+              <a:rPr lang="en-US" sz="5400" b="0" strike="noStrike" spc="-1">
                 <a:solidFill>
                   <a:srgbClr val="4F81BD"/>
                 </a:solidFill>
                 <a:latin typeface="Trebuchet MS"/>
+                <a:ea typeface="DejaVu Sans"/>
               </a:rPr>
-              <a:t>Projects and Use</a:t>
+              <a:t>Racket Applications: Other Applications</a:t>
             </a:r>
-            <a:endParaRPr lang="en-US" sz="5400" b="0" strike="noStrike" spc="-1" dirty="0">
+            <a:endParaRPr lang="en-US" sz="5400" b="0" strike="noStrike" spc="-1">
               <a:solidFill>
                 <a:srgbClr val="000000"/>
               </a:solidFill>
@@ -13284,72 +13415,241 @@
           </a:p>
         </p:txBody>
       </p:sp>
-      <p:pic>
-        <p:nvPicPr>
-          <p:cNvPr id="3" name="Picture 2">
-            <a:extLst>
-              <a:ext uri="{FF2B5EF4-FFF2-40B4-BE49-F238E27FC236}">
-                <a16:creationId xmlns:a16="http://schemas.microsoft.com/office/drawing/2014/main" id="{B1A87303-3A93-4E1A-8215-1805345B4A03}"/>
-              </a:ext>
-            </a:extLst>
-          </p:cNvPr>
-          <p:cNvPicPr>
-            <a:picLocks noChangeAspect="1"/>
-          </p:cNvPicPr>
+      <p:sp>
+        <p:nvSpPr>
+          <p:cNvPr id="255" name="TextShape 2"/>
+          <p:cNvSpPr txBox="1"/>
           <p:nvPr/>
-        </p:nvPicPr>
-        <p:blipFill>
-          <a:blip r:embed="rId2"/>
-          <a:stretch>
-            <a:fillRect/>
-          </a:stretch>
-        </p:blipFill>
-        <p:spPr>
-          <a:xfrm>
-            <a:off x="839910" y="1555359"/>
-            <a:ext cx="4954603" cy="4212738"/>
-          </a:xfrm>
-          <a:prstGeom prst="rect">
-            <a:avLst/>
-          </a:prstGeom>
-        </p:spPr>
-      </p:pic>
-      <p:pic>
-        <p:nvPicPr>
-          <p:cNvPr id="5" name="Picture 4">
-            <a:extLst>
-              <a:ext uri="{FF2B5EF4-FFF2-40B4-BE49-F238E27FC236}">
-                <a16:creationId xmlns:a16="http://schemas.microsoft.com/office/drawing/2014/main" id="{C6FCF48D-0C50-46C5-A636-8863F1A59132}"/>
-              </a:ext>
-            </a:extLst>
-          </p:cNvPr>
-          <p:cNvPicPr>
-            <a:picLocks noChangeAspect="1"/>
-          </p:cNvPicPr>
-          <p:nvPr/>
-        </p:nvPicPr>
-        <p:blipFill>
-          <a:blip r:embed="rId3"/>
-          <a:stretch>
-            <a:fillRect/>
-          </a:stretch>
-        </p:blipFill>
-        <p:spPr>
-          <a:xfrm>
-            <a:off x="6556514" y="1513247"/>
-            <a:ext cx="2637181" cy="4336304"/>
-          </a:xfrm>
-          <a:prstGeom prst="rect">
-            <a:avLst/>
-          </a:prstGeom>
-        </p:spPr>
-      </p:pic>
+        </p:nvSpPr>
+        <p:spPr>
+          <a:xfrm>
+            <a:off x="457560" y="2057760"/>
+            <a:ext cx="10972440" cy="3977280"/>
+          </a:xfrm>
+          <a:prstGeom prst="rect">
+            <a:avLst/>
+          </a:prstGeom>
+          <a:noFill/>
+          <a:ln>
+            <a:noFill/>
+          </a:ln>
+        </p:spPr>
+        <p:txBody>
+          <a:bodyPr lIns="0" tIns="0" rIns="0" bIns="0">
+            <a:normAutofit lnSpcReduction="10000"/>
+          </a:bodyPr>
+          <a:lstStyle/>
+          <a:p>
+            <a:pPr marL="432000" indent="-324000">
+              <a:spcBef>
+                <a:spcPts val="1417"/>
+              </a:spcBef>
+              <a:buClr>
+                <a:srgbClr val="000000"/>
+              </a:buClr>
+              <a:buSzPct val="45000"/>
+              <a:buFont typeface="Wingdings" charset="2"/>
+              <a:buChar char=""/>
+            </a:pPr>
+            <a:r>
+              <a:rPr lang="en-US" sz="2800" b="0" strike="noStrike" spc="-1" dirty="0">
+                <a:solidFill>
+                  <a:srgbClr val="000000"/>
+                </a:solidFill>
+                <a:latin typeface="Arial"/>
+              </a:rPr>
+              <a:t>The other features of racket we have discussed make it a feasible candidate for other applications</a:t>
+            </a:r>
+          </a:p>
+          <a:p>
+            <a:pPr marL="432000" indent="-324000">
+              <a:spcBef>
+                <a:spcPts val="1417"/>
+              </a:spcBef>
+              <a:buClr>
+                <a:srgbClr val="000000"/>
+              </a:buClr>
+              <a:buSzPct val="45000"/>
+              <a:buFont typeface="Wingdings" charset="2"/>
+              <a:buChar char=""/>
+            </a:pPr>
+            <a:r>
+              <a:rPr lang="en-US" sz="2800" b="0" strike="noStrike" spc="-1" dirty="0">
+                <a:solidFill>
+                  <a:srgbClr val="000000"/>
+                </a:solidFill>
+                <a:latin typeface="Arial"/>
+              </a:rPr>
+              <a:t>In fact, Racket’s IDE (</a:t>
+            </a:r>
+            <a:r>
+              <a:rPr lang="en-US" sz="2800" b="0" strike="noStrike" spc="-1" dirty="0" err="1">
+                <a:solidFill>
+                  <a:srgbClr val="000000"/>
+                </a:solidFill>
+                <a:latin typeface="Arial"/>
+              </a:rPr>
+              <a:t>DrRacket</a:t>
+            </a:r>
+            <a:r>
+              <a:rPr lang="en-US" sz="2800" b="0" strike="noStrike" spc="-1" dirty="0">
+                <a:solidFill>
+                  <a:srgbClr val="000000"/>
+                </a:solidFill>
+                <a:latin typeface="Arial"/>
+              </a:rPr>
+              <a:t>) was written in Racket </a:t>
+            </a:r>
+            <a:r>
+              <a:rPr lang="en-US" sz="2800" b="0" strike="noStrike" spc="-1" dirty="0">
+                <a:solidFill>
+                  <a:srgbClr val="000000"/>
+                </a:solidFill>
+                <a:latin typeface="Arial"/>
+                <a:ea typeface="DejaVu Sans"/>
+                <a:hlinkClick r:id="rId2"/>
+              </a:rPr>
+              <a:t>https://github.com/racket/drracket</a:t>
+            </a:r>
+            <a:r>
+              <a:rPr lang="en-US" sz="2800" b="0" strike="noStrike" spc="-1" dirty="0">
+                <a:solidFill>
+                  <a:srgbClr val="000000"/>
+                </a:solidFill>
+                <a:latin typeface="Arial"/>
+                <a:ea typeface="DejaVu Sans"/>
+              </a:rPr>
+              <a:t> </a:t>
+            </a:r>
+            <a:endParaRPr lang="en-US" sz="2800" b="0" strike="noStrike" spc="-1" dirty="0">
+              <a:solidFill>
+                <a:srgbClr val="000000"/>
+              </a:solidFill>
+              <a:latin typeface="Arial"/>
+            </a:endParaRPr>
+          </a:p>
+          <a:p>
+            <a:pPr marL="432000" indent="-324000">
+              <a:spcBef>
+                <a:spcPts val="1417"/>
+              </a:spcBef>
+              <a:buClr>
+                <a:srgbClr val="000000"/>
+              </a:buClr>
+              <a:buSzPct val="45000"/>
+              <a:buFont typeface="Wingdings" charset="2"/>
+              <a:buChar char=""/>
+            </a:pPr>
+            <a:r>
+              <a:rPr lang="en-US" sz="2800" b="0" strike="noStrike" spc="-1" dirty="0" err="1">
+                <a:solidFill>
+                  <a:srgbClr val="000000"/>
+                </a:solidFill>
+                <a:latin typeface="Arial"/>
+              </a:rPr>
+              <a:t>DrRacket</a:t>
+            </a:r>
+            <a:r>
+              <a:rPr lang="en-US" sz="2800" b="0" strike="noStrike" spc="-1" dirty="0">
+                <a:solidFill>
+                  <a:srgbClr val="000000"/>
+                </a:solidFill>
+                <a:latin typeface="Arial"/>
+              </a:rPr>
+              <a:t> includes all typical features of an IDE</a:t>
+            </a:r>
+          </a:p>
+          <a:p>
+            <a:pPr marL="864000" lvl="1" indent="-324000">
+              <a:spcBef>
+                <a:spcPts val="1134"/>
+              </a:spcBef>
+              <a:buClr>
+                <a:srgbClr val="000000"/>
+              </a:buClr>
+              <a:buSzPct val="75000"/>
+              <a:buFont typeface="Symbol" charset="2"/>
+              <a:buChar char=""/>
+            </a:pPr>
+            <a:r>
+              <a:rPr lang="en-US" sz="2000" b="0" strike="noStrike" spc="-1" dirty="0">
+                <a:solidFill>
+                  <a:srgbClr val="000000"/>
+                </a:solidFill>
+                <a:latin typeface="Arial"/>
+              </a:rPr>
+              <a:t>Debugging</a:t>
+            </a:r>
+          </a:p>
+          <a:p>
+            <a:pPr marL="864000" lvl="1" indent="-324000">
+              <a:spcBef>
+                <a:spcPts val="1134"/>
+              </a:spcBef>
+              <a:buClr>
+                <a:srgbClr val="000000"/>
+              </a:buClr>
+              <a:buSzPct val="75000"/>
+              <a:buFont typeface="Symbol" charset="2"/>
+              <a:buChar char=""/>
+            </a:pPr>
+            <a:r>
+              <a:rPr lang="en-US" sz="2000" b="0" strike="noStrike" spc="-1" dirty="0">
+                <a:solidFill>
+                  <a:srgbClr val="000000"/>
+                </a:solidFill>
+                <a:latin typeface="Arial"/>
+              </a:rPr>
+              <a:t>Source highlighting</a:t>
+            </a:r>
+          </a:p>
+          <a:p>
+            <a:pPr marL="864000" lvl="1" indent="-324000">
+              <a:spcBef>
+                <a:spcPts val="1134"/>
+              </a:spcBef>
+              <a:buClr>
+                <a:srgbClr val="000000"/>
+              </a:buClr>
+              <a:buSzPct val="75000"/>
+              <a:buFont typeface="Symbol" charset="2"/>
+              <a:buChar char=""/>
+            </a:pPr>
+            <a:r>
+              <a:rPr lang="en-US" sz="2000" b="0" strike="noStrike" spc="-1" dirty="0">
+                <a:solidFill>
+                  <a:srgbClr val="000000"/>
+                </a:solidFill>
+                <a:latin typeface="Arial"/>
+              </a:rPr>
+              <a:t>Library Support</a:t>
+            </a:r>
+          </a:p>
+          <a:p>
+            <a:pPr marL="864000" lvl="1" indent="-324000">
+              <a:spcBef>
+                <a:spcPts val="1134"/>
+              </a:spcBef>
+              <a:buClr>
+                <a:srgbClr val="000000"/>
+              </a:buClr>
+              <a:buSzPct val="75000"/>
+              <a:buFont typeface="Symbol" charset="2"/>
+              <a:buChar char=""/>
+            </a:pPr>
+            <a:r>
+              <a:rPr lang="en-US" sz="2000" b="0" strike="noStrike" spc="-1" dirty="0">
+                <a:solidFill>
+                  <a:srgbClr val="000000"/>
+                </a:solidFill>
+                <a:latin typeface="Arial"/>
+              </a:rPr>
+              <a:t>Etc.</a:t>
+            </a:r>
+          </a:p>
+        </p:txBody>
+      </p:sp>
     </p:spTree>
-    <p:extLst>
-      <p:ext uri="{BB962C8B-B14F-4D97-AF65-F5344CB8AC3E}">
-        <p14:creationId xmlns:p14="http://schemas.microsoft.com/office/powerpoint/2010/main" val="3595425988"/>
-      </p:ext>
-    </p:extLst>
   </p:cSld>
   <p:clrMapOvr>
     <a:masterClrMapping/>
@@ -13376,6 +13676,304 @@
       </p:grpSpPr>
       <p:sp>
         <p:nvSpPr>
+          <p:cNvPr id="2" name="Title 1">
+            <a:extLst>
+              <a:ext uri="{FF2B5EF4-FFF2-40B4-BE49-F238E27FC236}">
+                <a16:creationId xmlns:a16="http://schemas.microsoft.com/office/drawing/2014/main" id="{4AA88340-D0DF-4FBC-8BD2-18236183DF47}"/>
+              </a:ext>
+            </a:extLst>
+          </p:cNvPr>
+          <p:cNvSpPr>
+            <a:spLocks noGrp="1"/>
+          </p:cNvSpPr>
+          <p:nvPr>
+            <p:ph type="title"/>
+          </p:nvPr>
+        </p:nvSpPr>
+        <p:spPr/>
+        <p:txBody>
+          <a:bodyPr/>
+          <a:lstStyle/>
+          <a:p>
+            <a:endParaRPr lang="en-US"/>
+          </a:p>
+        </p:txBody>
+      </p:sp>
+      <p:sp>
+        <p:nvSpPr>
+          <p:cNvPr id="3" name="Text Placeholder 2">
+            <a:extLst>
+              <a:ext uri="{FF2B5EF4-FFF2-40B4-BE49-F238E27FC236}">
+                <a16:creationId xmlns:a16="http://schemas.microsoft.com/office/drawing/2014/main" id="{5C3A6CAD-B008-483D-AA12-895DE4AADDAD}"/>
+              </a:ext>
+            </a:extLst>
+          </p:cNvPr>
+          <p:cNvSpPr>
+            <a:spLocks noGrp="1"/>
+          </p:cNvSpPr>
+          <p:nvPr>
+            <p:ph type="body"/>
+          </p:nvPr>
+        </p:nvSpPr>
+        <p:spPr/>
+        <p:txBody>
+          <a:bodyPr/>
+          <a:lstStyle/>
+          <a:p>
+            <a:endParaRPr lang="en-US"/>
+          </a:p>
+        </p:txBody>
+      </p:sp>
+    </p:spTree>
+    <p:extLst>
+      <p:ext uri="{BB962C8B-B14F-4D97-AF65-F5344CB8AC3E}">
+        <p14:creationId xmlns:p14="http://schemas.microsoft.com/office/powerpoint/2010/main" val="3127419961"/>
+      </p:ext>
+    </p:extLst>
+  </p:cSld>
+  <p:clrMapOvr>
+    <a:masterClrMapping/>
+  </p:clrMapOvr>
+</p:sld>
+</file>
+
+<file path=ppt/slides/slide13.xml><?xml version="1.0" encoding="utf-8"?>
+<p:sld xmlns:a="http://schemas.openxmlformats.org/drawingml/2006/main" xmlns:r="http://schemas.openxmlformats.org/officeDocument/2006/relationships" xmlns:p="http://schemas.openxmlformats.org/presentationml/2006/main">
+  <p:cSld>
+    <p:spTree>
+      <p:nvGrpSpPr>
+        <p:cNvPr id="1" name=""/>
+        <p:cNvGrpSpPr/>
+        <p:nvPr/>
+      </p:nvGrpSpPr>
+      <p:grpSpPr>
+        <a:xfrm>
+          <a:off x="0" y="0"/>
+          <a:ext cx="0" cy="0"/>
+          <a:chOff x="0" y="0"/>
+          <a:chExt cx="0" cy="0"/>
+        </a:xfrm>
+      </p:grpSpPr>
+      <p:sp>
+        <p:nvSpPr>
+          <p:cNvPr id="2" name="Title 1">
+            <a:extLst>
+              <a:ext uri="{FF2B5EF4-FFF2-40B4-BE49-F238E27FC236}">
+                <a16:creationId xmlns:a16="http://schemas.microsoft.com/office/drawing/2014/main" id="{BA09BDD9-7D1E-4259-96E0-B2A8216D87DB}"/>
+              </a:ext>
+            </a:extLst>
+          </p:cNvPr>
+          <p:cNvSpPr>
+            <a:spLocks noGrp="1"/>
+          </p:cNvSpPr>
+          <p:nvPr>
+            <p:ph type="title"/>
+          </p:nvPr>
+        </p:nvSpPr>
+        <p:spPr/>
+        <p:txBody>
+          <a:bodyPr/>
+          <a:lstStyle/>
+          <a:p>
+            <a:endParaRPr lang="en-US"/>
+          </a:p>
+        </p:txBody>
+      </p:sp>
+      <p:sp>
+        <p:nvSpPr>
+          <p:cNvPr id="3" name="Text Placeholder 2">
+            <a:extLst>
+              <a:ext uri="{FF2B5EF4-FFF2-40B4-BE49-F238E27FC236}">
+                <a16:creationId xmlns:a16="http://schemas.microsoft.com/office/drawing/2014/main" id="{EC45169A-7263-4AAA-BC66-240E56794933}"/>
+              </a:ext>
+            </a:extLst>
+          </p:cNvPr>
+          <p:cNvSpPr>
+            <a:spLocks noGrp="1"/>
+          </p:cNvSpPr>
+          <p:nvPr>
+            <p:ph type="body"/>
+          </p:nvPr>
+        </p:nvSpPr>
+        <p:spPr/>
+        <p:txBody>
+          <a:bodyPr/>
+          <a:lstStyle/>
+          <a:p>
+            <a:endParaRPr lang="en-US"/>
+          </a:p>
+        </p:txBody>
+      </p:sp>
+    </p:spTree>
+    <p:extLst>
+      <p:ext uri="{BB962C8B-B14F-4D97-AF65-F5344CB8AC3E}">
+        <p14:creationId xmlns:p14="http://schemas.microsoft.com/office/powerpoint/2010/main" val="696345624"/>
+      </p:ext>
+    </p:extLst>
+  </p:cSld>
+  <p:clrMapOvr>
+    <a:masterClrMapping/>
+  </p:clrMapOvr>
+</p:sld>
+</file>
+
+<file path=ppt/slides/slide14.xml><?xml version="1.0" encoding="utf-8"?>
+<p:sld xmlns:a="http://schemas.openxmlformats.org/drawingml/2006/main" xmlns:r="http://schemas.openxmlformats.org/officeDocument/2006/relationships" xmlns:p="http://schemas.openxmlformats.org/presentationml/2006/main">
+  <p:cSld>
+    <p:spTree>
+      <p:nvGrpSpPr>
+        <p:cNvPr id="1" name=""/>
+        <p:cNvGrpSpPr/>
+        <p:nvPr/>
+      </p:nvGrpSpPr>
+      <p:grpSpPr>
+        <a:xfrm>
+          <a:off x="0" y="0"/>
+          <a:ext cx="0" cy="0"/>
+          <a:chOff x="0" y="0"/>
+          <a:chExt cx="0" cy="0"/>
+        </a:xfrm>
+      </p:grpSpPr>
+      <p:sp>
+        <p:nvSpPr>
+          <p:cNvPr id="254" name="TextShape 1"/>
+          <p:cNvSpPr txBox="1"/>
+          <p:nvPr/>
+        </p:nvSpPr>
+        <p:spPr>
+          <a:xfrm>
+            <a:off x="2703869" y="205560"/>
+            <a:ext cx="5548465" cy="1234800"/>
+          </a:xfrm>
+          <a:prstGeom prst="rect">
+            <a:avLst/>
+          </a:prstGeom>
+          <a:noFill/>
+          <a:ln>
+            <a:noFill/>
+          </a:ln>
+        </p:spPr>
+        <p:txBody>
+          <a:bodyPr lIns="0" tIns="0" rIns="0" bIns="0" anchor="ctr">
+            <a:noAutofit/>
+          </a:bodyPr>
+          <a:lstStyle/>
+          <a:p>
+            <a:pPr algn="r">
+              <a:lnSpc>
+                <a:spcPct val="100000"/>
+              </a:lnSpc>
+            </a:pPr>
+            <a:r>
+              <a:rPr lang="en-US" sz="5400" spc="-1" dirty="0">
+                <a:solidFill>
+                  <a:srgbClr val="4F81BD"/>
+                </a:solidFill>
+                <a:latin typeface="Trebuchet MS"/>
+              </a:rPr>
+              <a:t>Projects and Use</a:t>
+            </a:r>
+            <a:endParaRPr lang="en-US" sz="5400" b="0" strike="noStrike" spc="-1" dirty="0">
+              <a:solidFill>
+                <a:srgbClr val="000000"/>
+              </a:solidFill>
+              <a:latin typeface="Arial"/>
+            </a:endParaRPr>
+          </a:p>
+        </p:txBody>
+      </p:sp>
+      <p:pic>
+        <p:nvPicPr>
+          <p:cNvPr id="3" name="Picture 2">
+            <a:extLst>
+              <a:ext uri="{FF2B5EF4-FFF2-40B4-BE49-F238E27FC236}">
+                <a16:creationId xmlns:a16="http://schemas.microsoft.com/office/drawing/2014/main" id="{B1A87303-3A93-4E1A-8215-1805345B4A03}"/>
+              </a:ext>
+            </a:extLst>
+          </p:cNvPr>
+          <p:cNvPicPr>
+            <a:picLocks noChangeAspect="1"/>
+          </p:cNvPicPr>
+          <p:nvPr/>
+        </p:nvPicPr>
+        <p:blipFill>
+          <a:blip r:embed="rId2"/>
+          <a:stretch>
+            <a:fillRect/>
+          </a:stretch>
+        </p:blipFill>
+        <p:spPr>
+          <a:xfrm>
+            <a:off x="839910" y="1555359"/>
+            <a:ext cx="4954603" cy="4212738"/>
+          </a:xfrm>
+          <a:prstGeom prst="rect">
+            <a:avLst/>
+          </a:prstGeom>
+        </p:spPr>
+      </p:pic>
+      <p:pic>
+        <p:nvPicPr>
+          <p:cNvPr id="5" name="Picture 4">
+            <a:extLst>
+              <a:ext uri="{FF2B5EF4-FFF2-40B4-BE49-F238E27FC236}">
+                <a16:creationId xmlns:a16="http://schemas.microsoft.com/office/drawing/2014/main" id="{C6FCF48D-0C50-46C5-A636-8863F1A59132}"/>
+              </a:ext>
+            </a:extLst>
+          </p:cNvPr>
+          <p:cNvPicPr>
+            <a:picLocks noChangeAspect="1"/>
+          </p:cNvPicPr>
+          <p:nvPr/>
+        </p:nvPicPr>
+        <p:blipFill>
+          <a:blip r:embed="rId3"/>
+          <a:stretch>
+            <a:fillRect/>
+          </a:stretch>
+        </p:blipFill>
+        <p:spPr>
+          <a:xfrm>
+            <a:off x="6556514" y="1513247"/>
+            <a:ext cx="2637181" cy="4336304"/>
+          </a:xfrm>
+          <a:prstGeom prst="rect">
+            <a:avLst/>
+          </a:prstGeom>
+        </p:spPr>
+      </p:pic>
+    </p:spTree>
+    <p:extLst>
+      <p:ext uri="{BB962C8B-B14F-4D97-AF65-F5344CB8AC3E}">
+        <p14:creationId xmlns:p14="http://schemas.microsoft.com/office/powerpoint/2010/main" val="3595425988"/>
+      </p:ext>
+    </p:extLst>
+  </p:cSld>
+  <p:clrMapOvr>
+    <a:masterClrMapping/>
+  </p:clrMapOvr>
+</p:sld>
+</file>
+
+<file path=ppt/slides/slide15.xml><?xml version="1.0" encoding="utf-8"?>
+<p:sld xmlns:a="http://schemas.openxmlformats.org/drawingml/2006/main" xmlns:r="http://schemas.openxmlformats.org/officeDocument/2006/relationships" xmlns:p="http://schemas.openxmlformats.org/presentationml/2006/main">
+  <p:cSld>
+    <p:spTree>
+      <p:nvGrpSpPr>
+        <p:cNvPr id="1" name=""/>
+        <p:cNvGrpSpPr/>
+        <p:nvPr/>
+      </p:nvGrpSpPr>
+      <p:grpSpPr>
+        <a:xfrm>
+          <a:off x="0" y="0"/>
+          <a:ext cx="0" cy="0"/>
+          <a:chOff x="0" y="0"/>
+          <a:chExt cx="0" cy="0"/>
+        </a:xfrm>
+      </p:grpSpPr>
+      <p:sp>
+        <p:nvSpPr>
           <p:cNvPr id="254" name="TextShape 1"/>
           <p:cNvSpPr txBox="1"/>
           <p:nvPr/>
@@ -13590,6 +14188,263 @@
     <p:extLst>
       <p:ext uri="{BB962C8B-B14F-4D97-AF65-F5344CB8AC3E}">
         <p14:creationId xmlns:p14="http://schemas.microsoft.com/office/powerpoint/2010/main" val="217188212"/>
+      </p:ext>
+    </p:extLst>
+  </p:cSld>
+  <p:clrMapOvr>
+    <a:masterClrMapping/>
+  </p:clrMapOvr>
+</p:sld>
+</file>
+
+<file path=ppt/slides/slide16.xml><?xml version="1.0" encoding="utf-8"?>
+<p:sld xmlns:a="http://schemas.openxmlformats.org/drawingml/2006/main" xmlns:r="http://schemas.openxmlformats.org/officeDocument/2006/relationships" xmlns:p="http://schemas.openxmlformats.org/presentationml/2006/main">
+  <p:cSld>
+    <p:spTree>
+      <p:nvGrpSpPr>
+        <p:cNvPr id="1" name=""/>
+        <p:cNvGrpSpPr/>
+        <p:nvPr/>
+      </p:nvGrpSpPr>
+      <p:grpSpPr>
+        <a:xfrm>
+          <a:off x="0" y="0"/>
+          <a:ext cx="0" cy="0"/>
+          <a:chOff x="0" y="0"/>
+          <a:chExt cx="0" cy="0"/>
+        </a:xfrm>
+      </p:grpSpPr>
+      <p:sp>
+        <p:nvSpPr>
+          <p:cNvPr id="242" name="CustomShape 1"/>
+          <p:cNvSpPr/>
+          <p:nvPr/>
+        </p:nvSpPr>
+        <p:spPr>
+          <a:xfrm>
+            <a:off x="1062360" y="159840"/>
+            <a:ext cx="7766280" cy="2382840"/>
+          </a:xfrm>
+          <a:prstGeom prst="rect">
+            <a:avLst/>
+          </a:prstGeom>
+          <a:noFill/>
+          <a:ln>
+            <a:noFill/>
+          </a:ln>
+        </p:spPr>
+        <p:style>
+          <a:lnRef idx="0">
+            <a:scrgbClr r="0" g="0" b="0"/>
+          </a:lnRef>
+          <a:fillRef idx="0">
+            <a:scrgbClr r="0" g="0" b="0"/>
+          </a:fillRef>
+          <a:effectRef idx="0">
+            <a:scrgbClr r="0" g="0" b="0"/>
+          </a:effectRef>
+          <a:fontRef idx="minor"/>
+        </p:style>
+        <p:txBody>
+          <a:bodyPr lIns="90000" tIns="45000" rIns="90000" bIns="45000" anchor="t">
+            <a:noAutofit/>
+          </a:bodyPr>
+          <a:lstStyle/>
+          <a:p>
+            <a:pPr algn="ctr">
+              <a:lnSpc>
+                <a:spcPct val="100000"/>
+              </a:lnSpc>
+            </a:pPr>
+            <a:r>
+              <a:rPr lang="en-US" sz="5400" b="0" strike="noStrike" spc="-1" dirty="0">
+                <a:solidFill>
+                  <a:srgbClr val="4F81BD"/>
+                </a:solidFill>
+                <a:latin typeface="Trebuchet MS"/>
+                <a:ea typeface="DejaVu Sans"/>
+              </a:rPr>
+              <a:t>References</a:t>
+            </a:r>
+            <a:endParaRPr lang="en-US" sz="5400" b="0" strike="noStrike" spc="-1" dirty="0">
+              <a:latin typeface="Arial"/>
+            </a:endParaRPr>
+          </a:p>
+        </p:txBody>
+      </p:sp>
+      <p:sp>
+        <p:nvSpPr>
+          <p:cNvPr id="3" name="TextBox 2">
+            <a:extLst>
+              <a:ext uri="{FF2B5EF4-FFF2-40B4-BE49-F238E27FC236}">
+                <a16:creationId xmlns:a16="http://schemas.microsoft.com/office/drawing/2014/main" id="{994EA9DB-D7C0-4EB0-8DF1-ADAD201E47E2}"/>
+              </a:ext>
+            </a:extLst>
+          </p:cNvPr>
+          <p:cNvSpPr txBox="1"/>
+          <p:nvPr/>
+        </p:nvSpPr>
+        <p:spPr>
+          <a:xfrm>
+            <a:off x="747131" y="1351462"/>
+            <a:ext cx="7638585" cy="3693319"/>
+          </a:xfrm>
+          <a:prstGeom prst="rect">
+            <a:avLst/>
+          </a:prstGeom>
+          <a:noFill/>
+        </p:spPr>
+        <p:txBody>
+          <a:bodyPr wrap="square" rtlCol="0">
+            <a:spAutoFit/>
+          </a:bodyPr>
+          <a:lstStyle/>
+          <a:p>
+            <a:r>
+              <a:rPr lang="en-US" dirty="0"/>
+              <a:t>[1] </a:t>
+            </a:r>
+            <a:r>
+              <a:rPr lang="en-US" dirty="0" err="1"/>
+              <a:t>Felleisen</a:t>
+            </a:r>
+            <a:r>
+              <a:rPr lang="en-US" dirty="0"/>
+              <a:t>, Matthias, et al. "The racket manifesto." </a:t>
+            </a:r>
+            <a:r>
+              <a:rPr lang="en-US" i="1" dirty="0"/>
+              <a:t>1st Summit on Advances in Programming Languages (SNAPL 2015)</a:t>
+            </a:r>
+            <a:r>
+              <a:rPr lang="en-US" dirty="0"/>
+              <a:t>. Schloss </a:t>
+            </a:r>
+            <a:r>
+              <a:rPr lang="en-US" dirty="0" err="1"/>
+              <a:t>Dagstuhl</a:t>
+            </a:r>
+            <a:r>
+              <a:rPr lang="en-US" dirty="0"/>
+              <a:t>-Leibniz-</a:t>
+            </a:r>
+            <a:r>
+              <a:rPr lang="en-US" dirty="0" err="1"/>
+              <a:t>Zentrum</a:t>
+            </a:r>
+            <a:r>
+              <a:rPr lang="en-US" dirty="0"/>
+              <a:t> </a:t>
+            </a:r>
+            <a:r>
+              <a:rPr lang="en-US" dirty="0" err="1"/>
+              <a:t>fuer</a:t>
+            </a:r>
+            <a:r>
+              <a:rPr lang="en-US" dirty="0"/>
+              <a:t> </a:t>
+            </a:r>
+            <a:r>
+              <a:rPr lang="en-US" dirty="0" err="1"/>
+              <a:t>Informatik</a:t>
+            </a:r>
+            <a:r>
+              <a:rPr lang="en-US" dirty="0"/>
+              <a:t>, 2015.</a:t>
+            </a:r>
+          </a:p>
+          <a:p>
+            <a:endParaRPr lang="en-US" dirty="0"/>
+          </a:p>
+          <a:p>
+            <a:r>
+              <a:rPr lang="en-US" dirty="0"/>
+              <a:t>[2] </a:t>
+            </a:r>
+            <a:r>
+              <a:rPr lang="en-US" dirty="0" err="1"/>
+              <a:t>Felleisen</a:t>
+            </a:r>
+            <a:r>
+              <a:rPr lang="en-US" dirty="0"/>
+              <a:t>, Matthias, et al. "A programmable programming language." </a:t>
+            </a:r>
+            <a:r>
+              <a:rPr lang="en-US" i="1" dirty="0"/>
+              <a:t>Communications of the ACM</a:t>
+            </a:r>
+            <a:r>
+              <a:rPr lang="en-US" dirty="0"/>
+              <a:t> 61.3 (2018): 62-71.</a:t>
+            </a:r>
+          </a:p>
+          <a:p>
+            <a:endParaRPr lang="en-US" dirty="0"/>
+          </a:p>
+          <a:p>
+            <a:r>
+              <a:rPr lang="en-US" dirty="0"/>
+              <a:t>[3] </a:t>
+            </a:r>
+            <a:r>
+              <a:rPr lang="en-US" dirty="0" err="1"/>
+              <a:t>Findler</a:t>
+            </a:r>
+            <a:r>
+              <a:rPr lang="en-US" dirty="0"/>
+              <a:t>, Robert Bruce, et al. "</a:t>
+            </a:r>
+            <a:r>
+              <a:rPr lang="en-US" dirty="0" err="1"/>
+              <a:t>DrScheme</a:t>
+            </a:r>
+            <a:r>
+              <a:rPr lang="en-US" dirty="0"/>
+              <a:t>: A programming environment for Scheme." </a:t>
+            </a:r>
+            <a:r>
+              <a:rPr lang="en-US" i="1" dirty="0"/>
+              <a:t>Journal of functional programming</a:t>
+            </a:r>
+            <a:r>
+              <a:rPr lang="en-US" dirty="0"/>
+              <a:t> 12.2 (2002): 159.</a:t>
+            </a:r>
+          </a:p>
+          <a:p>
+            <a:endParaRPr lang="en-US" dirty="0"/>
+          </a:p>
+          <a:p>
+            <a:r>
+              <a:rPr lang="en-US" dirty="0"/>
+              <a:t>[4] </a:t>
+            </a:r>
+            <a:r>
+              <a:rPr lang="de-DE" dirty="0"/>
+              <a:t>PLT. “PLT Scheme.” </a:t>
+            </a:r>
+            <a:r>
+              <a:rPr lang="de-DE" i="1" dirty="0"/>
+              <a:t>PLT Scheme</a:t>
+            </a:r>
+            <a:r>
+              <a:rPr lang="de-DE" dirty="0"/>
+              <a:t>, PLT, 1 Apr. 2010, plt-scheme.org</a:t>
+            </a:r>
+            <a:endParaRPr lang="en-US" dirty="0"/>
+          </a:p>
+          <a:p>
+            <a:endParaRPr lang="en-US" dirty="0"/>
+          </a:p>
+          <a:p>
+            <a:endParaRPr lang="en-US" dirty="0"/>
+          </a:p>
+        </p:txBody>
+      </p:sp>
+    </p:spTree>
+    <p:extLst>
+      <p:ext uri="{BB962C8B-B14F-4D97-AF65-F5344CB8AC3E}">
+        <p14:creationId xmlns:p14="http://schemas.microsoft.com/office/powerpoint/2010/main" val="3838566077"/>
       </p:ext>
     </p:extLst>
   </p:cSld>
@@ -13648,6 +14503,894 @@
           <a:fontRef idx="minor"/>
         </p:style>
         <p:txBody>
+          <a:bodyPr lIns="90000" tIns="45000" rIns="90000" bIns="45000" anchor="t">
+            <a:noAutofit/>
+          </a:bodyPr>
+          <a:lstStyle/>
+          <a:p>
+            <a:pPr algn="ctr">
+              <a:lnSpc>
+                <a:spcPct val="100000"/>
+              </a:lnSpc>
+            </a:pPr>
+            <a:r>
+              <a:rPr lang="en-US" sz="5400" b="0" strike="noStrike" spc="-1" dirty="0">
+                <a:solidFill>
+                  <a:srgbClr val="4F81BD"/>
+                </a:solidFill>
+                <a:latin typeface="Trebuchet MS"/>
+                <a:ea typeface="DejaVu Sans"/>
+              </a:rPr>
+              <a:t>History of Racket</a:t>
+            </a:r>
+            <a:endParaRPr lang="en-US" sz="5400" b="0" strike="noStrike" spc="-1" dirty="0">
+              <a:latin typeface="Arial"/>
+            </a:endParaRPr>
+          </a:p>
+        </p:txBody>
+      </p:sp>
+      <p:sp>
+        <p:nvSpPr>
+          <p:cNvPr id="243" name="CustomShape 2"/>
+          <p:cNvSpPr/>
+          <p:nvPr/>
+        </p:nvSpPr>
+        <p:spPr>
+          <a:xfrm>
+            <a:off x="914400" y="1828800"/>
+            <a:ext cx="8926560" cy="3456000"/>
+          </a:xfrm>
+          <a:prstGeom prst="rect">
+            <a:avLst/>
+          </a:prstGeom>
+          <a:noFill/>
+          <a:ln>
+            <a:noFill/>
+          </a:ln>
+        </p:spPr>
+        <p:style>
+          <a:lnRef idx="0">
+            <a:scrgbClr r="0" g="0" b="0"/>
+          </a:lnRef>
+          <a:fillRef idx="0">
+            <a:scrgbClr r="0" g="0" b="0"/>
+          </a:fillRef>
+          <a:effectRef idx="0">
+            <a:scrgbClr r="0" g="0" b="0"/>
+          </a:effectRef>
+          <a:fontRef idx="minor"/>
+        </p:style>
+        <p:txBody>
+          <a:bodyPr lIns="90000" tIns="45000" rIns="90000" bIns="45000">
+            <a:normAutofit/>
+          </a:bodyPr>
+          <a:lstStyle/>
+          <a:p>
+            <a:pPr marL="285750" indent="-285750">
+              <a:lnSpc>
+                <a:spcPct val="100000"/>
+              </a:lnSpc>
+              <a:spcBef>
+                <a:spcPts val="1001"/>
+              </a:spcBef>
+              <a:buFont typeface="Arial" panose="020B0604020202020204" pitchFamily="34" charset="0"/>
+              <a:buChar char="•"/>
+              <a:tabLst>
+                <a:tab pos="0" algn="l"/>
+              </a:tabLst>
+            </a:pPr>
+            <a:r>
+              <a:rPr lang="en-US" sz="1800" b="0" strike="noStrike" spc="-1" dirty="0">
+                <a:latin typeface="Arial"/>
+              </a:rPr>
+              <a:t>Traces its roots back to the PLT Group, founded by </a:t>
+            </a:r>
+            <a:r>
+              <a:rPr lang="en-US" dirty="0"/>
+              <a:t>Matthias </a:t>
+            </a:r>
+            <a:r>
+              <a:rPr lang="en-US" dirty="0" err="1"/>
+              <a:t>Felleisen</a:t>
+            </a:r>
+            <a:r>
+              <a:rPr lang="en-US" dirty="0"/>
+              <a:t> [1]</a:t>
+            </a:r>
+          </a:p>
+          <a:p>
+            <a:pPr marL="285750" indent="-285750">
+              <a:lnSpc>
+                <a:spcPct val="100000"/>
+              </a:lnSpc>
+              <a:spcBef>
+                <a:spcPts val="1001"/>
+              </a:spcBef>
+              <a:buFont typeface="Arial" panose="020B0604020202020204" pitchFamily="34" charset="0"/>
+              <a:buChar char="•"/>
+              <a:tabLst>
+                <a:tab pos="0" algn="l"/>
+              </a:tabLst>
+            </a:pPr>
+            <a:r>
+              <a:rPr lang="en-US" sz="1800" b="0" strike="noStrike" spc="-1" dirty="0">
+                <a:latin typeface="Arial"/>
+              </a:rPr>
+              <a:t>PLT began producing educational material, and teaching high school students fundamentals of programming [1]</a:t>
+            </a:r>
+          </a:p>
+          <a:p>
+            <a:pPr marL="285750" indent="-285750">
+              <a:lnSpc>
+                <a:spcPct val="100000"/>
+              </a:lnSpc>
+              <a:spcBef>
+                <a:spcPts val="1001"/>
+              </a:spcBef>
+              <a:buFont typeface="Arial" panose="020B0604020202020204" pitchFamily="34" charset="0"/>
+              <a:buChar char="•"/>
+              <a:tabLst>
+                <a:tab pos="0" algn="l"/>
+              </a:tabLst>
+            </a:pPr>
+            <a:r>
+              <a:rPr lang="en-US" spc="-1" dirty="0">
+                <a:latin typeface="Arial"/>
+              </a:rPr>
+              <a:t>Originally offered material using the language “Scheme” [1]</a:t>
+            </a:r>
+          </a:p>
+          <a:p>
+            <a:pPr marL="285750" indent="-285750">
+              <a:lnSpc>
+                <a:spcPct val="100000"/>
+              </a:lnSpc>
+              <a:spcBef>
+                <a:spcPts val="1001"/>
+              </a:spcBef>
+              <a:buFont typeface="Arial" panose="020B0604020202020204" pitchFamily="34" charset="0"/>
+              <a:buChar char="•"/>
+              <a:tabLst>
+                <a:tab pos="0" algn="l"/>
+              </a:tabLst>
+            </a:pPr>
+            <a:r>
+              <a:rPr lang="en-US" sz="1800" b="0" strike="noStrike" spc="-1" dirty="0">
+                <a:latin typeface="Arial"/>
+              </a:rPr>
+              <a:t>PLT quickly identified several challenges [1]</a:t>
+            </a:r>
+          </a:p>
+          <a:p>
+            <a:pPr marL="742950" lvl="1" indent="-285750">
+              <a:spcBef>
+                <a:spcPts val="1001"/>
+              </a:spcBef>
+              <a:buFont typeface="Arial" panose="020B0604020202020204" pitchFamily="34" charset="0"/>
+              <a:buChar char="•"/>
+              <a:tabLst>
+                <a:tab pos="0" algn="l"/>
+              </a:tabLst>
+            </a:pPr>
+            <a:r>
+              <a:rPr lang="en-US" spc="-1" dirty="0">
+                <a:latin typeface="Arial"/>
+              </a:rPr>
+              <a:t>It’s impossible to teach the syntax of scheme, and then focus on the theory of programming within a short amount of time</a:t>
+            </a:r>
+          </a:p>
+          <a:p>
+            <a:pPr marL="742950" lvl="1" indent="-285750">
+              <a:spcBef>
+                <a:spcPts val="1001"/>
+              </a:spcBef>
+              <a:buFont typeface="Arial" panose="020B0604020202020204" pitchFamily="34" charset="0"/>
+              <a:buChar char="•"/>
+              <a:tabLst>
+                <a:tab pos="0" algn="l"/>
+              </a:tabLst>
+            </a:pPr>
+            <a:r>
+              <a:rPr lang="en-US" b="0" strike="noStrike" spc="-1" dirty="0">
+                <a:latin typeface="Arial"/>
+              </a:rPr>
+              <a:t>Professional-grade editors such as vi and emacs distract from the actual mission of teaching</a:t>
+            </a:r>
+          </a:p>
+        </p:txBody>
+      </p:sp>
+    </p:spTree>
+    <p:extLst>
+      <p:ext uri="{BB962C8B-B14F-4D97-AF65-F5344CB8AC3E}">
+        <p14:creationId xmlns:p14="http://schemas.microsoft.com/office/powerpoint/2010/main" val="3021897193"/>
+      </p:ext>
+    </p:extLst>
+  </p:cSld>
+  <p:clrMapOvr>
+    <a:masterClrMapping/>
+  </p:clrMapOvr>
+</p:sld>
+</file>
+
+<file path=ppt/slides/slide3.xml><?xml version="1.0" encoding="utf-8"?>
+<p:sld xmlns:a="http://schemas.openxmlformats.org/drawingml/2006/main" xmlns:r="http://schemas.openxmlformats.org/officeDocument/2006/relationships" xmlns:p="http://schemas.openxmlformats.org/presentationml/2006/main">
+  <p:cSld>
+    <p:spTree>
+      <p:nvGrpSpPr>
+        <p:cNvPr id="1" name=""/>
+        <p:cNvGrpSpPr/>
+        <p:nvPr/>
+      </p:nvGrpSpPr>
+      <p:grpSpPr>
+        <a:xfrm>
+          <a:off x="0" y="0"/>
+          <a:ext cx="0" cy="0"/>
+          <a:chOff x="0" y="0"/>
+          <a:chExt cx="0" cy="0"/>
+        </a:xfrm>
+      </p:grpSpPr>
+      <p:sp>
+        <p:nvSpPr>
+          <p:cNvPr id="242" name="CustomShape 1"/>
+          <p:cNvSpPr/>
+          <p:nvPr/>
+        </p:nvSpPr>
+        <p:spPr>
+          <a:xfrm>
+            <a:off x="1062360" y="159840"/>
+            <a:ext cx="7766280" cy="2382840"/>
+          </a:xfrm>
+          <a:prstGeom prst="rect">
+            <a:avLst/>
+          </a:prstGeom>
+          <a:noFill/>
+          <a:ln>
+            <a:noFill/>
+          </a:ln>
+        </p:spPr>
+        <p:style>
+          <a:lnRef idx="0">
+            <a:scrgbClr r="0" g="0" b="0"/>
+          </a:lnRef>
+          <a:fillRef idx="0">
+            <a:scrgbClr r="0" g="0" b="0"/>
+          </a:fillRef>
+          <a:effectRef idx="0">
+            <a:scrgbClr r="0" g="0" b="0"/>
+          </a:effectRef>
+          <a:fontRef idx="minor"/>
+        </p:style>
+        <p:txBody>
+          <a:bodyPr lIns="90000" tIns="45000" rIns="90000" bIns="45000" anchor="t">
+            <a:noAutofit/>
+          </a:bodyPr>
+          <a:lstStyle/>
+          <a:p>
+            <a:pPr algn="ctr">
+              <a:lnSpc>
+                <a:spcPct val="100000"/>
+              </a:lnSpc>
+            </a:pPr>
+            <a:r>
+              <a:rPr lang="en-US" sz="5400" b="0" strike="noStrike" spc="-1" dirty="0">
+                <a:solidFill>
+                  <a:srgbClr val="4F81BD"/>
+                </a:solidFill>
+                <a:latin typeface="Trebuchet MS"/>
+                <a:ea typeface="DejaVu Sans"/>
+              </a:rPr>
+              <a:t>History of Racket</a:t>
+            </a:r>
+            <a:endParaRPr lang="en-US" sz="5400" b="0" strike="noStrike" spc="-1" dirty="0">
+              <a:latin typeface="Arial"/>
+            </a:endParaRPr>
+          </a:p>
+        </p:txBody>
+      </p:sp>
+      <p:sp>
+        <p:nvSpPr>
+          <p:cNvPr id="243" name="CustomShape 2"/>
+          <p:cNvSpPr/>
+          <p:nvPr/>
+        </p:nvSpPr>
+        <p:spPr>
+          <a:xfrm>
+            <a:off x="914400" y="1828800"/>
+            <a:ext cx="8926560" cy="3456000"/>
+          </a:xfrm>
+          <a:prstGeom prst="rect">
+            <a:avLst/>
+          </a:prstGeom>
+          <a:noFill/>
+          <a:ln>
+            <a:noFill/>
+          </a:ln>
+        </p:spPr>
+        <p:style>
+          <a:lnRef idx="0">
+            <a:scrgbClr r="0" g="0" b="0"/>
+          </a:lnRef>
+          <a:fillRef idx="0">
+            <a:scrgbClr r="0" g="0" b="0"/>
+          </a:fillRef>
+          <a:effectRef idx="0">
+            <a:scrgbClr r="0" g="0" b="0"/>
+          </a:effectRef>
+          <a:fontRef idx="minor"/>
+        </p:style>
+        <p:txBody>
+          <a:bodyPr lIns="90000" tIns="45000" rIns="90000" bIns="45000">
+            <a:normAutofit/>
+          </a:bodyPr>
+          <a:lstStyle/>
+          <a:p>
+            <a:pPr marL="285750" indent="-285750">
+              <a:lnSpc>
+                <a:spcPct val="100000"/>
+              </a:lnSpc>
+              <a:spcBef>
+                <a:spcPts val="1001"/>
+              </a:spcBef>
+              <a:buFont typeface="Arial" panose="020B0604020202020204" pitchFamily="34" charset="0"/>
+              <a:buChar char="•"/>
+              <a:tabLst>
+                <a:tab pos="0" algn="l"/>
+              </a:tabLst>
+            </a:pPr>
+            <a:r>
+              <a:rPr lang="en-US" b="0" strike="noStrike" spc="-1" dirty="0">
+                <a:latin typeface="Arial"/>
+              </a:rPr>
+              <a:t>PLT began developing its own simplified dialect of Scheme: PLT Scheme</a:t>
+            </a:r>
+          </a:p>
+          <a:p>
+            <a:pPr marL="285750" indent="-285750">
+              <a:lnSpc>
+                <a:spcPct val="100000"/>
+              </a:lnSpc>
+              <a:spcBef>
+                <a:spcPts val="1001"/>
+              </a:spcBef>
+              <a:buFont typeface="Arial" panose="020B0604020202020204" pitchFamily="34" charset="0"/>
+              <a:buChar char="•"/>
+              <a:tabLst>
+                <a:tab pos="0" algn="l"/>
+              </a:tabLst>
+            </a:pPr>
+            <a:r>
+              <a:rPr lang="en-US" spc="-1" dirty="0">
+                <a:latin typeface="Arial"/>
+              </a:rPr>
+              <a:t>Simultaneously began developing an education focused IDE: </a:t>
+            </a:r>
+            <a:r>
+              <a:rPr lang="en-US" spc="-1" dirty="0" err="1">
+                <a:latin typeface="Arial"/>
+              </a:rPr>
+              <a:t>DrScheme</a:t>
+            </a:r>
+            <a:endParaRPr lang="en-US" spc="-1" dirty="0">
+              <a:latin typeface="Arial"/>
+            </a:endParaRPr>
+          </a:p>
+          <a:p>
+            <a:pPr marL="285750" indent="-285750">
+              <a:lnSpc>
+                <a:spcPct val="100000"/>
+              </a:lnSpc>
+              <a:spcBef>
+                <a:spcPts val="1001"/>
+              </a:spcBef>
+              <a:buFont typeface="Arial" panose="020B0604020202020204" pitchFamily="34" charset="0"/>
+              <a:buChar char="•"/>
+              <a:tabLst>
+                <a:tab pos="0" algn="l"/>
+              </a:tabLst>
+            </a:pPr>
+            <a:r>
+              <a:rPr lang="en-US" b="0" strike="noStrike" spc="-1" dirty="0">
+                <a:latin typeface="Arial"/>
+              </a:rPr>
+              <a:t>The development on </a:t>
+            </a:r>
+            <a:r>
+              <a:rPr lang="en-US" b="0" strike="noStrike" spc="-1" dirty="0" err="1">
+                <a:latin typeface="Arial"/>
+              </a:rPr>
+              <a:t>DrScheme</a:t>
+            </a:r>
+            <a:r>
+              <a:rPr lang="en-US" b="0" strike="noStrike" spc="-1" dirty="0">
+                <a:latin typeface="Arial"/>
+              </a:rPr>
+              <a:t> (which was written in PLT Scheme) influenced the design of PLT Scheme. [2]</a:t>
+            </a:r>
+          </a:p>
+        </p:txBody>
+      </p:sp>
+      <p:grpSp>
+        <p:nvGrpSpPr>
+          <p:cNvPr id="3" name="Group 2">
+            <a:extLst>
+              <a:ext uri="{FF2B5EF4-FFF2-40B4-BE49-F238E27FC236}">
+                <a16:creationId xmlns:a16="http://schemas.microsoft.com/office/drawing/2014/main" id="{9CBF700D-676C-47B3-8ECB-9F2E88D9BDE1}"/>
+              </a:ext>
+            </a:extLst>
+          </p:cNvPr>
+          <p:cNvGrpSpPr/>
+          <p:nvPr/>
+        </p:nvGrpSpPr>
+        <p:grpSpPr>
+          <a:xfrm>
+            <a:off x="7829303" y="3237138"/>
+            <a:ext cx="1493117" cy="1089986"/>
+            <a:chOff x="7512179" y="4382471"/>
+            <a:chExt cx="1493117" cy="1089986"/>
+          </a:xfrm>
+        </p:grpSpPr>
+        <p:pic>
+          <p:nvPicPr>
+            <p:cNvPr id="1026" name="Picture 2" descr="[logo]">
+              <a:extLst>
+                <a:ext uri="{FF2B5EF4-FFF2-40B4-BE49-F238E27FC236}">
+                  <a16:creationId xmlns:a16="http://schemas.microsoft.com/office/drawing/2014/main" id="{9A955AA3-1844-4CFA-9275-A7123EF7A99D}"/>
+                </a:ext>
+              </a:extLst>
+            </p:cNvPr>
+            <p:cNvPicPr>
+              <a:picLocks noChangeAspect="1" noChangeArrowheads="1"/>
+            </p:cNvPicPr>
+            <p:nvPr/>
+          </p:nvPicPr>
+          <p:blipFill>
+            <a:blip r:embed="rId2">
+              <a:extLst>
+                <a:ext uri="{28A0092B-C50C-407E-A947-70E740481C1C}">
+                  <a14:useLocalDpi xmlns:a14="http://schemas.microsoft.com/office/drawing/2010/main" val="0"/>
+                </a:ext>
+              </a:extLst>
+            </a:blip>
+            <a:srcRect/>
+            <a:stretch>
+              <a:fillRect/>
+            </a:stretch>
+          </p:blipFill>
+          <p:spPr bwMode="auto">
+            <a:xfrm>
+              <a:off x="7745397" y="4382471"/>
+              <a:ext cx="838200" cy="809625"/>
+            </a:xfrm>
+            <a:prstGeom prst="rect">
+              <a:avLst/>
+            </a:prstGeom>
+            <a:noFill/>
+            <a:extLst>
+              <a:ext uri="{909E8E84-426E-40DD-AFC4-6F175D3DCCD1}">
+                <a14:hiddenFill xmlns:a14="http://schemas.microsoft.com/office/drawing/2010/main">
+                  <a:solidFill>
+                    <a:srgbClr val="FFFFFF"/>
+                  </a:solidFill>
+                </a14:hiddenFill>
+              </a:ext>
+            </a:extLst>
+          </p:spPr>
+        </p:pic>
+        <p:sp>
+          <p:nvSpPr>
+            <p:cNvPr id="2" name="TextBox 1">
+              <a:extLst>
+                <a:ext uri="{FF2B5EF4-FFF2-40B4-BE49-F238E27FC236}">
+                  <a16:creationId xmlns:a16="http://schemas.microsoft.com/office/drawing/2014/main" id="{81E28558-2C81-4A52-AFC3-D1FF4DF20095}"/>
+                </a:ext>
+              </a:extLst>
+            </p:cNvPr>
+            <p:cNvSpPr txBox="1"/>
+            <p:nvPr/>
+          </p:nvSpPr>
+          <p:spPr>
+            <a:xfrm>
+              <a:off x="7512179" y="5226236"/>
+              <a:ext cx="1493117" cy="246221"/>
+            </a:xfrm>
+            <a:prstGeom prst="rect">
+              <a:avLst/>
+            </a:prstGeom>
+            <a:noFill/>
+          </p:spPr>
+          <p:txBody>
+            <a:bodyPr wrap="square" rtlCol="0">
+              <a:spAutoFit/>
+            </a:bodyPr>
+            <a:lstStyle/>
+            <a:p>
+              <a:r>
+                <a:rPr lang="en-US" sz="1000" dirty="0"/>
+                <a:t>PLT Scheme’s logo [4]</a:t>
+              </a:r>
+            </a:p>
+          </p:txBody>
+        </p:sp>
+      </p:grpSp>
+      <p:grpSp>
+        <p:nvGrpSpPr>
+          <p:cNvPr id="6" name="Group 5">
+            <a:extLst>
+              <a:ext uri="{FF2B5EF4-FFF2-40B4-BE49-F238E27FC236}">
+                <a16:creationId xmlns:a16="http://schemas.microsoft.com/office/drawing/2014/main" id="{195CC72C-8E3B-4F64-96C4-54643410E335}"/>
+              </a:ext>
+            </a:extLst>
+          </p:cNvPr>
+          <p:cNvGrpSpPr/>
+          <p:nvPr/>
+        </p:nvGrpSpPr>
+        <p:grpSpPr>
+          <a:xfrm>
+            <a:off x="3923070" y="3237138"/>
+            <a:ext cx="3700539" cy="3072755"/>
+            <a:chOff x="3910225" y="3703574"/>
+            <a:chExt cx="3700539" cy="3072755"/>
+          </a:xfrm>
+        </p:grpSpPr>
+        <p:pic>
+          <p:nvPicPr>
+            <p:cNvPr id="4" name="Picture 3">
+              <a:extLst>
+                <a:ext uri="{FF2B5EF4-FFF2-40B4-BE49-F238E27FC236}">
+                  <a16:creationId xmlns:a16="http://schemas.microsoft.com/office/drawing/2014/main" id="{B82BDD71-44AA-49D1-A8FD-530D563D6834}"/>
+                </a:ext>
+              </a:extLst>
+            </p:cNvPr>
+            <p:cNvPicPr>
+              <a:picLocks noChangeAspect="1"/>
+            </p:cNvPicPr>
+            <p:nvPr/>
+          </p:nvPicPr>
+          <p:blipFill>
+            <a:blip r:embed="rId3"/>
+            <a:stretch>
+              <a:fillRect/>
+            </a:stretch>
+          </p:blipFill>
+          <p:spPr>
+            <a:xfrm>
+              <a:off x="3910225" y="3703574"/>
+              <a:ext cx="3700539" cy="2733980"/>
+            </a:xfrm>
+            <a:prstGeom prst="rect">
+              <a:avLst/>
+            </a:prstGeom>
+          </p:spPr>
+        </p:pic>
+        <p:sp>
+          <p:nvSpPr>
+            <p:cNvPr id="5" name="TextBox 4">
+              <a:extLst>
+                <a:ext uri="{FF2B5EF4-FFF2-40B4-BE49-F238E27FC236}">
+                  <a16:creationId xmlns:a16="http://schemas.microsoft.com/office/drawing/2014/main" id="{5AEDABE7-4EC7-4FEA-9A1E-9193EFC93B5A}"/>
+                </a:ext>
+              </a:extLst>
+            </p:cNvPr>
+            <p:cNvSpPr txBox="1"/>
+            <p:nvPr/>
+          </p:nvSpPr>
+          <p:spPr>
+            <a:xfrm>
+              <a:off x="4924603" y="6530108"/>
+              <a:ext cx="1942854" cy="246221"/>
+            </a:xfrm>
+            <a:prstGeom prst="rect">
+              <a:avLst/>
+            </a:prstGeom>
+            <a:noFill/>
+          </p:spPr>
+          <p:txBody>
+            <a:bodyPr wrap="square" rtlCol="0">
+              <a:spAutoFit/>
+            </a:bodyPr>
+            <a:lstStyle/>
+            <a:p>
+              <a:r>
+                <a:rPr lang="en-US" sz="1000" dirty="0"/>
+                <a:t>Screenshot of </a:t>
+              </a:r>
+              <a:r>
+                <a:rPr lang="en-US" sz="1000" dirty="0" err="1"/>
+                <a:t>DrScheme</a:t>
+              </a:r>
+              <a:r>
+                <a:rPr lang="en-US" sz="1000" dirty="0"/>
+                <a:t> [3]</a:t>
+              </a:r>
+            </a:p>
+          </p:txBody>
+        </p:sp>
+      </p:grpSp>
+    </p:spTree>
+    <p:extLst>
+      <p:ext uri="{BB962C8B-B14F-4D97-AF65-F5344CB8AC3E}">
+        <p14:creationId xmlns:p14="http://schemas.microsoft.com/office/powerpoint/2010/main" val="2609085121"/>
+      </p:ext>
+    </p:extLst>
+  </p:cSld>
+  <p:clrMapOvr>
+    <a:masterClrMapping/>
+  </p:clrMapOvr>
+</p:sld>
+</file>
+
+<file path=ppt/slides/slide4.xml><?xml version="1.0" encoding="utf-8"?>
+<p:sld xmlns:a="http://schemas.openxmlformats.org/drawingml/2006/main" xmlns:r="http://schemas.openxmlformats.org/officeDocument/2006/relationships" xmlns:p="http://schemas.openxmlformats.org/presentationml/2006/main">
+  <p:cSld>
+    <p:spTree>
+      <p:nvGrpSpPr>
+        <p:cNvPr id="1" name=""/>
+        <p:cNvGrpSpPr/>
+        <p:nvPr/>
+      </p:nvGrpSpPr>
+      <p:grpSpPr>
+        <a:xfrm>
+          <a:off x="0" y="0"/>
+          <a:ext cx="0" cy="0"/>
+          <a:chOff x="0" y="0"/>
+          <a:chExt cx="0" cy="0"/>
+        </a:xfrm>
+      </p:grpSpPr>
+      <p:sp>
+        <p:nvSpPr>
+          <p:cNvPr id="242" name="CustomShape 1"/>
+          <p:cNvSpPr/>
+          <p:nvPr/>
+        </p:nvSpPr>
+        <p:spPr>
+          <a:xfrm>
+            <a:off x="1062360" y="159840"/>
+            <a:ext cx="7766280" cy="2382840"/>
+          </a:xfrm>
+          <a:prstGeom prst="rect">
+            <a:avLst/>
+          </a:prstGeom>
+          <a:noFill/>
+          <a:ln>
+            <a:noFill/>
+          </a:ln>
+        </p:spPr>
+        <p:style>
+          <a:lnRef idx="0">
+            <a:scrgbClr r="0" g="0" b="0"/>
+          </a:lnRef>
+          <a:fillRef idx="0">
+            <a:scrgbClr r="0" g="0" b="0"/>
+          </a:fillRef>
+          <a:effectRef idx="0">
+            <a:scrgbClr r="0" g="0" b="0"/>
+          </a:effectRef>
+          <a:fontRef idx="minor"/>
+        </p:style>
+        <p:txBody>
+          <a:bodyPr lIns="90000" tIns="45000" rIns="90000" bIns="45000" anchor="t">
+            <a:noAutofit/>
+          </a:bodyPr>
+          <a:lstStyle/>
+          <a:p>
+            <a:pPr algn="ctr">
+              <a:lnSpc>
+                <a:spcPct val="100000"/>
+              </a:lnSpc>
+            </a:pPr>
+            <a:r>
+              <a:rPr lang="en-US" sz="5400" b="0" strike="noStrike" spc="-1" dirty="0">
+                <a:solidFill>
+                  <a:srgbClr val="4F81BD"/>
+                </a:solidFill>
+                <a:latin typeface="Trebuchet MS"/>
+                <a:ea typeface="DejaVu Sans"/>
+              </a:rPr>
+              <a:t>History of Racket</a:t>
+            </a:r>
+            <a:endParaRPr lang="en-US" sz="5400" b="0" strike="noStrike" spc="-1" dirty="0">
+              <a:latin typeface="Arial"/>
+            </a:endParaRPr>
+          </a:p>
+        </p:txBody>
+      </p:sp>
+      <p:sp>
+        <p:nvSpPr>
+          <p:cNvPr id="243" name="CustomShape 2"/>
+          <p:cNvSpPr/>
+          <p:nvPr/>
+        </p:nvSpPr>
+        <p:spPr>
+          <a:xfrm>
+            <a:off x="914400" y="1828800"/>
+            <a:ext cx="8926560" cy="3456000"/>
+          </a:xfrm>
+          <a:prstGeom prst="rect">
+            <a:avLst/>
+          </a:prstGeom>
+          <a:noFill/>
+          <a:ln>
+            <a:noFill/>
+          </a:ln>
+        </p:spPr>
+        <p:style>
+          <a:lnRef idx="0">
+            <a:scrgbClr r="0" g="0" b="0"/>
+          </a:lnRef>
+          <a:fillRef idx="0">
+            <a:scrgbClr r="0" g="0" b="0"/>
+          </a:fillRef>
+          <a:effectRef idx="0">
+            <a:scrgbClr r="0" g="0" b="0"/>
+          </a:effectRef>
+          <a:fontRef idx="minor"/>
+        </p:style>
+        <p:txBody>
+          <a:bodyPr lIns="90000" tIns="45000" rIns="90000" bIns="45000">
+            <a:normAutofit/>
+          </a:bodyPr>
+          <a:lstStyle/>
+          <a:p>
+            <a:pPr marL="285750" indent="-285750">
+              <a:spcBef>
+                <a:spcPts val="1001"/>
+              </a:spcBef>
+              <a:buFont typeface="Arial" panose="020B0604020202020204" pitchFamily="34" charset="0"/>
+              <a:buChar char="•"/>
+              <a:tabLst>
+                <a:tab pos="0" algn="l"/>
+              </a:tabLst>
+            </a:pPr>
+            <a:r>
+              <a:rPr lang="en-US" spc="-1" dirty="0"/>
+              <a:t>PLT Scheme evolved over the course of 15 years. Was no longer focused only on education</a:t>
+            </a:r>
+          </a:p>
+          <a:p>
+            <a:pPr marL="285750" indent="-285750">
+              <a:spcBef>
+                <a:spcPts val="1001"/>
+              </a:spcBef>
+              <a:buFont typeface="Arial" panose="020B0604020202020204" pitchFamily="34" charset="0"/>
+              <a:buChar char="•"/>
+              <a:tabLst>
+                <a:tab pos="0" algn="l"/>
+              </a:tabLst>
+            </a:pPr>
+            <a:r>
+              <a:rPr lang="en-US" spc="-1" dirty="0"/>
+              <a:t>Designers recognized the need to be able to represent meta-languages as first class citizens in PLT Scheme </a:t>
+            </a:r>
+          </a:p>
+          <a:p>
+            <a:pPr marL="742950" lvl="1" indent="-285750">
+              <a:spcBef>
+                <a:spcPts val="1001"/>
+              </a:spcBef>
+              <a:buFont typeface="Arial" panose="020B0604020202020204" pitchFamily="34" charset="0"/>
+              <a:buChar char="•"/>
+              <a:tabLst>
+                <a:tab pos="0" algn="l"/>
+              </a:tabLst>
+            </a:pPr>
+            <a:r>
+              <a:rPr lang="en-US" spc="-1" dirty="0"/>
+              <a:t>“</a:t>
+            </a:r>
+            <a:r>
+              <a:rPr lang="en-US" dirty="0"/>
+              <a:t>"As Hudak puts it, “domain-specific languages are the ultimate abstractions.”“” [1]</a:t>
+            </a:r>
+          </a:p>
+          <a:p>
+            <a:pPr marL="285750" indent="-285750">
+              <a:spcBef>
+                <a:spcPts val="1001"/>
+              </a:spcBef>
+              <a:buFont typeface="Arial" panose="020B0604020202020204" pitchFamily="34" charset="0"/>
+              <a:buChar char="•"/>
+              <a:tabLst>
+                <a:tab pos="0" algn="l"/>
+              </a:tabLst>
+            </a:pPr>
+            <a:r>
+              <a:rPr lang="en-US" dirty="0"/>
+              <a:t>“By 2010, our dialect of Scheme had evolved so much that we renamed it to Racket  to let the world know that we had something different.” [1]</a:t>
+            </a:r>
+          </a:p>
+          <a:p>
+            <a:pPr marL="285750" indent="-285750">
+              <a:spcBef>
+                <a:spcPts val="1001"/>
+              </a:spcBef>
+              <a:buFont typeface="Arial" panose="020B0604020202020204" pitchFamily="34" charset="0"/>
+              <a:buChar char="•"/>
+              <a:tabLst>
+                <a:tab pos="0" algn="l"/>
+              </a:tabLst>
+            </a:pPr>
+            <a:r>
+              <a:rPr lang="en-US" spc="-1" dirty="0"/>
+              <a:t>PLT Scheme was Rebranded to Racket, </a:t>
+            </a:r>
+            <a:r>
+              <a:rPr lang="en-US" spc="-1" dirty="0" err="1"/>
+              <a:t>DrScheme</a:t>
+            </a:r>
+            <a:r>
+              <a:rPr lang="en-US" spc="-1" dirty="0"/>
+              <a:t> was rebranded to </a:t>
+            </a:r>
+            <a:r>
+              <a:rPr lang="en-US" spc="-1" dirty="0" err="1"/>
+              <a:t>DrRacket</a:t>
+            </a:r>
+            <a:endParaRPr lang="en-US" spc="-1" dirty="0"/>
+          </a:p>
+        </p:txBody>
+      </p:sp>
+    </p:spTree>
+    <p:extLst>
+      <p:ext uri="{BB962C8B-B14F-4D97-AF65-F5344CB8AC3E}">
+        <p14:creationId xmlns:p14="http://schemas.microsoft.com/office/powerpoint/2010/main" val="2578199842"/>
+      </p:ext>
+    </p:extLst>
+  </p:cSld>
+  <p:clrMapOvr>
+    <a:masterClrMapping/>
+  </p:clrMapOvr>
+</p:sld>
+</file>
+
+<file path=ppt/slides/slide5.xml><?xml version="1.0" encoding="utf-8"?>
+<p:sld xmlns:a="http://schemas.openxmlformats.org/drawingml/2006/main" xmlns:r="http://schemas.openxmlformats.org/officeDocument/2006/relationships" xmlns:p="http://schemas.openxmlformats.org/presentationml/2006/main">
+  <p:cSld>
+    <p:spTree>
+      <p:nvGrpSpPr>
+        <p:cNvPr id="1" name=""/>
+        <p:cNvGrpSpPr/>
+        <p:nvPr/>
+      </p:nvGrpSpPr>
+      <p:grpSpPr>
+        <a:xfrm>
+          <a:off x="0" y="0"/>
+          <a:ext cx="0" cy="0"/>
+          <a:chOff x="0" y="0"/>
+          <a:chExt cx="0" cy="0"/>
+        </a:xfrm>
+      </p:grpSpPr>
+      <p:sp>
+        <p:nvSpPr>
+          <p:cNvPr id="242" name="CustomShape 1"/>
+          <p:cNvSpPr/>
+          <p:nvPr/>
+        </p:nvSpPr>
+        <p:spPr>
+          <a:xfrm>
+            <a:off x="1062360" y="159840"/>
+            <a:ext cx="7766280" cy="2382840"/>
+          </a:xfrm>
+          <a:prstGeom prst="rect">
+            <a:avLst/>
+          </a:prstGeom>
+          <a:noFill/>
+          <a:ln>
+            <a:noFill/>
+          </a:ln>
+        </p:spPr>
+        <p:style>
+          <a:lnRef idx="0">
+            <a:scrgbClr r="0" g="0" b="0"/>
+          </a:lnRef>
+          <a:fillRef idx="0">
+            <a:scrgbClr r="0" g="0" b="0"/>
+          </a:fillRef>
+          <a:effectRef idx="0">
+            <a:scrgbClr r="0" g="0" b="0"/>
+          </a:effectRef>
+          <a:fontRef idx="minor"/>
+        </p:style>
+        <p:txBody>
           <a:bodyPr lIns="90000" tIns="45000" rIns="90000" bIns="45000" anchor="b">
             <a:noAutofit/>
           </a:bodyPr>
@@ -13723,7 +15466,7 @@
               </a:tabLst>
             </a:pPr>
             <a:r>
-              <a:rPr lang="en-US" sz="1800" b="0" strike="noStrike" spc="-1">
+              <a:rPr lang="en-US" sz="1800" b="0" strike="noStrike" spc="-1" dirty="0">
                 <a:solidFill>
                   <a:srgbClr val="000000"/>
                 </a:solidFill>
@@ -13733,7 +15476,7 @@
               <a:t>source: </a:t>
             </a:r>
             <a:r>
-              <a:rPr lang="en-US" sz="1800" b="0" u="sng" strike="noStrike" spc="-1">
+              <a:rPr lang="en-US" sz="1800" b="0" u="sng" strike="noStrike" spc="-1" dirty="0">
                 <a:solidFill>
                   <a:srgbClr val="0000FF"/>
                 </a:solidFill>
@@ -13744,7 +15487,7 @@
               </a:rPr>
               <a:t>https://racket-lang.org/</a:t>
             </a:r>
-            <a:endParaRPr lang="en-US" sz="1800" b="0" strike="noStrike" spc="-1">
+            <a:endParaRPr lang="en-US" sz="1800" b="0" strike="noStrike" spc="-1" dirty="0">
               <a:latin typeface="Arial"/>
             </a:endParaRPr>
           </a:p>
@@ -13766,7 +15509,7 @@
               </a:tabLst>
             </a:pPr>
             <a:r>
-              <a:rPr lang="en-US" sz="1800" b="0" strike="noStrike" spc="-1">
+              <a:rPr lang="en-US" sz="1800" b="0" strike="noStrike" spc="-1" dirty="0">
                 <a:solidFill>
                   <a:srgbClr val="000000"/>
                 </a:solidFill>
@@ -13775,9 +15518,11 @@
               </a:rPr>
               <a:t>Racket is a stable programming language that has matured over time</a:t>
             </a:r>
-            <a:br/>
+            <a:br>
+              <a:rPr dirty="0"/>
+            </a:br>
             <a:r>
-              <a:rPr lang="en-US" sz="1800" b="0" strike="noStrike" spc="-1">
+              <a:rPr lang="en-US" sz="1800" b="0" strike="noStrike" spc="-1" dirty="0">
                 <a:solidFill>
                   <a:srgbClr val="000000"/>
                 </a:solidFill>
@@ -13786,9 +15531,11 @@
               </a:rPr>
               <a:t> - It is cross-platform</a:t>
             </a:r>
-            <a:br/>
+            <a:br>
+              <a:rPr dirty="0"/>
+            </a:br>
             <a:r>
-              <a:rPr lang="en-US" sz="1800" b="0" strike="noStrike" spc="-1">
+              <a:rPr lang="en-US" sz="1800" b="0" strike="noStrike" spc="-1" dirty="0">
                 <a:solidFill>
                   <a:srgbClr val="000000"/>
                 </a:solidFill>
@@ -13797,9 +15544,11 @@
               </a:rPr>
               <a:t>     -	Windows</a:t>
             </a:r>
-            <a:br/>
+            <a:br>
+              <a:rPr dirty="0"/>
+            </a:br>
             <a:r>
-              <a:rPr lang="en-US" sz="1800" b="0" strike="noStrike" spc="-1">
+              <a:rPr lang="en-US" sz="1800" b="0" strike="noStrike" spc="-1" dirty="0">
                 <a:solidFill>
                   <a:srgbClr val="000000"/>
                 </a:solidFill>
@@ -13808,9 +15557,11 @@
               </a:rPr>
               <a:t>     -	Linux</a:t>
             </a:r>
-            <a:br/>
+            <a:br>
+              <a:rPr dirty="0"/>
+            </a:br>
             <a:r>
-              <a:rPr lang="en-US" sz="1800" b="0" strike="noStrike" spc="-1">
+              <a:rPr lang="en-US" sz="1800" b="0" strike="noStrike" spc="-1" dirty="0">
                 <a:solidFill>
                   <a:srgbClr val="000000"/>
                 </a:solidFill>
@@ -13819,7 +15570,7 @@
               </a:rPr>
               <a:t>     -	MacOS</a:t>
             </a:r>
-            <a:endParaRPr lang="en-US" sz="1800" b="0" strike="noStrike" spc="-1">
+            <a:endParaRPr lang="en-US" sz="1800" b="0" strike="noStrike" spc="-1" dirty="0">
               <a:latin typeface="Arial"/>
             </a:endParaRPr>
           </a:p>
@@ -13841,7 +15592,7 @@
               </a:tabLst>
             </a:pPr>
             <a:r>
-              <a:rPr lang="en-US" sz="1800" b="0" strike="noStrike" spc="-1">
+              <a:rPr lang="en-US" sz="1800" b="0" strike="noStrike" spc="-1" dirty="0">
                 <a:solidFill>
                   <a:srgbClr val="000000"/>
                 </a:solidFill>
@@ -13850,9 +15601,11 @@
               </a:rPr>
               <a:t>Racket contains</a:t>
             </a:r>
-            <a:br/>
+            <a:br>
+              <a:rPr dirty="0"/>
+            </a:br>
             <a:r>
-              <a:rPr lang="en-US" sz="1800" b="0" strike="noStrike" spc="-1">
+              <a:rPr lang="en-US" sz="1800" b="0" strike="noStrike" spc="-1" dirty="0">
                 <a:solidFill>
                   <a:srgbClr val="000000"/>
                 </a:solidFill>
@@ -13861,9 +15614,11 @@
               </a:rPr>
               <a:t>  - Package system</a:t>
             </a:r>
-            <a:br/>
+            <a:br>
+              <a:rPr dirty="0"/>
+            </a:br>
             <a:r>
-              <a:rPr lang="en-US" sz="1800" b="0" strike="noStrike" spc="-1">
+              <a:rPr lang="en-US" sz="1800" b="0" strike="noStrike" spc="-1" dirty="0">
                 <a:solidFill>
                   <a:srgbClr val="000000"/>
                 </a:solidFill>
@@ -13872,9 +15627,11 @@
               </a:rPr>
               <a:t>    where you can install a package and use the libraries provided</a:t>
             </a:r>
-            <a:br/>
+            <a:br>
+              <a:rPr dirty="0"/>
+            </a:br>
             <a:r>
-              <a:rPr lang="en-US" sz="1800" b="0" strike="noStrike" spc="-1">
+              <a:rPr lang="en-US" sz="1800" b="0" strike="noStrike" spc="-1" dirty="0">
                 <a:solidFill>
                   <a:srgbClr val="000000"/>
                 </a:solidFill>
@@ -13883,18 +15640,30 @@
               </a:rPr>
               <a:t>  - GUI Framework</a:t>
             </a:r>
-            <a:br/>
+            <a:br>
+              <a:rPr dirty="0"/>
+            </a:br>
             <a:r>
-              <a:rPr lang="en-US" sz="1800" b="0" strike="noStrike" spc="-1">
+              <a:rPr lang="en-US" sz="1800" b="0" strike="noStrike" spc="-1" dirty="0">
                 <a:solidFill>
                   <a:srgbClr val="000000"/>
                 </a:solidFill>
                 <a:latin typeface="Arial"/>
                 <a:ea typeface="DejaVu Sans"/>
               </a:rPr>
-              <a:t>  - Foreign Interface such as Ctype</a:t>
+              <a:t>  - Foreign Interface such as </a:t>
             </a:r>
-            <a:endParaRPr lang="en-US" sz="1800" b="0" strike="noStrike" spc="-1">
+            <a:r>
+              <a:rPr lang="en-US" sz="1800" b="0" strike="noStrike" spc="-1" dirty="0" err="1">
+                <a:solidFill>
+                  <a:srgbClr val="000000"/>
+                </a:solidFill>
+                <a:latin typeface="Arial"/>
+                <a:ea typeface="DejaVu Sans"/>
+              </a:rPr>
+              <a:t>Ctype</a:t>
+            </a:r>
+            <a:endParaRPr lang="en-US" sz="1800" b="0" strike="noStrike" spc="-1" dirty="0">
               <a:latin typeface="Arial"/>
             </a:endParaRPr>
           </a:p>
@@ -13908,7 +15677,7 @@
 </p:sld>
 </file>
 
-<file path=ppt/slides/slide3.xml><?xml version="1.0" encoding="utf-8"?>
+<file path=ppt/slides/slide6.xml><?xml version="1.0" encoding="utf-8"?>
 <p:sld xmlns:a="http://schemas.openxmlformats.org/drawingml/2006/main" xmlns:r="http://schemas.openxmlformats.org/officeDocument/2006/relationships" xmlns:p="http://schemas.openxmlformats.org/presentationml/2006/main">
   <p:cSld>
     <p:spTree>
@@ -14217,7 +15986,7 @@
 </p:sld>
 </file>
 
-<file path=ppt/slides/slide4.xml><?xml version="1.0" encoding="utf-8"?>
+<file path=ppt/slides/slide7.xml><?xml version="1.0" encoding="utf-8"?>
 <p:sld xmlns:a="http://schemas.openxmlformats.org/drawingml/2006/main" xmlns:r="http://schemas.openxmlformats.org/officeDocument/2006/relationships" xmlns:p="http://schemas.openxmlformats.org/presentationml/2006/main">
   <p:cSld>
     <p:spTree>
@@ -14402,7 +16171,7 @@
 </p:sld>
 </file>
 
-<file path=ppt/slides/slide5.xml><?xml version="1.0" encoding="utf-8"?>
+<file path=ppt/slides/slide8.xml><?xml version="1.0" encoding="utf-8"?>
 <p:sld xmlns:a="http://schemas.openxmlformats.org/drawingml/2006/main" xmlns:r="http://schemas.openxmlformats.org/officeDocument/2006/relationships" xmlns:p="http://schemas.openxmlformats.org/presentationml/2006/main">
   <p:cSld>
     <p:spTree>
@@ -14609,7 +16378,7 @@
 </p:sld>
 </file>
 
-<file path=ppt/slides/slide6.xml><?xml version="1.0" encoding="utf-8"?>
+<file path=ppt/slides/slide9.xml><?xml version="1.0" encoding="utf-8"?>
 <p:sld xmlns:a="http://schemas.openxmlformats.org/drawingml/2006/main" xmlns:r="http://schemas.openxmlformats.org/officeDocument/2006/relationships" xmlns:p="http://schemas.openxmlformats.org/presentationml/2006/main">
   <p:cSld>
     <p:spTree>
@@ -14787,588 +16556,6 @@
         </p:txBody>
       </p:sp>
     </p:spTree>
-  </p:cSld>
-  <p:clrMapOvr>
-    <a:masterClrMapping/>
-  </p:clrMapOvr>
-</p:sld>
-</file>
-
-<file path=ppt/slides/slide7.xml><?xml version="1.0" encoding="utf-8"?>
-<p:sld xmlns:a="http://schemas.openxmlformats.org/drawingml/2006/main" xmlns:r="http://schemas.openxmlformats.org/officeDocument/2006/relationships" xmlns:p="http://schemas.openxmlformats.org/presentationml/2006/main">
-  <p:cSld>
-    <p:spTree>
-      <p:nvGrpSpPr>
-        <p:cNvPr id="1" name=""/>
-        <p:cNvGrpSpPr/>
-        <p:nvPr/>
-      </p:nvGrpSpPr>
-      <p:grpSpPr>
-        <a:xfrm>
-          <a:off x="0" y="0"/>
-          <a:ext cx="0" cy="0"/>
-          <a:chOff x="0" y="0"/>
-          <a:chExt cx="0" cy="0"/>
-        </a:xfrm>
-      </p:grpSpPr>
-      <p:sp>
-        <p:nvSpPr>
-          <p:cNvPr id="252" name="TextShape 1"/>
-          <p:cNvSpPr txBox="1"/>
-          <p:nvPr/>
-        </p:nvSpPr>
-        <p:spPr>
-          <a:xfrm>
-            <a:off x="2011680" y="274680"/>
-            <a:ext cx="7766280" cy="1645560"/>
-          </a:xfrm>
-          <a:prstGeom prst="rect">
-            <a:avLst/>
-          </a:prstGeom>
-          <a:noFill/>
-          <a:ln>
-            <a:noFill/>
-          </a:ln>
-        </p:spPr>
-        <p:txBody>
-          <a:bodyPr lIns="0" tIns="0" rIns="0" bIns="0" anchor="ctr">
-            <a:noAutofit/>
-          </a:bodyPr>
-          <a:lstStyle/>
-          <a:p>
-            <a:pPr algn="r">
-              <a:lnSpc>
-                <a:spcPct val="100000"/>
-              </a:lnSpc>
-            </a:pPr>
-            <a:r>
-              <a:rPr lang="en-US" sz="5400" b="0" strike="noStrike" spc="-1">
-                <a:solidFill>
-                  <a:srgbClr val="4F81BD"/>
-                </a:solidFill>
-                <a:latin typeface="Trebuchet MS"/>
-                <a:ea typeface="DejaVu Sans"/>
-              </a:rPr>
-              <a:t>Racket Applications: Fractalide</a:t>
-            </a:r>
-            <a:endParaRPr lang="en-US" sz="5400" b="0" strike="noStrike" spc="-1">
-              <a:solidFill>
-                <a:srgbClr val="000000"/>
-              </a:solidFill>
-              <a:latin typeface="Arial"/>
-            </a:endParaRPr>
-          </a:p>
-        </p:txBody>
-      </p:sp>
-      <p:sp>
-        <p:nvSpPr>
-          <p:cNvPr id="253" name="TextShape 2"/>
-          <p:cNvSpPr txBox="1"/>
-          <p:nvPr/>
-        </p:nvSpPr>
-        <p:spPr>
-          <a:xfrm>
-            <a:off x="457560" y="2057760"/>
-            <a:ext cx="10972440" cy="3977280"/>
-          </a:xfrm>
-          <a:prstGeom prst="rect">
-            <a:avLst/>
-          </a:prstGeom>
-          <a:noFill/>
-          <a:ln>
-            <a:noFill/>
-          </a:ln>
-        </p:spPr>
-        <p:txBody>
-          <a:bodyPr lIns="0" tIns="0" rIns="0" bIns="0">
-            <a:normAutofit/>
-          </a:bodyPr>
-          <a:lstStyle/>
-          <a:p>
-            <a:pPr marL="432000" indent="-324000">
-              <a:spcBef>
-                <a:spcPts val="1417"/>
-              </a:spcBef>
-              <a:buClr>
-                <a:srgbClr val="000000"/>
-              </a:buClr>
-              <a:buSzPct val="45000"/>
-              <a:buFont typeface="Wingdings" charset="2"/>
-              <a:buChar char=""/>
-            </a:pPr>
-            <a:r>
-              <a:rPr lang="en-US" sz="2800" b="0" strike="noStrike" spc="-1" dirty="0" err="1">
-                <a:solidFill>
-                  <a:srgbClr val="000000"/>
-                </a:solidFill>
-                <a:latin typeface="Arial"/>
-              </a:rPr>
-              <a:t>Fractalide</a:t>
-            </a:r>
-            <a:r>
-              <a:rPr lang="en-US" sz="2800" b="0" strike="noStrike" spc="-1" dirty="0">
-                <a:solidFill>
-                  <a:srgbClr val="000000"/>
-                </a:solidFill>
-                <a:latin typeface="Arial"/>
-              </a:rPr>
-              <a:t> is another open-source programming language written in Racket</a:t>
-            </a:r>
-          </a:p>
-          <a:p>
-            <a:pPr marL="432000" indent="-324000">
-              <a:spcBef>
-                <a:spcPts val="1417"/>
-              </a:spcBef>
-              <a:buClr>
-                <a:srgbClr val="000000"/>
-              </a:buClr>
-              <a:buSzPct val="45000"/>
-              <a:buFont typeface="Wingdings" charset="2"/>
-              <a:buChar char=""/>
-            </a:pPr>
-            <a:r>
-              <a:rPr lang="en-US" sz="2800" b="0" strike="noStrike" spc="-1" dirty="0">
-                <a:solidFill>
-                  <a:srgbClr val="000000"/>
-                </a:solidFill>
-                <a:latin typeface="Arial"/>
-              </a:rPr>
-              <a:t>An interesting approach to designing a programming language which utilizes graphs as the basic language concepts</a:t>
-            </a:r>
-          </a:p>
-          <a:p>
-            <a:pPr marL="432000" indent="-324000">
-              <a:spcBef>
-                <a:spcPts val="1417"/>
-              </a:spcBef>
-              <a:buClr>
-                <a:srgbClr val="000000"/>
-              </a:buClr>
-              <a:buSzPct val="45000"/>
-              <a:buFont typeface="Wingdings" charset="2"/>
-              <a:buChar char=""/>
-            </a:pPr>
-            <a:r>
-              <a:rPr lang="en-US" sz="2800" b="0" strike="noStrike" spc="-1" dirty="0">
-                <a:solidFill>
-                  <a:srgbClr val="000000"/>
-                </a:solidFill>
-                <a:latin typeface="Arial"/>
-              </a:rPr>
-              <a:t> </a:t>
-            </a:r>
-            <a:r>
-              <a:rPr lang="en-US" sz="2800" b="0" strike="noStrike" spc="-1" dirty="0">
-                <a:solidFill>
-                  <a:srgbClr val="000000"/>
-                </a:solidFill>
-                <a:latin typeface="Arial"/>
-                <a:hlinkClick r:id="rId2"/>
-              </a:rPr>
-              <a:t>https://github.com/fractalide/fractalide</a:t>
-            </a:r>
-            <a:r>
-              <a:rPr lang="en-US" sz="2800" b="0" strike="noStrike" spc="-1" dirty="0">
-                <a:solidFill>
-                  <a:srgbClr val="000000"/>
-                </a:solidFill>
-                <a:latin typeface="Arial"/>
-              </a:rPr>
-              <a:t> </a:t>
-            </a:r>
-          </a:p>
-        </p:txBody>
-      </p:sp>
-    </p:spTree>
-  </p:cSld>
-  <p:clrMapOvr>
-    <a:masterClrMapping/>
-  </p:clrMapOvr>
-</p:sld>
-</file>
-
-<file path=ppt/slides/slide8.xml><?xml version="1.0" encoding="utf-8"?>
-<p:sld xmlns:a="http://schemas.openxmlformats.org/drawingml/2006/main" xmlns:r="http://schemas.openxmlformats.org/officeDocument/2006/relationships" xmlns:p="http://schemas.openxmlformats.org/presentationml/2006/main">
-  <p:cSld>
-    <p:spTree>
-      <p:nvGrpSpPr>
-        <p:cNvPr id="1" name=""/>
-        <p:cNvGrpSpPr/>
-        <p:nvPr/>
-      </p:nvGrpSpPr>
-      <p:grpSpPr>
-        <a:xfrm>
-          <a:off x="0" y="0"/>
-          <a:ext cx="0" cy="0"/>
-          <a:chOff x="0" y="0"/>
-          <a:chExt cx="0" cy="0"/>
-        </a:xfrm>
-      </p:grpSpPr>
-      <p:sp>
-        <p:nvSpPr>
-          <p:cNvPr id="254" name="TextShape 1"/>
-          <p:cNvSpPr txBox="1"/>
-          <p:nvPr/>
-        </p:nvSpPr>
-        <p:spPr>
-          <a:xfrm>
-            <a:off x="2011680" y="274680"/>
-            <a:ext cx="7766280" cy="1645560"/>
-          </a:xfrm>
-          <a:prstGeom prst="rect">
-            <a:avLst/>
-          </a:prstGeom>
-          <a:noFill/>
-          <a:ln>
-            <a:noFill/>
-          </a:ln>
-        </p:spPr>
-        <p:txBody>
-          <a:bodyPr lIns="0" tIns="0" rIns="0" bIns="0" anchor="ctr">
-            <a:noAutofit/>
-          </a:bodyPr>
-          <a:lstStyle/>
-          <a:p>
-            <a:pPr algn="r">
-              <a:lnSpc>
-                <a:spcPct val="100000"/>
-              </a:lnSpc>
-            </a:pPr>
-            <a:r>
-              <a:rPr lang="en-US" sz="5400" b="0" strike="noStrike" spc="-1">
-                <a:solidFill>
-                  <a:srgbClr val="4F81BD"/>
-                </a:solidFill>
-                <a:latin typeface="Trebuchet MS"/>
-                <a:ea typeface="DejaVu Sans"/>
-              </a:rPr>
-              <a:t>Racket Applications: Other Applications</a:t>
-            </a:r>
-            <a:endParaRPr lang="en-US" sz="5400" b="0" strike="noStrike" spc="-1">
-              <a:solidFill>
-                <a:srgbClr val="000000"/>
-              </a:solidFill>
-              <a:latin typeface="Arial"/>
-            </a:endParaRPr>
-          </a:p>
-        </p:txBody>
-      </p:sp>
-      <p:sp>
-        <p:nvSpPr>
-          <p:cNvPr id="255" name="TextShape 2"/>
-          <p:cNvSpPr txBox="1"/>
-          <p:nvPr/>
-        </p:nvSpPr>
-        <p:spPr>
-          <a:xfrm>
-            <a:off x="457560" y="2057760"/>
-            <a:ext cx="10972440" cy="3977280"/>
-          </a:xfrm>
-          <a:prstGeom prst="rect">
-            <a:avLst/>
-          </a:prstGeom>
-          <a:noFill/>
-          <a:ln>
-            <a:noFill/>
-          </a:ln>
-        </p:spPr>
-        <p:txBody>
-          <a:bodyPr lIns="0" tIns="0" rIns="0" bIns="0">
-            <a:normAutofit lnSpcReduction="10000"/>
-          </a:bodyPr>
-          <a:lstStyle/>
-          <a:p>
-            <a:pPr marL="432000" indent="-324000">
-              <a:spcBef>
-                <a:spcPts val="1417"/>
-              </a:spcBef>
-              <a:buClr>
-                <a:srgbClr val="000000"/>
-              </a:buClr>
-              <a:buSzPct val="45000"/>
-              <a:buFont typeface="Wingdings" charset="2"/>
-              <a:buChar char=""/>
-            </a:pPr>
-            <a:r>
-              <a:rPr lang="en-US" sz="2800" b="0" strike="noStrike" spc="-1" dirty="0">
-                <a:solidFill>
-                  <a:srgbClr val="000000"/>
-                </a:solidFill>
-                <a:latin typeface="Arial"/>
-              </a:rPr>
-              <a:t>The other features of racket we have discussed make it a feasible candidate for other applications</a:t>
-            </a:r>
-          </a:p>
-          <a:p>
-            <a:pPr marL="432000" indent="-324000">
-              <a:spcBef>
-                <a:spcPts val="1417"/>
-              </a:spcBef>
-              <a:buClr>
-                <a:srgbClr val="000000"/>
-              </a:buClr>
-              <a:buSzPct val="45000"/>
-              <a:buFont typeface="Wingdings" charset="2"/>
-              <a:buChar char=""/>
-            </a:pPr>
-            <a:r>
-              <a:rPr lang="en-US" sz="2800" b="0" strike="noStrike" spc="-1" dirty="0">
-                <a:solidFill>
-                  <a:srgbClr val="000000"/>
-                </a:solidFill>
-                <a:latin typeface="Arial"/>
-              </a:rPr>
-              <a:t>In fact, Racket’s IDE (</a:t>
-            </a:r>
-            <a:r>
-              <a:rPr lang="en-US" sz="2800" b="0" strike="noStrike" spc="-1" dirty="0" err="1">
-                <a:solidFill>
-                  <a:srgbClr val="000000"/>
-                </a:solidFill>
-                <a:latin typeface="Arial"/>
-              </a:rPr>
-              <a:t>DrRacket</a:t>
-            </a:r>
-            <a:r>
-              <a:rPr lang="en-US" sz="2800" b="0" strike="noStrike" spc="-1" dirty="0">
-                <a:solidFill>
-                  <a:srgbClr val="000000"/>
-                </a:solidFill>
-                <a:latin typeface="Arial"/>
-              </a:rPr>
-              <a:t>) was written in Racket </a:t>
-            </a:r>
-            <a:r>
-              <a:rPr lang="en-US" sz="2800" b="0" strike="noStrike" spc="-1" dirty="0">
-                <a:solidFill>
-                  <a:srgbClr val="000000"/>
-                </a:solidFill>
-                <a:latin typeface="Arial"/>
-                <a:ea typeface="DejaVu Sans"/>
-                <a:hlinkClick r:id="rId2"/>
-              </a:rPr>
-              <a:t>https://github.com/racket/drracket</a:t>
-            </a:r>
-            <a:r>
-              <a:rPr lang="en-US" sz="2800" b="0" strike="noStrike" spc="-1" dirty="0">
-                <a:solidFill>
-                  <a:srgbClr val="000000"/>
-                </a:solidFill>
-                <a:latin typeface="Arial"/>
-                <a:ea typeface="DejaVu Sans"/>
-              </a:rPr>
-              <a:t> </a:t>
-            </a:r>
-            <a:endParaRPr lang="en-US" sz="2800" b="0" strike="noStrike" spc="-1" dirty="0">
-              <a:solidFill>
-                <a:srgbClr val="000000"/>
-              </a:solidFill>
-              <a:latin typeface="Arial"/>
-            </a:endParaRPr>
-          </a:p>
-          <a:p>
-            <a:pPr marL="432000" indent="-324000">
-              <a:spcBef>
-                <a:spcPts val="1417"/>
-              </a:spcBef>
-              <a:buClr>
-                <a:srgbClr val="000000"/>
-              </a:buClr>
-              <a:buSzPct val="45000"/>
-              <a:buFont typeface="Wingdings" charset="2"/>
-              <a:buChar char=""/>
-            </a:pPr>
-            <a:r>
-              <a:rPr lang="en-US" sz="2800" b="0" strike="noStrike" spc="-1" dirty="0" err="1">
-                <a:solidFill>
-                  <a:srgbClr val="000000"/>
-                </a:solidFill>
-                <a:latin typeface="Arial"/>
-              </a:rPr>
-              <a:t>DrRacket</a:t>
-            </a:r>
-            <a:r>
-              <a:rPr lang="en-US" sz="2800" b="0" strike="noStrike" spc="-1" dirty="0">
-                <a:solidFill>
-                  <a:srgbClr val="000000"/>
-                </a:solidFill>
-                <a:latin typeface="Arial"/>
-              </a:rPr>
-              <a:t> includes all typical features of an IDE</a:t>
-            </a:r>
-          </a:p>
-          <a:p>
-            <a:pPr marL="864000" lvl="1" indent="-324000">
-              <a:spcBef>
-                <a:spcPts val="1134"/>
-              </a:spcBef>
-              <a:buClr>
-                <a:srgbClr val="000000"/>
-              </a:buClr>
-              <a:buSzPct val="75000"/>
-              <a:buFont typeface="Symbol" charset="2"/>
-              <a:buChar char=""/>
-            </a:pPr>
-            <a:r>
-              <a:rPr lang="en-US" sz="2000" b="0" strike="noStrike" spc="-1" dirty="0">
-                <a:solidFill>
-                  <a:srgbClr val="000000"/>
-                </a:solidFill>
-                <a:latin typeface="Arial"/>
-              </a:rPr>
-              <a:t>Debugging</a:t>
-            </a:r>
-          </a:p>
-          <a:p>
-            <a:pPr marL="864000" lvl="1" indent="-324000">
-              <a:spcBef>
-                <a:spcPts val="1134"/>
-              </a:spcBef>
-              <a:buClr>
-                <a:srgbClr val="000000"/>
-              </a:buClr>
-              <a:buSzPct val="75000"/>
-              <a:buFont typeface="Symbol" charset="2"/>
-              <a:buChar char=""/>
-            </a:pPr>
-            <a:r>
-              <a:rPr lang="en-US" sz="2000" b="0" strike="noStrike" spc="-1" dirty="0">
-                <a:solidFill>
-                  <a:srgbClr val="000000"/>
-                </a:solidFill>
-                <a:latin typeface="Arial"/>
-              </a:rPr>
-              <a:t>Source highlighting</a:t>
-            </a:r>
-          </a:p>
-          <a:p>
-            <a:pPr marL="864000" lvl="1" indent="-324000">
-              <a:spcBef>
-                <a:spcPts val="1134"/>
-              </a:spcBef>
-              <a:buClr>
-                <a:srgbClr val="000000"/>
-              </a:buClr>
-              <a:buSzPct val="75000"/>
-              <a:buFont typeface="Symbol" charset="2"/>
-              <a:buChar char=""/>
-            </a:pPr>
-            <a:r>
-              <a:rPr lang="en-US" sz="2000" b="0" strike="noStrike" spc="-1" dirty="0">
-                <a:solidFill>
-                  <a:srgbClr val="000000"/>
-                </a:solidFill>
-                <a:latin typeface="Arial"/>
-              </a:rPr>
-              <a:t>Library Support</a:t>
-            </a:r>
-          </a:p>
-          <a:p>
-            <a:pPr marL="864000" lvl="1" indent="-324000">
-              <a:spcBef>
-                <a:spcPts val="1134"/>
-              </a:spcBef>
-              <a:buClr>
-                <a:srgbClr val="000000"/>
-              </a:buClr>
-              <a:buSzPct val="75000"/>
-              <a:buFont typeface="Symbol" charset="2"/>
-              <a:buChar char=""/>
-            </a:pPr>
-            <a:r>
-              <a:rPr lang="en-US" sz="2000" b="0" strike="noStrike" spc="-1" dirty="0">
-                <a:solidFill>
-                  <a:srgbClr val="000000"/>
-                </a:solidFill>
-                <a:latin typeface="Arial"/>
-              </a:rPr>
-              <a:t>Etc.</a:t>
-            </a:r>
-          </a:p>
-        </p:txBody>
-      </p:sp>
-    </p:spTree>
-  </p:cSld>
-  <p:clrMapOvr>
-    <a:masterClrMapping/>
-  </p:clrMapOvr>
-</p:sld>
-</file>
-
-<file path=ppt/slides/slide9.xml><?xml version="1.0" encoding="utf-8"?>
-<p:sld xmlns:a="http://schemas.openxmlformats.org/drawingml/2006/main" xmlns:r="http://schemas.openxmlformats.org/officeDocument/2006/relationships" xmlns:p="http://schemas.openxmlformats.org/presentationml/2006/main">
-  <p:cSld>
-    <p:spTree>
-      <p:nvGrpSpPr>
-        <p:cNvPr id="1" name=""/>
-        <p:cNvGrpSpPr/>
-        <p:nvPr/>
-      </p:nvGrpSpPr>
-      <p:grpSpPr>
-        <a:xfrm>
-          <a:off x="0" y="0"/>
-          <a:ext cx="0" cy="0"/>
-          <a:chOff x="0" y="0"/>
-          <a:chExt cx="0" cy="0"/>
-        </a:xfrm>
-      </p:grpSpPr>
-      <p:sp>
-        <p:nvSpPr>
-          <p:cNvPr id="2" name="Title 1">
-            <a:extLst>
-              <a:ext uri="{FF2B5EF4-FFF2-40B4-BE49-F238E27FC236}">
-                <a16:creationId xmlns:a16="http://schemas.microsoft.com/office/drawing/2014/main" id="{4AA88340-D0DF-4FBC-8BD2-18236183DF47}"/>
-              </a:ext>
-            </a:extLst>
-          </p:cNvPr>
-          <p:cNvSpPr>
-            <a:spLocks noGrp="1"/>
-          </p:cNvSpPr>
-          <p:nvPr>
-            <p:ph type="title"/>
-          </p:nvPr>
-        </p:nvSpPr>
-        <p:spPr/>
-        <p:txBody>
-          <a:bodyPr/>
-          <a:lstStyle/>
-          <a:p>
-            <a:endParaRPr lang="en-US"/>
-          </a:p>
-        </p:txBody>
-      </p:sp>
-      <p:sp>
-        <p:nvSpPr>
-          <p:cNvPr id="3" name="Text Placeholder 2">
-            <a:extLst>
-              <a:ext uri="{FF2B5EF4-FFF2-40B4-BE49-F238E27FC236}">
-                <a16:creationId xmlns:a16="http://schemas.microsoft.com/office/drawing/2014/main" id="{5C3A6CAD-B008-483D-AA12-895DE4AADDAD}"/>
-              </a:ext>
-            </a:extLst>
-          </p:cNvPr>
-          <p:cNvSpPr>
-            <a:spLocks noGrp="1"/>
-          </p:cNvSpPr>
-          <p:nvPr>
-            <p:ph type="body"/>
-          </p:nvPr>
-        </p:nvSpPr>
-        <p:spPr/>
-        <p:txBody>
-          <a:bodyPr/>
-          <a:lstStyle/>
-          <a:p>
-            <a:endParaRPr lang="en-US"/>
-          </a:p>
-        </p:txBody>
-      </p:sp>
-    </p:spTree>
-    <p:extLst>
-      <p:ext uri="{BB962C8B-B14F-4D97-AF65-F5344CB8AC3E}">
-        <p14:creationId xmlns:p14="http://schemas.microsoft.com/office/powerpoint/2010/main" val="3127419961"/>
-      </p:ext>
-    </p:extLst>
   </p:cSld>
   <p:clrMapOvr>
     <a:masterClrMapping/>

</xml_diff>

<commit_message>
Added call-tail and lexical closure stuff
</commit_message>
<xml_diff>
--- a/CSC201Sec3Proj3Team4.pptx
+++ b/CSC201Sec3Proj3Team4.pptx
@@ -131,6 +131,11 @@
       </a:defRPr>
     </a:lvl9pPr>
   </p:defaultTextStyle>
+  <p:extLst>
+    <p:ext uri="{EFAFB233-063F-42B5-8137-9DF3F51BA10A}">
+      <p15:sldGuideLst xmlns:p15="http://schemas.microsoft.com/office/powerpoint/2012/main"/>
+    </p:ext>
+  </p:extLst>
 </p:presentation>
 </file>
 
@@ -30771,7 +30776,7 @@
         </p:style>
         <p:txBody>
           <a:bodyPr lIns="90000" tIns="45000" rIns="90000" bIns="45000">
-            <a:normAutofit fontScale="85000" lnSpcReduction="10000"/>
+            <a:normAutofit fontScale="92500" lnSpcReduction="20000"/>
           </a:bodyPr>
           <a:lstStyle/>
           <a:p>
@@ -32231,8 +32236,8 @@
         </p:nvSpPr>
         <p:spPr>
           <a:xfrm>
-            <a:off x="1062360" y="159840"/>
-            <a:ext cx="7979400" cy="1409760"/>
+            <a:off x="1062360" y="0"/>
+            <a:ext cx="7979400" cy="1569600"/>
           </a:xfrm>
           <a:prstGeom prst="rect">
             <a:avLst/>
@@ -32266,7 +32271,7 @@
               </a:lnSpc>
             </a:pPr>
             <a:r>
-              <a:rPr lang="en-US" sz="5400" b="0" strike="noStrike" spc="-1">
+              <a:rPr lang="en-US" sz="5400" b="0" strike="noStrike" spc="-1" dirty="0">
                 <a:solidFill>
                   <a:srgbClr val="4F81BD"/>
                 </a:solidFill>
@@ -32275,7 +32280,7 @@
               </a:rPr>
               <a:t>Main Characteristics and main Strengths of Racket</a:t>
             </a:r>
-            <a:endParaRPr lang="en-US" sz="5400" b="0" strike="noStrike" spc="-1">
+            <a:endParaRPr lang="en-US" sz="5400" b="0" strike="noStrike" spc="-1" dirty="0">
               <a:latin typeface="Arial"/>
             </a:endParaRPr>
           </a:p>
@@ -32330,7 +32335,7 @@
               </a:tabLst>
             </a:pPr>
             <a:r>
-              <a:rPr lang="en-US" sz="1800" b="0" strike="noStrike" spc="-1">
+              <a:rPr lang="en-US" sz="1800" b="0" strike="noStrike" spc="-1" dirty="0">
                 <a:solidFill>
                   <a:srgbClr val="000000"/>
                 </a:solidFill>
@@ -32339,7 +32344,7 @@
               </a:rPr>
               <a:t>“Racket” https://racket-lang.org/ (accessed Nov. 24, 2020)</a:t>
             </a:r>
-            <a:endParaRPr lang="en-US" sz="1800" b="0" strike="noStrike" spc="-1">
+            <a:endParaRPr lang="en-US" sz="1800" b="0" strike="noStrike" spc="-1" dirty="0">
               <a:latin typeface="Arial"/>
             </a:endParaRPr>
           </a:p>
@@ -32361,7 +32366,7 @@
               </a:tabLst>
             </a:pPr>
             <a:r>
-              <a:rPr lang="en-US" sz="1800" b="0" strike="noStrike" spc="-1">
+              <a:rPr lang="en-US" sz="1800" b="0" strike="noStrike" spc="-1" dirty="0">
                 <a:solidFill>
                   <a:srgbClr val="000000"/>
                 </a:solidFill>
@@ -32370,9 +32375,11 @@
               </a:rPr>
               <a:t>Racket is a stable programming language that has matured over time</a:t>
             </a:r>
-            <a:br/>
+            <a:br>
+              <a:rPr dirty="0"/>
+            </a:br>
             <a:r>
-              <a:rPr lang="en-US" sz="1800" b="0" strike="noStrike" spc="-1">
+              <a:rPr lang="en-US" sz="1800" b="0" strike="noStrike" spc="-1" dirty="0">
                 <a:solidFill>
                   <a:srgbClr val="000000"/>
                 </a:solidFill>
@@ -32381,9 +32388,11 @@
               </a:rPr>
               <a:t> - It is cross-platform</a:t>
             </a:r>
-            <a:br/>
+            <a:br>
+              <a:rPr dirty="0"/>
+            </a:br>
             <a:r>
-              <a:rPr lang="en-US" sz="1800" b="0" strike="noStrike" spc="-1">
+              <a:rPr lang="en-US" sz="1800" b="0" strike="noStrike" spc="-1" dirty="0">
                 <a:solidFill>
                   <a:srgbClr val="000000"/>
                 </a:solidFill>
@@ -32392,9 +32401,11 @@
               </a:rPr>
               <a:t>     -	Windows</a:t>
             </a:r>
-            <a:br/>
+            <a:br>
+              <a:rPr dirty="0"/>
+            </a:br>
             <a:r>
-              <a:rPr lang="en-US" sz="1800" b="0" strike="noStrike" spc="-1">
+              <a:rPr lang="en-US" sz="1800" b="0" strike="noStrike" spc="-1" dirty="0">
                 <a:solidFill>
                   <a:srgbClr val="000000"/>
                 </a:solidFill>
@@ -32403,9 +32414,11 @@
               </a:rPr>
               <a:t>     -	Linux</a:t>
             </a:r>
-            <a:br/>
+            <a:br>
+              <a:rPr dirty="0"/>
+            </a:br>
             <a:r>
-              <a:rPr lang="en-US" sz="1800" b="0" strike="noStrike" spc="-1">
+              <a:rPr lang="en-US" sz="1800" b="0" strike="noStrike" spc="-1" dirty="0">
                 <a:solidFill>
                   <a:srgbClr val="000000"/>
                 </a:solidFill>
@@ -32414,7 +32427,7 @@
               </a:rPr>
               <a:t>     -	MacOS</a:t>
             </a:r>
-            <a:endParaRPr lang="en-US" sz="1800" b="0" strike="noStrike" spc="-1">
+            <a:endParaRPr lang="en-US" sz="1800" b="0" strike="noStrike" spc="-1" dirty="0">
               <a:latin typeface="Arial"/>
             </a:endParaRPr>
           </a:p>
@@ -32436,7 +32449,7 @@
               </a:tabLst>
             </a:pPr>
             <a:r>
-              <a:rPr lang="en-US" sz="1800" b="0" strike="noStrike" spc="-1">
+              <a:rPr lang="en-US" sz="1800" b="0" strike="noStrike" spc="-1" dirty="0">
                 <a:solidFill>
                   <a:srgbClr val="000000"/>
                 </a:solidFill>
@@ -32445,9 +32458,11 @@
               </a:rPr>
               <a:t>Racket contains</a:t>
             </a:r>
-            <a:br/>
+            <a:br>
+              <a:rPr dirty="0"/>
+            </a:br>
             <a:r>
-              <a:rPr lang="en-US" sz="1800" b="0" strike="noStrike" spc="-1">
+              <a:rPr lang="en-US" sz="1800" b="0" strike="noStrike" spc="-1" dirty="0">
                 <a:solidFill>
                   <a:srgbClr val="000000"/>
                 </a:solidFill>
@@ -32456,7 +32471,7 @@
               </a:rPr>
               <a:t>  - Package system</a:t>
             </a:r>
-            <a:endParaRPr lang="en-US" sz="1800" b="0" strike="noStrike" spc="-1">
+            <a:endParaRPr lang="en-US" sz="1800" b="0" strike="noStrike" spc="-1" dirty="0">
               <a:latin typeface="Arial"/>
             </a:endParaRPr>
           </a:p>
@@ -32478,7 +32493,7 @@
               </a:tabLst>
             </a:pPr>
             <a:r>
-              <a:rPr lang="en-US" sz="1800" b="0" strike="noStrike" spc="-1">
+              <a:rPr lang="en-US" sz="1800" b="0" strike="noStrike" spc="-1" dirty="0">
                 <a:solidFill>
                   <a:srgbClr val="000000"/>
                 </a:solidFill>
@@ -32487,9 +32502,11 @@
               </a:rPr>
               <a:t>Racket Package Manager</a:t>
             </a:r>
-            <a:br/>
+            <a:br>
+              <a:rPr dirty="0"/>
+            </a:br>
             <a:r>
-              <a:rPr lang="en-US" sz="1800" b="0" strike="noStrike" spc="-1">
+              <a:rPr lang="en-US" sz="1800" b="0" strike="noStrike" spc="-1" dirty="0">
                 <a:solidFill>
                   <a:srgbClr val="000000"/>
                 </a:solidFill>
@@ -32498,7 +32515,7 @@
               </a:rPr>
               <a:t>    where you can install/update/remove a package and use the libraries provided</a:t>
             </a:r>
-            <a:endParaRPr lang="en-US" sz="1800" b="0" strike="noStrike" spc="-1">
+            <a:endParaRPr lang="en-US" sz="1800" b="0" strike="noStrike" spc="-1" dirty="0">
               <a:latin typeface="Arial"/>
             </a:endParaRPr>
           </a:p>
@@ -32520,16 +32537,86 @@
               </a:tabLst>
             </a:pPr>
             <a:r>
-              <a:rPr lang="en-US" sz="1800" b="0" strike="noStrike" spc="-1">
+              <a:rPr lang="en-US" sz="1800" b="0" strike="noStrike" spc="-1" dirty="0" err="1">
                 <a:solidFill>
                   <a:srgbClr val="000000"/>
                 </a:solidFill>
                 <a:latin typeface="Arial"/>
                 <a:ea typeface="DejaVu Sans"/>
               </a:rPr>
-              <a:t>raco pkg (raco pkg install, raco pkg update, raco pkg remove)</a:t>
+              <a:t>raco</a:t>
             </a:r>
-            <a:endParaRPr lang="en-US" sz="1800" b="0" strike="noStrike" spc="-1">
+            <a:r>
+              <a:rPr lang="en-US" sz="1800" b="0" strike="noStrike" spc="-1" dirty="0">
+                <a:solidFill>
+                  <a:srgbClr val="000000"/>
+                </a:solidFill>
+                <a:latin typeface="Arial"/>
+                <a:ea typeface="DejaVu Sans"/>
+              </a:rPr>
+              <a:t> pkg (</a:t>
+            </a:r>
+            <a:r>
+              <a:rPr lang="en-US" sz="1800" b="0" strike="noStrike" spc="-1" dirty="0" err="1">
+                <a:solidFill>
+                  <a:srgbClr val="000000"/>
+                </a:solidFill>
+                <a:latin typeface="Arial"/>
+                <a:ea typeface="DejaVu Sans"/>
+              </a:rPr>
+              <a:t>raco</a:t>
+            </a:r>
+            <a:r>
+              <a:rPr lang="en-US" sz="1800" b="0" strike="noStrike" spc="-1" dirty="0">
+                <a:solidFill>
+                  <a:srgbClr val="000000"/>
+                </a:solidFill>
+                <a:latin typeface="Arial"/>
+                <a:ea typeface="DejaVu Sans"/>
+              </a:rPr>
+              <a:t> pkg install, </a:t>
+            </a:r>
+            <a:r>
+              <a:rPr lang="en-US" sz="1800" b="0" strike="noStrike" spc="-1" dirty="0" err="1">
+                <a:solidFill>
+                  <a:srgbClr val="000000"/>
+                </a:solidFill>
+                <a:latin typeface="Arial"/>
+                <a:ea typeface="DejaVu Sans"/>
+              </a:rPr>
+              <a:t>raco</a:t>
+            </a:r>
+            <a:r>
+              <a:rPr lang="en-US" sz="1800" b="0" strike="noStrike" spc="-1" dirty="0">
+                <a:solidFill>
+                  <a:srgbClr val="000000"/>
+                </a:solidFill>
+                <a:latin typeface="Arial"/>
+                <a:ea typeface="DejaVu Sans"/>
+              </a:rPr>
+              <a:t> pkg update, </a:t>
+            </a:r>
+            <a:r>
+              <a:rPr lang="en-US" sz="1800" b="0" strike="noStrike" spc="-1" dirty="0" err="1">
+                <a:solidFill>
+                  <a:srgbClr val="000000"/>
+                </a:solidFill>
+                <a:latin typeface="Arial"/>
+                <a:ea typeface="DejaVu Sans"/>
+              </a:rPr>
+              <a:t>raco</a:t>
+            </a:r>
+            <a:r>
+              <a:rPr lang="en-US" sz="1800" b="0" strike="noStrike" spc="-1" dirty="0">
+                <a:solidFill>
+                  <a:srgbClr val="000000"/>
+                </a:solidFill>
+                <a:latin typeface="Arial"/>
+                <a:ea typeface="DejaVu Sans"/>
+              </a:rPr>
+              <a:t> pkg remove)</a:t>
+            </a:r>
+            <a:endParaRPr lang="en-US" sz="1800" b="0" strike="noStrike" spc="-1" dirty="0">
               <a:latin typeface="Arial"/>
             </a:endParaRPr>
           </a:p>
@@ -32551,7 +32638,7 @@
               </a:tabLst>
             </a:pPr>
             <a:r>
-              <a:rPr lang="en-US" sz="1800" b="0" strike="noStrike" spc="-1">
+              <a:rPr lang="en-US" sz="1800" b="0" strike="noStrike" spc="-1" dirty="0">
                 <a:solidFill>
                   <a:srgbClr val="000000"/>
                 </a:solidFill>
@@ -32560,18 +32647,30 @@
               </a:rPr>
               <a:t>GUI Framework</a:t>
             </a:r>
-            <a:br/>
+            <a:br>
+              <a:rPr dirty="0"/>
+            </a:br>
             <a:r>
-              <a:rPr lang="en-US" sz="1800" b="0" strike="noStrike" spc="-1">
+              <a:rPr lang="en-US" sz="1800" b="0" strike="noStrike" spc="-1" dirty="0">
                 <a:solidFill>
                   <a:srgbClr val="000000"/>
                 </a:solidFill>
                 <a:latin typeface="Arial"/>
                 <a:ea typeface="DejaVu Sans"/>
               </a:rPr>
-              <a:t>- Foreign Interface such as Ctype</a:t>
+              <a:t>- Foreign Interface such as </a:t>
             </a:r>
-            <a:endParaRPr lang="en-US" sz="1800" b="0" strike="noStrike" spc="-1">
+            <a:r>
+              <a:rPr lang="en-US" sz="1800" b="0" strike="noStrike" spc="-1" dirty="0" err="1">
+                <a:solidFill>
+                  <a:srgbClr val="000000"/>
+                </a:solidFill>
+                <a:latin typeface="Arial"/>
+                <a:ea typeface="DejaVu Sans"/>
+              </a:rPr>
+              <a:t>Ctype</a:t>
+            </a:r>
+            <a:endParaRPr lang="en-US" sz="1800" b="0" strike="noStrike" spc="-1" dirty="0">
               <a:latin typeface="Arial"/>
             </a:endParaRPr>
           </a:p>
@@ -32593,16 +32692,36 @@
               </a:tabLst>
             </a:pPr>
             <a:r>
-              <a:rPr lang="en-US" sz="1800" b="0" strike="noStrike" spc="-1">
+              <a:rPr lang="en-US" sz="1800" b="0" strike="noStrike" spc="-1" dirty="0">
                 <a:solidFill>
                   <a:srgbClr val="000000"/>
                 </a:solidFill>
                 <a:latin typeface="Arial"/>
                 <a:ea typeface="DejaVu Sans"/>
               </a:rPr>
-              <a:t>The ffi/unsafe library enables use of C-based APIs within Racket programs without having to write any new C code. </a:t>
+              <a:t>The </a:t>
             </a:r>
-            <a:endParaRPr lang="en-US" sz="1800" b="0" strike="noStrike" spc="-1">
+            <a:r>
+              <a:rPr lang="en-US" sz="1800" b="0" strike="noStrike" spc="-1" dirty="0" err="1">
+                <a:solidFill>
+                  <a:srgbClr val="000000"/>
+                </a:solidFill>
+                <a:latin typeface="Arial"/>
+                <a:ea typeface="DejaVu Sans"/>
+              </a:rPr>
+              <a:t>ffi</a:t>
+            </a:r>
+            <a:r>
+              <a:rPr lang="en-US" sz="1800" b="0" strike="noStrike" spc="-1" dirty="0">
+                <a:solidFill>
+                  <a:srgbClr val="000000"/>
+                </a:solidFill>
+                <a:latin typeface="Arial"/>
+                <a:ea typeface="DejaVu Sans"/>
+              </a:rPr>
+              <a:t>/unsafe library enables use of C-based APIs within Racket programs without having to write any new C code. </a:t>
+            </a:r>
+            <a:endParaRPr lang="en-US" sz="1800" b="0" strike="noStrike" spc="-1" dirty="0">
               <a:latin typeface="Arial"/>
             </a:endParaRPr>
           </a:p>
@@ -32618,7 +32737,7 @@
                 <a:tab pos="0" algn="l"/>
               </a:tabLst>
             </a:pPr>
-            <a:endParaRPr lang="en-US" sz="1800" b="0" strike="noStrike" spc="-1">
+            <a:endParaRPr lang="en-US" sz="1800" b="0" strike="noStrike" spc="-1" dirty="0">
               <a:latin typeface="Arial"/>
             </a:endParaRPr>
           </a:p>
@@ -32658,7 +32777,7 @@
         <p:spPr>
           <a:xfrm>
             <a:off x="1062360" y="159840"/>
-            <a:ext cx="7765560" cy="2382120"/>
+            <a:ext cx="8284840" cy="1428815"/>
           </a:xfrm>
           <a:prstGeom prst="rect">
             <a:avLst/>
@@ -32692,7 +32811,7 @@
               </a:lnSpc>
             </a:pPr>
             <a:r>
-              <a:rPr lang="en-US" sz="5400" b="0" strike="noStrike" spc="-1">
+              <a:rPr lang="en-US" sz="5400" b="0" strike="noStrike" spc="-1" dirty="0">
                 <a:solidFill>
                   <a:srgbClr val="4F81BD"/>
                 </a:solidFill>
@@ -32701,7 +32820,7 @@
               </a:rPr>
               <a:t>Main Characteristics and main Strengths of Racket</a:t>
             </a:r>
-            <a:endParaRPr lang="en-US" sz="5400" b="0" strike="noStrike" spc="-1">
+            <a:endParaRPr lang="en-US" sz="5400" b="0" strike="noStrike" spc="-1" dirty="0">
               <a:latin typeface="Arial"/>
             </a:endParaRPr>
           </a:p>
@@ -32715,8 +32834,8 @@
         </p:nvSpPr>
         <p:spPr>
           <a:xfrm>
-            <a:off x="770040" y="2476800"/>
-            <a:ext cx="8925840" cy="4047120"/>
+            <a:off x="770040" y="1699491"/>
+            <a:ext cx="8925840" cy="4824429"/>
           </a:xfrm>
           <a:prstGeom prst="rect">
             <a:avLst/>
@@ -32740,7 +32859,7 @@
         </p:style>
         <p:txBody>
           <a:bodyPr lIns="90000" tIns="45000" rIns="90000" bIns="45000">
-            <a:normAutofit lnSpcReduction="10000"/>
+            <a:normAutofit/>
           </a:bodyPr>
           <a:lstStyle/>
           <a:p>
@@ -32761,89 +32880,9 @@
               </a:tabLst>
             </a:pPr>
             <a:r>
-              <a:rPr lang="en-US" sz="1800" b="0" strike="noStrike" spc="-1">
-                <a:solidFill>
-                  <a:srgbClr val="000000"/>
-                </a:solidFill>
-                <a:latin typeface="Arial"/>
-                <a:ea typeface="DejaVu Sans"/>
-              </a:rPr>
-              <a:t>Racket includes rich set of Libraries</a:t>
+              <a:rPr lang="en-US" dirty="0"/>
+              <a:t>Racket offers functional language capabilities such as tail-call optimization and lexical closures.</a:t>
             </a:r>
-            <a:br/>
-            <a:r>
-              <a:rPr lang="en-US" sz="1800" b="0" strike="noStrike" spc="-1">
-                <a:solidFill>
-                  <a:srgbClr val="000000"/>
-                </a:solidFill>
-                <a:latin typeface="Arial"/>
-                <a:ea typeface="DejaVu Sans"/>
-              </a:rPr>
-              <a:t>   - Web Applications</a:t>
-            </a:r>
-            <a:br/>
-            <a:r>
-              <a:rPr lang="en-US" sz="1800" b="0" strike="noStrike" spc="-1">
-                <a:solidFill>
-                  <a:srgbClr val="000000"/>
-                </a:solidFill>
-                <a:latin typeface="Arial"/>
-                <a:ea typeface="DejaVu Sans"/>
-              </a:rPr>
-              <a:t>   - Database</a:t>
-            </a:r>
-            <a:br/>
-            <a:r>
-              <a:rPr lang="en-US" sz="1800" b="0" strike="noStrike" spc="-1">
-                <a:solidFill>
-                  <a:srgbClr val="000000"/>
-                </a:solidFill>
-                <a:latin typeface="Arial"/>
-                <a:ea typeface="DejaVu Sans"/>
-              </a:rPr>
-              <a:t>   - Math &amp; Statistics</a:t>
-            </a:r>
-            <a:br/>
-            <a:r>
-              <a:rPr lang="en-US" sz="1800" b="0" strike="noStrike" spc="-1">
-                <a:solidFill>
-                  <a:srgbClr val="000000"/>
-                </a:solidFill>
-                <a:latin typeface="Arial"/>
-                <a:ea typeface="DejaVu Sans"/>
-              </a:rPr>
-              <a:t>   - Network Libraries</a:t>
-            </a:r>
-            <a:br/>
-            <a:r>
-              <a:rPr lang="en-US" sz="1800" b="0" strike="noStrike" spc="-1">
-                <a:solidFill>
-                  <a:srgbClr val="000000"/>
-                </a:solidFill>
-                <a:latin typeface="Arial"/>
-                <a:ea typeface="DejaVu Sans"/>
-              </a:rPr>
-              <a:t>   - Parsing Libraries</a:t>
-            </a:r>
-            <a:endParaRPr lang="en-US" sz="1800" b="0" strike="noStrike" spc="-1">
-              <a:latin typeface="Arial"/>
-            </a:endParaRPr>
-          </a:p>
-          <a:p>
-            <a:pPr>
-              <a:lnSpc>
-                <a:spcPct val="100000"/>
-              </a:lnSpc>
-              <a:spcBef>
-                <a:spcPts val="1001"/>
-              </a:spcBef>
-              <a:tabLst>
-                <a:tab pos="0" algn="l"/>
-              </a:tabLst>
-            </a:pPr>
-            <a:endParaRPr lang="en-US" sz="1800" b="0" strike="noStrike" spc="-1">
-              <a:latin typeface="Arial"/>
-            </a:endParaRPr>
           </a:p>
           <a:p>
             <a:pPr marL="285840" indent="-284760">
@@ -32863,7 +32902,97 @@
               </a:tabLst>
             </a:pPr>
             <a:r>
-              <a:rPr lang="en-US" sz="1800" b="0" strike="noStrike" spc="-1">
+              <a:rPr lang="en-US" dirty="0"/>
+              <a:t>Racket has a rich language with an extensive set of libraries and tools. Not a “minimalist” language.</a:t>
+            </a:r>
+            <a:br>
+              <a:rPr dirty="0"/>
+            </a:br>
+            <a:r>
+              <a:rPr lang="en-US" sz="1800" b="0" strike="noStrike" spc="-1" dirty="0">
+                <a:solidFill>
+                  <a:srgbClr val="000000"/>
+                </a:solidFill>
+                <a:latin typeface="Arial"/>
+                <a:ea typeface="DejaVu Sans"/>
+              </a:rPr>
+              <a:t>   - Web Applications</a:t>
+            </a:r>
+            <a:br>
+              <a:rPr dirty="0"/>
+            </a:br>
+            <a:r>
+              <a:rPr lang="en-US" sz="1800" b="0" strike="noStrike" spc="-1" dirty="0">
+                <a:solidFill>
+                  <a:srgbClr val="000000"/>
+                </a:solidFill>
+                <a:latin typeface="Arial"/>
+                <a:ea typeface="DejaVu Sans"/>
+              </a:rPr>
+              <a:t>   - Database</a:t>
+            </a:r>
+            <a:br>
+              <a:rPr dirty="0"/>
+            </a:br>
+            <a:r>
+              <a:rPr lang="en-US" sz="1800" b="0" strike="noStrike" spc="-1" dirty="0">
+                <a:solidFill>
+                  <a:srgbClr val="000000"/>
+                </a:solidFill>
+                <a:latin typeface="Arial"/>
+                <a:ea typeface="DejaVu Sans"/>
+              </a:rPr>
+              <a:t>   - Math &amp; Statistics</a:t>
+            </a:r>
+            <a:br>
+              <a:rPr dirty="0"/>
+            </a:br>
+            <a:r>
+              <a:rPr lang="en-US" sz="1800" b="0" strike="noStrike" spc="-1" dirty="0">
+                <a:solidFill>
+                  <a:srgbClr val="000000"/>
+                </a:solidFill>
+                <a:latin typeface="Arial"/>
+                <a:ea typeface="DejaVu Sans"/>
+              </a:rPr>
+              <a:t>   - Network Libraries</a:t>
+            </a:r>
+            <a:br>
+              <a:rPr dirty="0"/>
+            </a:br>
+            <a:r>
+              <a:rPr lang="en-US" sz="1800" b="0" strike="noStrike" spc="-1" dirty="0">
+                <a:solidFill>
+                  <a:srgbClr val="000000"/>
+                </a:solidFill>
+                <a:latin typeface="Arial"/>
+                <a:ea typeface="DejaVu Sans"/>
+              </a:rPr>
+              <a:t>   - Parsing Libraries</a:t>
+            </a:r>
+            <a:endParaRPr lang="en-US" sz="1800" b="0" strike="noStrike" spc="-1" dirty="0">
+              <a:latin typeface="Arial"/>
+            </a:endParaRPr>
+          </a:p>
+          <a:p>
+            <a:pPr marL="285840" indent="-284760">
+              <a:lnSpc>
+                <a:spcPct val="100000"/>
+              </a:lnSpc>
+              <a:spcBef>
+                <a:spcPts val="1001"/>
+              </a:spcBef>
+              <a:buClr>
+                <a:srgbClr val="000000"/>
+              </a:buClr>
+              <a:buFont typeface="Arial"/>
+              <a:buChar char="•"/>
+              <a:tabLst>
+                <a:tab pos="0" algn="l"/>
+              </a:tabLst>
+            </a:pPr>
+            <a:r>
+              <a:rPr lang="en-US" sz="1800" b="0" strike="noStrike" spc="-1" dirty="0">
                 <a:solidFill>
                   <a:srgbClr val="000000"/>
                 </a:solidFill>
@@ -32872,9 +33001,11 @@
               </a:rPr>
               <a:t>Racket is Extensible &amp; Robust</a:t>
             </a:r>
-            <a:br/>
+            <a:br>
+              <a:rPr dirty="0"/>
+            </a:br>
             <a:r>
-              <a:rPr lang="en-US" sz="1800" b="0" strike="noStrike" spc="-1">
+              <a:rPr lang="en-US" sz="1800" b="0" strike="noStrike" spc="-1" dirty="0">
                 <a:solidFill>
                   <a:srgbClr val="000000"/>
                 </a:solidFill>
@@ -32883,9 +33014,11 @@
               </a:rPr>
               <a:t>   - Powerful Macros (Little and Big Macros)</a:t>
             </a:r>
-            <a:br/>
+            <a:br>
+              <a:rPr dirty="0"/>
+            </a:br>
             <a:r>
-              <a:rPr lang="en-US" sz="1800" b="0" strike="noStrike" spc="-1">
+              <a:rPr lang="en-US" sz="1800" b="0" strike="noStrike" spc="-1" dirty="0">
                 <a:solidFill>
                   <a:srgbClr val="000000"/>
                 </a:solidFill>
@@ -32894,9 +33027,11 @@
               </a:rPr>
               <a:t>   - Programmer can make domain-specific Languages or constructs with these macros</a:t>
             </a:r>
-            <a:br/>
+            <a:br>
+              <a:rPr dirty="0"/>
+            </a:br>
             <a:r>
-              <a:rPr lang="en-US" sz="1800" b="0" strike="noStrike" spc="-1">
+              <a:rPr lang="en-US" sz="1800" b="0" strike="noStrike" spc="-1" dirty="0">
                 <a:solidFill>
                   <a:srgbClr val="000000"/>
                 </a:solidFill>
@@ -32905,9 +33040,11 @@
               </a:rPr>
               <a:t>   - Provides a Contract Guide</a:t>
             </a:r>
-            <a:br/>
+            <a:br>
+              <a:rPr dirty="0"/>
+            </a:br>
             <a:r>
-              <a:rPr lang="en-US" sz="1800" b="0" strike="noStrike" spc="-1">
+              <a:rPr lang="en-US" sz="1800" b="0" strike="noStrike" spc="-1" dirty="0">
                 <a:solidFill>
                   <a:srgbClr val="000000"/>
                 </a:solidFill>
@@ -32916,9 +33053,11 @@
               </a:rPr>
               <a:t>      * High-Order Contracts</a:t>
             </a:r>
-            <a:br/>
+            <a:br>
+              <a:rPr dirty="0"/>
+            </a:br>
             <a:r>
-              <a:rPr lang="en-US" sz="1800" b="0" strike="noStrike" spc="-1">
+              <a:rPr lang="en-US" sz="1800" b="0" strike="noStrike" spc="-1" dirty="0">
                 <a:solidFill>
                   <a:srgbClr val="000000"/>
                 </a:solidFill>
@@ -32927,7 +33066,7 @@
               </a:rPr>
               <a:t>      * The Typed Contract Guide</a:t>
             </a:r>
-            <a:endParaRPr lang="en-US" sz="1800" b="0" strike="noStrike" spc="-1">
+            <a:endParaRPr lang="en-US" sz="1800" b="0" strike="noStrike" spc="-1" dirty="0">
               <a:latin typeface="Arial"/>
             </a:endParaRPr>
           </a:p>
@@ -32966,8 +33105,8 @@
         </p:nvSpPr>
         <p:spPr>
           <a:xfrm>
-            <a:off x="1062360" y="159840"/>
-            <a:ext cx="7765560" cy="2382120"/>
+            <a:off x="1062359" y="159840"/>
+            <a:ext cx="8063167" cy="1650487"/>
           </a:xfrm>
           <a:prstGeom prst="rect">
             <a:avLst/>
@@ -33001,7 +33140,7 @@
               </a:lnSpc>
             </a:pPr>
             <a:r>
-              <a:rPr lang="en-US" sz="5400" b="0" strike="noStrike" spc="-1">
+              <a:rPr lang="en-US" sz="5400" b="0" strike="noStrike" spc="-1" dirty="0">
                 <a:solidFill>
                   <a:srgbClr val="4F81BD"/>
                 </a:solidFill>
@@ -33010,7 +33149,7 @@
               </a:rPr>
               <a:t>Main Characteristics and main Strengths of Racket</a:t>
             </a:r>
-            <a:endParaRPr lang="en-US" sz="5400" b="0" strike="noStrike" spc="-1">
+            <a:endParaRPr lang="en-US" sz="5400" b="0" strike="noStrike" spc="-1" dirty="0">
               <a:latin typeface="Arial"/>
             </a:endParaRPr>
           </a:p>
@@ -33024,7 +33163,7 @@
         </p:nvSpPr>
         <p:spPr>
           <a:xfrm>
-            <a:off x="770040" y="2890080"/>
+            <a:off x="1633080" y="2114226"/>
             <a:ext cx="8925840" cy="3657960"/>
           </a:xfrm>
           <a:prstGeom prst="rect">
@@ -33049,7 +33188,7 @@
         </p:style>
         <p:txBody>
           <a:bodyPr lIns="90000" tIns="45000" rIns="90000" bIns="45000">
-            <a:normAutofit/>
+            <a:normAutofit fontScale="92500" lnSpcReduction="20000"/>
           </a:bodyPr>
           <a:lstStyle/>
           <a:p>
@@ -33070,7 +33209,7 @@
               </a:tabLst>
             </a:pPr>
             <a:r>
-              <a:rPr lang="en-US" sz="1800" b="0" strike="noStrike" spc="-1">
+              <a:rPr lang="en-US" sz="1800" b="0" strike="noStrike" spc="-1" dirty="0">
                 <a:solidFill>
                   <a:srgbClr val="000000"/>
                 </a:solidFill>
@@ -33079,15 +33218,12 @@
               </a:rPr>
               <a:t>Racket Documentation</a:t>
             </a:r>
-            <a:endParaRPr lang="en-US" sz="1800" b="0" strike="noStrike" spc="-1">
-              <a:latin typeface="Arial"/>
-            </a:endParaRPr>
-          </a:p>
-          <a:p>
-            <a:pPr marL="285840" indent="-284760">
-              <a:lnSpc>
-                <a:spcPct val="100000"/>
-              </a:lnSpc>
+            <a:endParaRPr lang="en-US" sz="1800" b="0" strike="noStrike" spc="-1" dirty="0">
+              <a:latin typeface="Arial"/>
+            </a:endParaRPr>
+          </a:p>
+          <a:p>
+            <a:pPr marL="743040" lvl="1" indent="-284760">
               <a:spcBef>
                 <a:spcPts val="1001"/>
               </a:spcBef>
@@ -33101,7 +33237,7 @@
               </a:tabLst>
             </a:pPr>
             <a:r>
-              <a:rPr lang="en-US" sz="1800" b="0" strike="noStrike" spc="-1">
+              <a:rPr lang="en-US" b="0" strike="noStrike" spc="-1" dirty="0">
                 <a:solidFill>
                   <a:srgbClr val="000000"/>
                 </a:solidFill>
@@ -33110,15 +33246,12 @@
               </a:rPr>
               <a:t>Teaching Section</a:t>
             </a:r>
-            <a:endParaRPr lang="en-US" sz="1800" b="0" strike="noStrike" spc="-1">
-              <a:latin typeface="Arial"/>
-            </a:endParaRPr>
-          </a:p>
-          <a:p>
-            <a:pPr marL="743040" lvl="1" indent="-284760">
-              <a:lnSpc>
-                <a:spcPct val="100000"/>
-              </a:lnSpc>
+            <a:endParaRPr lang="en-US" b="0" strike="noStrike" spc="-1" dirty="0">
+              <a:latin typeface="Arial"/>
+            </a:endParaRPr>
+          </a:p>
+          <a:p>
+            <a:pPr marL="1200240" lvl="2" indent="-284760">
               <a:spcBef>
                 <a:spcPts val="1001"/>
               </a:spcBef>
@@ -33132,7 +33265,7 @@
               </a:tabLst>
             </a:pPr>
             <a:r>
-              <a:rPr lang="en-US" sz="1800" b="0" strike="noStrike" spc="-1">
+              <a:rPr lang="en-US" b="0" strike="noStrike" spc="-1" dirty="0">
                 <a:solidFill>
                   <a:srgbClr val="000000"/>
                 </a:solidFill>
@@ -33141,15 +33274,12 @@
               </a:rPr>
               <a:t>How to design programs</a:t>
             </a:r>
-            <a:endParaRPr lang="en-US" sz="1800" b="0" strike="noStrike" spc="-1">
-              <a:latin typeface="Arial"/>
-            </a:endParaRPr>
-          </a:p>
-          <a:p>
-            <a:pPr marL="743040" lvl="1" indent="-284760">
-              <a:lnSpc>
-                <a:spcPct val="100000"/>
-              </a:lnSpc>
+            <a:endParaRPr lang="en-US" b="0" strike="noStrike" spc="-1" dirty="0">
+              <a:latin typeface="Arial"/>
+            </a:endParaRPr>
+          </a:p>
+          <a:p>
+            <a:pPr marL="1200240" lvl="2" indent="-284760">
               <a:spcBef>
                 <a:spcPts val="1001"/>
               </a:spcBef>
@@ -33163,7 +33293,7 @@
               </a:tabLst>
             </a:pPr>
             <a:r>
-              <a:rPr lang="en-US" sz="1800" b="0" strike="noStrike" spc="-1">
+              <a:rPr lang="en-US" b="0" strike="noStrike" spc="-1" dirty="0">
                 <a:solidFill>
                   <a:srgbClr val="000000"/>
                 </a:solidFill>
@@ -33172,15 +33302,12 @@
               </a:rPr>
               <a:t>How to design languages</a:t>
             </a:r>
-            <a:endParaRPr lang="en-US" sz="1800" b="0" strike="noStrike" spc="-1">
-              <a:latin typeface="Arial"/>
-            </a:endParaRPr>
-          </a:p>
-          <a:p>
-            <a:pPr marL="285840" indent="-284760">
-              <a:lnSpc>
-                <a:spcPct val="100000"/>
-              </a:lnSpc>
+            <a:endParaRPr lang="en-US" b="0" strike="noStrike" spc="-1" dirty="0">
+              <a:latin typeface="Arial"/>
+            </a:endParaRPr>
+          </a:p>
+          <a:p>
+            <a:pPr marL="743040" lvl="1" indent="-284760">
               <a:spcBef>
                 <a:spcPts val="1001"/>
               </a:spcBef>
@@ -33194,7 +33321,7 @@
               </a:tabLst>
             </a:pPr>
             <a:r>
-              <a:rPr lang="en-US" sz="1800" b="0" strike="noStrike" spc="-1">
+              <a:rPr lang="en-US" b="0" strike="noStrike" spc="-1" dirty="0">
                 <a:solidFill>
                   <a:srgbClr val="000000"/>
                 </a:solidFill>
@@ -33203,15 +33330,12 @@
               </a:rPr>
               <a:t>Tutorials</a:t>
             </a:r>
-            <a:endParaRPr lang="en-US" sz="1800" b="0" strike="noStrike" spc="-1">
-              <a:latin typeface="Arial"/>
-            </a:endParaRPr>
-          </a:p>
-          <a:p>
-            <a:pPr marL="743040" lvl="1" indent="-284760">
-              <a:lnSpc>
-                <a:spcPct val="100000"/>
-              </a:lnSpc>
+            <a:endParaRPr lang="en-US" b="0" strike="noStrike" spc="-1" dirty="0">
+              <a:latin typeface="Arial"/>
+            </a:endParaRPr>
+          </a:p>
+          <a:p>
+            <a:pPr marL="1200240" lvl="2" indent="-284760">
               <a:spcBef>
                 <a:spcPts val="1001"/>
               </a:spcBef>
@@ -33225,7 +33349,7 @@
               </a:tabLst>
             </a:pPr>
             <a:r>
-              <a:rPr lang="en-US" sz="1800" b="0" strike="noStrike" spc="-1">
+              <a:rPr lang="en-US" b="0" strike="noStrike" spc="-1" dirty="0">
                 <a:solidFill>
                   <a:srgbClr val="000000"/>
                 </a:solidFill>
@@ -33234,15 +33358,12 @@
               </a:rPr>
               <a:t>Examples of simple Racket programming</a:t>
             </a:r>
-            <a:endParaRPr lang="en-US" sz="1800" b="0" strike="noStrike" spc="-1">
-              <a:latin typeface="Arial"/>
-            </a:endParaRPr>
-          </a:p>
-          <a:p>
-            <a:pPr marL="285840" indent="-284760">
-              <a:lnSpc>
-                <a:spcPct val="100000"/>
-              </a:lnSpc>
+            <a:endParaRPr lang="en-US" b="0" strike="noStrike" spc="-1" dirty="0">
+              <a:latin typeface="Arial"/>
+            </a:endParaRPr>
+          </a:p>
+          <a:p>
+            <a:pPr marL="743040" lvl="1" indent="-284760">
               <a:spcBef>
                 <a:spcPts val="1001"/>
               </a:spcBef>
@@ -33256,7 +33377,7 @@
               </a:tabLst>
             </a:pPr>
             <a:r>
-              <a:rPr lang="en-US" sz="1800" b="0" strike="noStrike" spc="-1">
+              <a:rPr lang="en-US" b="0" strike="noStrike" spc="-1" dirty="0">
                 <a:solidFill>
                   <a:srgbClr val="000000"/>
                 </a:solidFill>
@@ -33265,15 +33386,12 @@
               </a:rPr>
               <a:t>Tools</a:t>
             </a:r>
-            <a:endParaRPr lang="en-US" sz="1800" b="0" strike="noStrike" spc="-1">
-              <a:latin typeface="Arial"/>
-            </a:endParaRPr>
-          </a:p>
-          <a:p>
-            <a:pPr marL="743040" lvl="1" indent="-284760">
-              <a:lnSpc>
-                <a:spcPct val="100000"/>
-              </a:lnSpc>
+            <a:endParaRPr lang="en-US" b="0" strike="noStrike" spc="-1" dirty="0">
+              <a:latin typeface="Arial"/>
+            </a:endParaRPr>
+          </a:p>
+          <a:p>
+            <a:pPr marL="1200240" lvl="2" indent="-284760">
               <a:spcBef>
                 <a:spcPts val="1001"/>
               </a:spcBef>
@@ -33287,16 +33405,64 @@
               </a:tabLst>
             </a:pPr>
             <a:r>
-              <a:rPr lang="en-US" sz="1800" b="0" strike="noStrike" spc="-1">
+              <a:rPr lang="en-US" b="0" strike="noStrike" spc="-1" dirty="0">
                 <a:solidFill>
                   <a:srgbClr val="000000"/>
                 </a:solidFill>
                 <a:latin typeface="Arial"/>
                 <a:ea typeface="DejaVu Sans"/>
               </a:rPr>
-              <a:t>i.e. Simple barcode reader /writer</a:t>
+              <a:t>i.e. Simple barcode reader /writer, QR-Code Writer and Reader, Spreadsheet read/Writer etc.</a:t>
             </a:r>
-            <a:endParaRPr lang="en-US" sz="1800" b="0" strike="noStrike" spc="-1">
+          </a:p>
+          <a:p>
+            <a:pPr marL="743040" lvl="1" indent="-284760">
+              <a:spcBef>
+                <a:spcPts val="1001"/>
+              </a:spcBef>
+              <a:buClr>
+                <a:srgbClr val="000000"/>
+              </a:buClr>
+              <a:buFont typeface="Arial"/>
+              <a:buChar char="•"/>
+              <a:tabLst>
+                <a:tab pos="0" algn="l"/>
+              </a:tabLst>
+            </a:pPr>
+            <a:r>
+              <a:rPr lang="en-US" spc="-1" dirty="0">
+                <a:solidFill>
+                  <a:srgbClr val="000000"/>
+                </a:solidFill>
+                <a:latin typeface="Arial"/>
+              </a:rPr>
+              <a:t>Several other Libraries </a:t>
+            </a:r>
+          </a:p>
+          <a:p>
+            <a:pPr marL="1200240" lvl="2" indent="-284760">
+              <a:spcBef>
+                <a:spcPts val="1001"/>
+              </a:spcBef>
+              <a:buClr>
+                <a:srgbClr val="000000"/>
+              </a:buClr>
+              <a:buFont typeface="Arial"/>
+              <a:buChar char="•"/>
+              <a:tabLst>
+                <a:tab pos="0" algn="l"/>
+              </a:tabLst>
+            </a:pPr>
+            <a:r>
+              <a:rPr lang="en-US" b="0" strike="noStrike" spc="-1" dirty="0">
+                <a:solidFill>
+                  <a:srgbClr val="000000"/>
+                </a:solidFill>
+                <a:latin typeface="Arial"/>
+              </a:rPr>
+              <a:t>Network, Parsing, GUI, Data Structures, Chess, Databases etc.</a:t>
+            </a:r>
+            <a:endParaRPr lang="en-US" b="0" strike="noStrike" spc="-1" dirty="0">
               <a:latin typeface="Arial"/>
             </a:endParaRPr>
           </a:p>
@@ -33312,7 +33478,7 @@
                 <a:tab pos="0" algn="l"/>
               </a:tabLst>
             </a:pPr>
-            <a:endParaRPr lang="en-US" sz="1800" b="0" strike="noStrike" spc="-1">
+            <a:endParaRPr lang="en-US" sz="1800" b="0" strike="noStrike" spc="-1" dirty="0">
               <a:latin typeface="Arial"/>
             </a:endParaRPr>
           </a:p>
@@ -33328,7 +33494,7 @@
                 <a:tab pos="0" algn="l"/>
               </a:tabLst>
             </a:pPr>
-            <a:endParaRPr lang="en-US" sz="1800" b="0" strike="noStrike" spc="-1">
+            <a:endParaRPr lang="en-US" sz="1800" b="0" strike="noStrike" spc="-1" dirty="0">
               <a:latin typeface="Arial"/>
             </a:endParaRPr>
           </a:p>
@@ -33344,7 +33510,7 @@
                 <a:tab pos="0" algn="l"/>
               </a:tabLst>
             </a:pPr>
-            <a:endParaRPr lang="en-US" sz="1800" b="0" strike="noStrike" spc="-1">
+            <a:endParaRPr lang="en-US" sz="1800" b="0" strike="noStrike" spc="-1" dirty="0">
               <a:latin typeface="Arial"/>
             </a:endParaRPr>
           </a:p>
@@ -33384,7 +33550,7 @@
         <p:spPr>
           <a:xfrm>
             <a:off x="1062360" y="159840"/>
-            <a:ext cx="7765560" cy="2382120"/>
+            <a:ext cx="8395676" cy="1650487"/>
           </a:xfrm>
           <a:prstGeom prst="rect">
             <a:avLst/>
@@ -33418,7 +33584,7 @@
               </a:lnSpc>
             </a:pPr>
             <a:r>
-              <a:rPr lang="en-US" sz="5400" b="0" strike="noStrike" spc="-1">
+              <a:rPr lang="en-US" sz="5400" b="0" strike="noStrike" spc="-1" dirty="0">
                 <a:solidFill>
                   <a:srgbClr val="4F81BD"/>
                 </a:solidFill>
@@ -33427,7 +33593,7 @@
               </a:rPr>
               <a:t>Main Characteristics and main Strengths of Racket</a:t>
             </a:r>
-            <a:endParaRPr lang="en-US" sz="5400" b="0" strike="noStrike" spc="-1">
+            <a:endParaRPr lang="en-US" sz="5400" b="0" strike="noStrike" spc="-1" dirty="0">
               <a:latin typeface="Arial"/>
             </a:endParaRPr>
           </a:p>
@@ -33441,7 +33607,7 @@
         </p:nvSpPr>
         <p:spPr>
           <a:xfrm>
-            <a:off x="770040" y="2890080"/>
+            <a:off x="1633080" y="2354371"/>
             <a:ext cx="8925840" cy="3657960"/>
           </a:xfrm>
           <a:prstGeom prst="rect">
@@ -33466,7 +33632,7 @@
         </p:style>
         <p:txBody>
           <a:bodyPr lIns="90000" tIns="45000" rIns="90000" bIns="45000">
-            <a:normAutofit fontScale="80000" lnSpcReduction="10000"/>
+            <a:normAutofit fontScale="87500" lnSpcReduction="20000"/>
           </a:bodyPr>
           <a:lstStyle/>
           <a:p>
@@ -33487,7 +33653,7 @@
               </a:tabLst>
             </a:pPr>
             <a:r>
-              <a:rPr lang="en-US" sz="1800" b="0" strike="noStrike" spc="-1">
+              <a:rPr lang="en-US" sz="1800" b="0" strike="noStrike" spc="-1" dirty="0">
                 <a:solidFill>
                   <a:srgbClr val="000000"/>
                 </a:solidFill>
@@ -33496,7 +33662,7 @@
               </a:rPr>
               <a:t>Racket supports Major Editors</a:t>
             </a:r>
-            <a:endParaRPr lang="en-US" sz="1800" b="0" strike="noStrike" spc="-1">
+            <a:endParaRPr lang="en-US" sz="1800" b="0" strike="noStrike" spc="-1" dirty="0">
               <a:latin typeface="Arial"/>
             </a:endParaRPr>
           </a:p>
@@ -33518,7 +33684,7 @@
               </a:tabLst>
             </a:pPr>
             <a:r>
-              <a:rPr lang="en-US" sz="1800" b="0" strike="noStrike" spc="-1">
+              <a:rPr lang="en-US" sz="1800" b="0" strike="noStrike" spc="-1" dirty="0">
                 <a:solidFill>
                   <a:srgbClr val="000000"/>
                 </a:solidFill>
@@ -33527,7 +33693,7 @@
               </a:rPr>
               <a:t>VIM Integration</a:t>
             </a:r>
-            <a:endParaRPr lang="en-US" sz="1800" b="0" strike="noStrike" spc="-1">
+            <a:endParaRPr lang="en-US" sz="1800" b="0" strike="noStrike" spc="-1" dirty="0">
               <a:latin typeface="Arial"/>
             </a:endParaRPr>
           </a:p>
@@ -33549,7 +33715,7 @@
               </a:tabLst>
             </a:pPr>
             <a:r>
-              <a:rPr lang="en-US" sz="1800" b="0" strike="noStrike" spc="-1">
+              <a:rPr lang="en-US" sz="1800" b="0" strike="noStrike" spc="-1" dirty="0">
                 <a:solidFill>
                   <a:srgbClr val="000000"/>
                 </a:solidFill>
@@ -33558,7 +33724,7 @@
               </a:rPr>
               <a:t>EMACS Integration</a:t>
             </a:r>
-            <a:endParaRPr lang="en-US" sz="1800" b="0" strike="noStrike" spc="-1">
+            <a:endParaRPr lang="en-US" sz="1800" b="0" strike="noStrike" spc="-1" dirty="0">
               <a:latin typeface="Arial"/>
             </a:endParaRPr>
           </a:p>
@@ -33580,7 +33746,7 @@
               </a:tabLst>
             </a:pPr>
             <a:r>
-              <a:rPr lang="en-US" sz="1800" b="0" strike="noStrike" spc="-1">
+              <a:rPr lang="en-US" sz="1800" b="0" strike="noStrike" spc="-1" dirty="0">
                 <a:solidFill>
                   <a:srgbClr val="000000"/>
                 </a:solidFill>
@@ -33589,7 +33755,7 @@
               </a:rPr>
               <a:t>Inspired by other Integrated Development Environments (IDE)</a:t>
             </a:r>
-            <a:endParaRPr lang="en-US" sz="1800" b="0" strike="noStrike" spc="-1">
+            <a:endParaRPr lang="en-US" sz="1800" b="0" strike="noStrike" spc="-1" dirty="0">
               <a:latin typeface="Arial"/>
             </a:endParaRPr>
           </a:p>
@@ -33611,7 +33777,7 @@
               </a:tabLst>
             </a:pPr>
             <a:r>
-              <a:rPr lang="en-US" sz="1800" b="0" strike="noStrike" spc="-1">
+              <a:rPr lang="en-US" sz="1800" b="0" strike="noStrike" spc="-1" dirty="0">
                 <a:solidFill>
                   <a:srgbClr val="000000"/>
                 </a:solidFill>
@@ -33620,7 +33786,7 @@
               </a:rPr>
               <a:t>It comes with its own IDE, Dr. Racket.</a:t>
             </a:r>
-            <a:endParaRPr lang="en-US" sz="1800" b="0" strike="noStrike" spc="-1">
+            <a:endParaRPr lang="en-US" sz="1800" b="0" strike="noStrike" spc="-1" dirty="0">
               <a:latin typeface="Arial"/>
             </a:endParaRPr>
           </a:p>
@@ -33642,7 +33808,7 @@
               </a:tabLst>
             </a:pPr>
             <a:r>
-              <a:rPr lang="en-US" sz="1800" b="0" strike="noStrike" spc="-1">
+              <a:rPr lang="en-US" sz="1800" b="0" strike="noStrike" spc="-1" dirty="0">
                 <a:solidFill>
                   <a:srgbClr val="000000"/>
                 </a:solidFill>
@@ -33651,7 +33817,7 @@
               </a:rPr>
               <a:t>Racket Community</a:t>
             </a:r>
-            <a:endParaRPr lang="en-US" sz="1800" b="0" strike="noStrike" spc="-1">
+            <a:endParaRPr lang="en-US" sz="1800" b="0" strike="noStrike" spc="-1" dirty="0">
               <a:latin typeface="Arial"/>
             </a:endParaRPr>
           </a:p>
@@ -33673,7 +33839,7 @@
               </a:tabLst>
             </a:pPr>
             <a:r>
-              <a:rPr lang="en-US" sz="1800" b="0" strike="noStrike" spc="-1">
+              <a:rPr lang="en-US" sz="1800" b="0" strike="noStrike" spc="-1" dirty="0" err="1">
                 <a:solidFill>
                   <a:srgbClr val="000000"/>
                 </a:solidFill>
@@ -33682,7 +33848,7 @@
               </a:rPr>
               <a:t>Github</a:t>
             </a:r>
-            <a:endParaRPr lang="en-US" sz="1800" b="0" strike="noStrike" spc="-1">
+            <a:endParaRPr lang="en-US" sz="1800" b="0" strike="noStrike" spc="-1" dirty="0">
               <a:latin typeface="Arial"/>
             </a:endParaRPr>
           </a:p>
@@ -33704,16 +33870,26 @@
               </a:tabLst>
             </a:pPr>
             <a:r>
-              <a:rPr lang="en-US" sz="1800" b="0" strike="noStrike" spc="-1">
+              <a:rPr lang="en-US" sz="1800" b="0" strike="noStrike" spc="-1" dirty="0">
                 <a:solidFill>
                   <a:srgbClr val="000000"/>
                 </a:solidFill>
                 <a:latin typeface="Arial"/>
                 <a:ea typeface="DejaVu Sans"/>
               </a:rPr>
-              <a:t>Continued Racket development via Github</a:t>
+              <a:t>Continued Racket development via </a:t>
             </a:r>
-            <a:endParaRPr lang="en-US" sz="1800" b="0" strike="noStrike" spc="-1">
+            <a:r>
+              <a:rPr lang="en-US" sz="1800" b="0" strike="noStrike" spc="-1" dirty="0" err="1">
+                <a:solidFill>
+                  <a:srgbClr val="000000"/>
+                </a:solidFill>
+                <a:latin typeface="Arial"/>
+                <a:ea typeface="DejaVu Sans"/>
+              </a:rPr>
+              <a:t>Github</a:t>
+            </a:r>
+            <a:endParaRPr lang="en-US" sz="1800" b="0" strike="noStrike" spc="-1" dirty="0">
               <a:latin typeface="Arial"/>
             </a:endParaRPr>
           </a:p>
@@ -33735,7 +33911,7 @@
               </a:tabLst>
             </a:pPr>
             <a:r>
-              <a:rPr lang="en-US" sz="1800" b="0" strike="noStrike" spc="-1">
+              <a:rPr lang="en-US" sz="1800" b="0" strike="noStrike" spc="-1" dirty="0">
                 <a:solidFill>
                   <a:srgbClr val="000000"/>
                 </a:solidFill>
@@ -33744,7 +33920,7 @@
               </a:rPr>
               <a:t>Issues, Bugs etc.</a:t>
             </a:r>
-            <a:endParaRPr lang="en-US" sz="1800" b="0" strike="noStrike" spc="-1">
+            <a:endParaRPr lang="en-US" sz="1800" b="0" strike="noStrike" spc="-1" dirty="0">
               <a:latin typeface="Arial"/>
             </a:endParaRPr>
           </a:p>
@@ -33766,7 +33942,7 @@
               </a:tabLst>
             </a:pPr>
             <a:r>
-              <a:rPr lang="en-US" sz="1800" b="0" strike="noStrike" spc="-1">
+              <a:rPr lang="en-US" sz="1800" b="0" strike="noStrike" spc="-1" dirty="0">
                 <a:solidFill>
                   <a:srgbClr val="000000"/>
                 </a:solidFill>
@@ -33775,7 +33951,7 @@
               </a:rPr>
               <a:t>Mailing Community</a:t>
             </a:r>
-            <a:endParaRPr lang="en-US" sz="1800" b="0" strike="noStrike" spc="-1">
+            <a:endParaRPr lang="en-US" sz="1800" b="0" strike="noStrike" spc="-1" dirty="0">
               <a:latin typeface="Arial"/>
             </a:endParaRPr>
           </a:p>
@@ -33797,7 +33973,7 @@
               </a:tabLst>
             </a:pPr>
             <a:r>
-              <a:rPr lang="en-US" sz="1800" b="0" strike="noStrike" spc="-1">
+              <a:rPr lang="en-US" sz="1800" b="0" strike="noStrike" spc="-1" dirty="0">
                 <a:solidFill>
                   <a:srgbClr val="000000"/>
                 </a:solidFill>
@@ -33806,7 +33982,7 @@
               </a:rPr>
               <a:t>Twitter</a:t>
             </a:r>
-            <a:endParaRPr lang="en-US" sz="1800" b="0" strike="noStrike" spc="-1">
+            <a:endParaRPr lang="en-US" sz="1800" b="0" strike="noStrike" spc="-1" dirty="0">
               <a:latin typeface="Arial"/>
             </a:endParaRPr>
           </a:p>
@@ -33822,7 +33998,7 @@
                 <a:tab pos="0" algn="l"/>
               </a:tabLst>
             </a:pPr>
-            <a:endParaRPr lang="en-US" sz="1800" b="0" strike="noStrike" spc="-1">
+            <a:endParaRPr lang="en-US" sz="1800" b="0" strike="noStrike" spc="-1" dirty="0">
               <a:latin typeface="Arial"/>
             </a:endParaRPr>
           </a:p>
@@ -33838,7 +34014,7 @@
                 <a:tab pos="0" algn="l"/>
               </a:tabLst>
             </a:pPr>
-            <a:endParaRPr lang="en-US" sz="1800" b="0" strike="noStrike" spc="-1">
+            <a:endParaRPr lang="en-US" sz="1800" b="0" strike="noStrike" spc="-1" dirty="0">
               <a:latin typeface="Arial"/>
             </a:endParaRPr>
           </a:p>

</xml_diff>